<commit_message>
Alle noetigen Folien hinzugefuegt
</commit_message>
<xml_diff>
--- a/Planung/projektskizze_nad.pptx
+++ b/Planung/projektskizze_nad.pptx
@@ -5,14 +5,18 @@
     <p:sldMasterId id="2147483648" r:id="rId1"/>
   </p:sldMasterIdLst>
   <p:notesMasterIdLst>
-    <p:notesMasterId r:id="rId7"/>
+    <p:notesMasterId r:id="rId11"/>
   </p:notesMasterIdLst>
   <p:sldIdLst>
     <p:sldId id="256" r:id="rId2"/>
-    <p:sldId id="257" r:id="rId3"/>
-    <p:sldId id="258" r:id="rId4"/>
-    <p:sldId id="259" r:id="rId5"/>
-    <p:sldId id="260" r:id="rId6"/>
+    <p:sldId id="263" r:id="rId3"/>
+    <p:sldId id="264" r:id="rId4"/>
+    <p:sldId id="265" r:id="rId5"/>
+    <p:sldId id="257" r:id="rId6"/>
+    <p:sldId id="258" r:id="rId7"/>
+    <p:sldId id="259" r:id="rId8"/>
+    <p:sldId id="260" r:id="rId9"/>
+    <p:sldId id="266" r:id="rId10"/>
   </p:sldIdLst>
   <p:sldSz cx="10080625" cy="7559675"/>
   <p:notesSz cx="7559675" cy="10691813"/>
@@ -181,6 +185,36 @@
       </a:defRPr>
     </a:lvl9pPr>
   </p:defaultTextStyle>
+  <p:extLst>
+    <p:ext uri="{EFAFB233-063F-42B5-8137-9DF3F51BA10A}">
+      <p15:sldGuideLst xmlns:p15="http://schemas.microsoft.com/office/powerpoint/2012/main">
+        <p15:guide id="1" orient="horz" pos="2160">
+          <p15:clr>
+            <a:srgbClr val="A4A3A4"/>
+          </p15:clr>
+        </p15:guide>
+        <p15:guide id="2" pos="2880">
+          <p15:clr>
+            <a:srgbClr val="A4A3A4"/>
+          </p15:clr>
+        </p15:guide>
+      </p15:sldGuideLst>
+    </p:ext>
+    <p:ext uri="{2D200454-40CA-4A62-9FC3-DE9A4176ACB9}">
+      <p15:notesGuideLst xmlns:p15="http://schemas.microsoft.com/office/powerpoint/2012/main">
+        <p15:guide id="1" orient="horz" pos="2880">
+          <p15:clr>
+            <a:srgbClr val="A4A3A4"/>
+          </p15:clr>
+        </p15:guide>
+        <p15:guide id="2" pos="2160">
+          <p15:clr>
+            <a:srgbClr val="A4A3A4"/>
+          </p15:clr>
+        </p15:guide>
+      </p15:notesGuideLst>
+    </p:ext>
+  </p:extLst>
 </p:presentation>
 </file>
 
@@ -234,14 +268,14 @@
           <a:effectLst/>
           <a:extLst>
             <a:ext uri="{909E8E84-426E-40dd-AFC4-6F175D3DCCD1}">
-              <a14:hiddenFill xmlns:a14="http://schemas.microsoft.com/office/drawing/2010/main">
+              <a14:hiddenFill xmlns:a14="http://schemas.microsoft.com/office/drawing/2010/main" xmlns="">
                 <a:solidFill>
                   <a:srgbClr val="FFFFFF"/>
                 </a:solidFill>
               </a14:hiddenFill>
             </a:ext>
             <a:ext uri="{91240B29-F687-4f45-9708-019B960494DF}">
-              <a14:hiddenLine xmlns:a14="http://schemas.microsoft.com/office/drawing/2010/main" w="9525">
+              <a14:hiddenLine xmlns:a14="http://schemas.microsoft.com/office/drawing/2010/main" xmlns="" w="9525">
                 <a:solidFill>
                   <a:srgbClr val="808080"/>
                 </a:solidFill>
@@ -251,7 +285,7 @@
               </a14:hiddenLine>
             </a:ext>
             <a:ext uri="{AF507438-7753-43e0-B8FC-AC1667EBCBE1}">
-              <a14:hiddenEffects xmlns:a14="http://schemas.microsoft.com/office/drawing/2010/main">
+              <a14:hiddenEffects xmlns:a14="http://schemas.microsoft.com/office/drawing/2010/main" xmlns="">
                 <a:effectLst>
                   <a:outerShdw blurRad="63500" dist="38099" dir="2700000" algn="ctr" rotWithShape="0">
                     <a:schemeClr val="bg2">
@@ -262,7 +296,7 @@
               </a14:hiddenEffects>
             </a:ext>
             <a:ext uri="{FAA26D3D-D897-4be2-8F04-BA451C77F1D7}">
-              <ma14:placeholderFlag xmlns:ma14="http://schemas.microsoft.com/office/mac/drawingml/2011/main" val="1"/>
+              <ma14:placeholderFlag xmlns:ma14="http://schemas.microsoft.com/office/mac/drawingml/2011/main" xmlns="" val="1"/>
             </a:ext>
           </a:extLst>
         </p:spPr>
@@ -292,14 +326,14 @@
           <a:effectLst/>
           <a:extLst>
             <a:ext uri="{909E8E84-426E-40dd-AFC4-6F175D3DCCD1}">
-              <a14:hiddenFill xmlns:a14="http://schemas.microsoft.com/office/drawing/2010/main">
+              <a14:hiddenFill xmlns:a14="http://schemas.microsoft.com/office/drawing/2010/main" xmlns="">
                 <a:solidFill>
                   <a:srgbClr val="FFFFFF"/>
                 </a:solidFill>
               </a14:hiddenFill>
             </a:ext>
             <a:ext uri="{91240B29-F687-4f45-9708-019B960494DF}">
-              <a14:hiddenLine xmlns:a14="http://schemas.microsoft.com/office/drawing/2010/main" w="9525">
+              <a14:hiddenLine xmlns:a14="http://schemas.microsoft.com/office/drawing/2010/main" xmlns="" w="9525">
                 <a:solidFill>
                   <a:srgbClr val="808080"/>
                 </a:solidFill>
@@ -309,7 +343,7 @@
               </a14:hiddenLine>
             </a:ext>
             <a:ext uri="{AF507438-7753-43e0-B8FC-AC1667EBCBE1}">
-              <a14:hiddenEffects xmlns:a14="http://schemas.microsoft.com/office/drawing/2010/main">
+              <a14:hiddenEffects xmlns:a14="http://schemas.microsoft.com/office/drawing/2010/main" xmlns="">
                 <a:effectLst>
                   <a:outerShdw blurRad="63500" dist="38099" dir="2700000" algn="ctr" rotWithShape="0">
                     <a:schemeClr val="bg2">
@@ -320,7 +354,7 @@
               </a14:hiddenEffects>
             </a:ext>
             <a:ext uri="{FAA26D3D-D897-4be2-8F04-BA451C77F1D7}">
-              <ma14:placeholderFlag xmlns:ma14="http://schemas.microsoft.com/office/mac/drawingml/2011/main" val="1"/>
+              <ma14:placeholderFlag xmlns:ma14="http://schemas.microsoft.com/office/mac/drawingml/2011/main" xmlns="" val="1"/>
             </a:ext>
           </a:extLst>
         </p:spPr>
@@ -362,14 +396,14 @@
           <a:effectLst/>
           <a:extLst>
             <a:ext uri="{909E8E84-426E-40dd-AFC4-6F175D3DCCD1}">
-              <a14:hiddenFill xmlns:a14="http://schemas.microsoft.com/office/drawing/2010/main">
+              <a14:hiddenFill xmlns:a14="http://schemas.microsoft.com/office/drawing/2010/main" xmlns="">
                 <a:solidFill>
                   <a:srgbClr val="FFFFFF"/>
                 </a:solidFill>
               </a14:hiddenFill>
             </a:ext>
             <a:ext uri="{91240B29-F687-4f45-9708-019B960494DF}">
-              <a14:hiddenLine xmlns:a14="http://schemas.microsoft.com/office/drawing/2010/main" w="9525">
+              <a14:hiddenLine xmlns:a14="http://schemas.microsoft.com/office/drawing/2010/main" xmlns="" w="9525">
                 <a:solidFill>
                   <a:srgbClr val="808080"/>
                 </a:solidFill>
@@ -379,7 +413,7 @@
               </a14:hiddenLine>
             </a:ext>
             <a:ext uri="{AF507438-7753-43e0-B8FC-AC1667EBCBE1}">
-              <a14:hiddenEffects xmlns:a14="http://schemas.microsoft.com/office/drawing/2010/main">
+              <a14:hiddenEffects xmlns:a14="http://schemas.microsoft.com/office/drawing/2010/main" xmlns="">
                 <a:effectLst>
                   <a:outerShdw blurRad="63500" dist="38099" dir="2700000" algn="ctr" rotWithShape="0">
                     <a:schemeClr val="bg2">
@@ -390,7 +424,7 @@
               </a14:hiddenEffects>
             </a:ext>
             <a:ext uri="{FAA26D3D-D897-4be2-8F04-BA451C77F1D7}">
-              <ma14:placeholderFlag xmlns:ma14="http://schemas.microsoft.com/office/mac/drawingml/2011/main" val="1"/>
+              <ma14:placeholderFlag xmlns:ma14="http://schemas.microsoft.com/office/mac/drawingml/2011/main" xmlns="" val="1"/>
             </a:ext>
           </a:extLst>
         </p:spPr>
@@ -446,14 +480,14 @@
           <a:effectLst/>
           <a:extLst>
             <a:ext uri="{909E8E84-426E-40dd-AFC4-6F175D3DCCD1}">
-              <a14:hiddenFill xmlns:a14="http://schemas.microsoft.com/office/drawing/2010/main">
+              <a14:hiddenFill xmlns:a14="http://schemas.microsoft.com/office/drawing/2010/main" xmlns="">
                 <a:solidFill>
                   <a:srgbClr val="FFFFFF"/>
                 </a:solidFill>
               </a14:hiddenFill>
             </a:ext>
             <a:ext uri="{91240B29-F687-4f45-9708-019B960494DF}">
-              <a14:hiddenLine xmlns:a14="http://schemas.microsoft.com/office/drawing/2010/main" w="9525">
+              <a14:hiddenLine xmlns:a14="http://schemas.microsoft.com/office/drawing/2010/main" xmlns="" w="9525">
                 <a:solidFill>
                   <a:srgbClr val="808080"/>
                 </a:solidFill>
@@ -463,7 +497,7 @@
               </a14:hiddenLine>
             </a:ext>
             <a:ext uri="{AF507438-7753-43e0-B8FC-AC1667EBCBE1}">
-              <a14:hiddenEffects xmlns:a14="http://schemas.microsoft.com/office/drawing/2010/main">
+              <a14:hiddenEffects xmlns:a14="http://schemas.microsoft.com/office/drawing/2010/main" xmlns="">
                 <a:effectLst>
                   <a:outerShdw blurRad="63500" dist="38099" dir="2700000" algn="ctr" rotWithShape="0">
                     <a:schemeClr val="bg2">
@@ -474,7 +508,7 @@
               </a14:hiddenEffects>
             </a:ext>
             <a:ext uri="{FAA26D3D-D897-4be2-8F04-BA451C77F1D7}">
-              <ma14:placeholderFlag xmlns:ma14="http://schemas.microsoft.com/office/mac/drawingml/2011/main" val="1"/>
+              <ma14:placeholderFlag xmlns:ma14="http://schemas.microsoft.com/office/mac/drawingml/2011/main" xmlns="" val="1"/>
             </a:ext>
           </a:extLst>
         </p:spPr>
@@ -530,14 +564,14 @@
           <a:effectLst/>
           <a:extLst>
             <a:ext uri="{909E8E84-426E-40dd-AFC4-6F175D3DCCD1}">
-              <a14:hiddenFill xmlns:a14="http://schemas.microsoft.com/office/drawing/2010/main">
+              <a14:hiddenFill xmlns:a14="http://schemas.microsoft.com/office/drawing/2010/main" xmlns="">
                 <a:solidFill>
                   <a:srgbClr val="FFFFFF"/>
                 </a:solidFill>
               </a14:hiddenFill>
             </a:ext>
             <a:ext uri="{91240B29-F687-4f45-9708-019B960494DF}">
-              <a14:hiddenLine xmlns:a14="http://schemas.microsoft.com/office/drawing/2010/main" w="9525">
+              <a14:hiddenLine xmlns:a14="http://schemas.microsoft.com/office/drawing/2010/main" xmlns="" w="9525">
                 <a:solidFill>
                   <a:srgbClr val="808080"/>
                 </a:solidFill>
@@ -547,7 +581,7 @@
               </a14:hiddenLine>
             </a:ext>
             <a:ext uri="{AF507438-7753-43e0-B8FC-AC1667EBCBE1}">
-              <a14:hiddenEffects xmlns:a14="http://schemas.microsoft.com/office/drawing/2010/main">
+              <a14:hiddenEffects xmlns:a14="http://schemas.microsoft.com/office/drawing/2010/main" xmlns="">
                 <a:effectLst>
                   <a:outerShdw blurRad="63500" dist="38099" dir="2700000" algn="ctr" rotWithShape="0">
                     <a:schemeClr val="bg2">
@@ -558,7 +592,7 @@
               </a14:hiddenEffects>
             </a:ext>
             <a:ext uri="{FAA26D3D-D897-4be2-8F04-BA451C77F1D7}">
-              <ma14:placeholderFlag xmlns:ma14="http://schemas.microsoft.com/office/mac/drawingml/2011/main" val="1"/>
+              <ma14:placeholderFlag xmlns:ma14="http://schemas.microsoft.com/office/mac/drawingml/2011/main" xmlns="" val="1"/>
             </a:ext>
           </a:extLst>
         </p:spPr>
@@ -614,14 +648,14 @@
           <a:effectLst/>
           <a:extLst>
             <a:ext uri="{909E8E84-426E-40dd-AFC4-6F175D3DCCD1}">
-              <a14:hiddenFill xmlns:a14="http://schemas.microsoft.com/office/drawing/2010/main">
+              <a14:hiddenFill xmlns:a14="http://schemas.microsoft.com/office/drawing/2010/main" xmlns="">
                 <a:solidFill>
                   <a:srgbClr val="FFFFFF"/>
                 </a:solidFill>
               </a14:hiddenFill>
             </a:ext>
             <a:ext uri="{91240B29-F687-4f45-9708-019B960494DF}">
-              <a14:hiddenLine xmlns:a14="http://schemas.microsoft.com/office/drawing/2010/main" w="9525">
+              <a14:hiddenLine xmlns:a14="http://schemas.microsoft.com/office/drawing/2010/main" xmlns="" w="9525">
                 <a:solidFill>
                   <a:srgbClr val="808080"/>
                 </a:solidFill>
@@ -631,7 +665,7 @@
               </a14:hiddenLine>
             </a:ext>
             <a:ext uri="{AF507438-7753-43e0-B8FC-AC1667EBCBE1}">
-              <a14:hiddenEffects xmlns:a14="http://schemas.microsoft.com/office/drawing/2010/main">
+              <a14:hiddenEffects xmlns:a14="http://schemas.microsoft.com/office/drawing/2010/main" xmlns="">
                 <a:effectLst>
                   <a:outerShdw blurRad="63500" dist="38099" dir="2700000" algn="ctr" rotWithShape="0">
                     <a:schemeClr val="bg2">
@@ -642,7 +676,7 @@
               </a14:hiddenEffects>
             </a:ext>
             <a:ext uri="{FAA26D3D-D897-4be2-8F04-BA451C77F1D7}">
-              <ma14:placeholderFlag xmlns:ma14="http://schemas.microsoft.com/office/mac/drawingml/2011/main" val="1"/>
+              <ma14:placeholderFlag xmlns:ma14="http://schemas.microsoft.com/office/mac/drawingml/2011/main" xmlns="" val="1"/>
             </a:ext>
           </a:extLst>
         </p:spPr>
@@ -672,7 +706,7 @@
             <a:fld id="{759A24F2-03E5-AD4B-98CB-4B6B1551B266}" type="slidenum">
               <a:rPr lang="en-US"/>
               <a:pPr/>
-              <a:t>‹Nr.›</a:t>
+              <a:t>‹#›</a:t>
             </a:fld>
             <a:endParaRPr lang="en-US"/>
           </a:p>
@@ -918,7 +952,7 @@
           </a:ln>
           <a:extLst>
             <a:ext uri="{AF507438-7753-43e0-B8FC-AC1667EBCBE1}">
-              <a14:hiddenEffects xmlns:a14="http://schemas.microsoft.com/office/drawing/2010/main">
+              <a14:hiddenEffects xmlns:a14="http://schemas.microsoft.com/office/drawing/2010/main" xmlns="">
                 <a:effectLst>
                   <a:outerShdw blurRad="63500" dist="38099" dir="2700000" algn="ctr" rotWithShape="0">
                     <a:srgbClr val="000000">
@@ -953,14 +987,14 @@
           <a:ln/>
           <a:extLst>
             <a:ext uri="{909E8E84-426E-40dd-AFC4-6F175D3DCCD1}">
-              <a14:hiddenFill xmlns:a14="http://schemas.microsoft.com/office/drawing/2010/main">
+              <a14:hiddenFill xmlns:a14="http://schemas.microsoft.com/office/drawing/2010/main" xmlns="">
                 <a:solidFill>
                   <a:srgbClr val="FFFFFF"/>
                 </a:solidFill>
               </a14:hiddenFill>
             </a:ext>
             <a:ext uri="{91240B29-F687-4f45-9708-019B960494DF}">
-              <a14:hiddenLine xmlns:a14="http://schemas.microsoft.com/office/drawing/2010/main" w="9525">
+              <a14:hiddenLine xmlns:a14="http://schemas.microsoft.com/office/drawing/2010/main" xmlns="" w="9525">
                 <a:solidFill>
                   <a:srgbClr val="808080"/>
                 </a:solidFill>
@@ -970,7 +1004,7 @@
               </a14:hiddenLine>
             </a:ext>
             <a:ext uri="{AF507438-7753-43e0-B8FC-AC1667EBCBE1}">
-              <a14:hiddenEffects xmlns:a14="http://schemas.microsoft.com/office/drawing/2010/main">
+              <a14:hiddenEffects xmlns:a14="http://schemas.microsoft.com/office/drawing/2010/main" xmlns="">
                 <a:effectLst>
                   <a:outerShdw blurRad="63500" dist="38099" dir="2700000" algn="ctr" rotWithShape="0">
                     <a:srgbClr val="000000">
@@ -991,6 +1025,11 @@
         </p:txBody>
       </p:sp>
     </p:spTree>
+    <p:extLst>
+      <p:ext uri="{BB962C8B-B14F-4D97-AF65-F5344CB8AC3E}">
+        <p14:creationId xmlns:p14="http://schemas.microsoft.com/office/powerpoint/2010/main" val="2871305888"/>
+      </p:ext>
+    </p:extLst>
   </p:cSld>
   <p:clrMapOvr>
     <a:masterClrMapping/>
@@ -1176,7 +1215,7 @@
             <a:fld id="{5F5A8052-D477-544A-AB0D-848BBBD6B0CF}" type="slidenum">
               <a:rPr lang="en-US"/>
               <a:pPr/>
-              <a:t>‹Nr.›</a:t>
+              <a:t>‹#›</a:t>
             </a:fld>
             <a:endParaRPr lang="en-US"/>
           </a:p>
@@ -1355,7 +1394,7 @@
             <a:fld id="{B2967EBE-35BC-E84D-8881-9876F786AE5A}" type="slidenum">
               <a:rPr lang="en-US"/>
               <a:pPr/>
-              <a:t>‹Nr.›</a:t>
+              <a:t>‹#›</a:t>
             </a:fld>
             <a:endParaRPr lang="en-US"/>
           </a:p>
@@ -1544,7 +1583,7 @@
             <a:fld id="{138864AB-7166-544C-B585-C6F7B5A93DC3}" type="slidenum">
               <a:rPr lang="en-US"/>
               <a:pPr/>
-              <a:t>‹Nr.›</a:t>
+              <a:t>‹#›</a:t>
             </a:fld>
             <a:endParaRPr lang="en-US"/>
           </a:p>
@@ -1691,7 +1730,7 @@
             <a:fld id="{31565884-69F6-B244-9CD6-FBB84CD4B4FE}" type="slidenum">
               <a:rPr lang="en-US"/>
               <a:pPr/>
-              <a:t>‹Nr.›</a:t>
+              <a:t>‹#›</a:t>
             </a:fld>
             <a:endParaRPr lang="en-US"/>
           </a:p>
@@ -1870,7 +1909,7 @@
             <a:fld id="{C07E8DC2-405D-9749-AF85-D27B8B1FCFFD}" type="slidenum">
               <a:rPr lang="en-US"/>
               <a:pPr/>
-              <a:t>‹Nr.›</a:t>
+              <a:t>‹#›</a:t>
             </a:fld>
             <a:endParaRPr lang="en-US"/>
           </a:p>
@@ -2071,7 +2110,7 @@
             <a:fld id="{3F91F4C8-C6A7-134E-8016-4F28EE8B578B}" type="slidenum">
               <a:rPr lang="en-US"/>
               <a:pPr/>
-              <a:t>‹Nr.›</a:t>
+              <a:t>‹#›</a:t>
             </a:fld>
             <a:endParaRPr lang="en-US"/>
           </a:p>
@@ -2368,7 +2407,7 @@
             <a:fld id="{7C63571E-1D00-C745-8D96-D34E3203BB46}" type="slidenum">
               <a:rPr lang="en-US"/>
               <a:pPr/>
-              <a:t>‹Nr.›</a:t>
+              <a:t>‹#›</a:t>
             </a:fld>
             <a:endParaRPr lang="en-US"/>
           </a:p>
@@ -2804,7 +2843,7 @@
             <a:fld id="{734CE838-1F0A-4740-97F3-2F17A06A3A39}" type="slidenum">
               <a:rPr lang="en-US"/>
               <a:pPr/>
-              <a:t>‹Nr.›</a:t>
+              <a:t>‹#›</a:t>
             </a:fld>
             <a:endParaRPr lang="en-US"/>
           </a:p>
@@ -2931,7 +2970,7 @@
             <a:fld id="{78F6048A-94CB-E54E-83BF-FDFB0D0276BA}" type="slidenum">
               <a:rPr lang="en-US"/>
               <a:pPr/>
-              <a:t>‹Nr.›</a:t>
+              <a:t>‹#›</a:t>
             </a:fld>
             <a:endParaRPr lang="en-US"/>
           </a:p>
@@ -3035,7 +3074,7 @@
             <a:fld id="{BAB9C0BE-5E7B-B440-AF19-1270DDC367E7}" type="slidenum">
               <a:rPr lang="en-US"/>
               <a:pPr/>
-              <a:t>‹Nr.›</a:t>
+              <a:t>‹#›</a:t>
             </a:fld>
             <a:endParaRPr lang="en-US"/>
           </a:p>
@@ -3321,7 +3360,7 @@
             <a:fld id="{049D816E-57E9-F449-A7E3-85A45A58FF45}" type="slidenum">
               <a:rPr lang="en-US"/>
               <a:pPr/>
-              <a:t>‹Nr.›</a:t>
+              <a:t>‹#›</a:t>
             </a:fld>
             <a:endParaRPr lang="en-US"/>
           </a:p>
@@ -3583,7 +3622,7 @@
             <a:fld id="{C9E24F3E-EFB2-1C42-A072-A2D267BEF8AB}" type="slidenum">
               <a:rPr lang="en-US"/>
               <a:pPr/>
-              <a:t>‹Nr.›</a:t>
+              <a:t>‹#›</a:t>
             </a:fld>
             <a:endParaRPr lang="en-US"/>
           </a:p>
@@ -3656,14 +3695,14 @@
           <a:effectLst/>
           <a:extLst>
             <a:ext uri="{909E8E84-426E-40dd-AFC4-6F175D3DCCD1}">
-              <a14:hiddenFill xmlns:a14="http://schemas.microsoft.com/office/drawing/2010/main">
+              <a14:hiddenFill xmlns:a14="http://schemas.microsoft.com/office/drawing/2010/main" xmlns="">
                 <a:solidFill>
                   <a:srgbClr val="FFFFFF"/>
                 </a:solidFill>
               </a14:hiddenFill>
             </a:ext>
             <a:ext uri="{91240B29-F687-4f45-9708-019B960494DF}">
-              <a14:hiddenLine xmlns:a14="http://schemas.microsoft.com/office/drawing/2010/main" w="9525">
+              <a14:hiddenLine xmlns:a14="http://schemas.microsoft.com/office/drawing/2010/main" xmlns="" w="9525">
                 <a:solidFill>
                   <a:srgbClr val="808080"/>
                 </a:solidFill>
@@ -3673,7 +3712,7 @@
               </a14:hiddenLine>
             </a:ext>
             <a:ext uri="{AF507438-7753-43e0-B8FC-AC1667EBCBE1}">
-              <a14:hiddenEffects xmlns:a14="http://schemas.microsoft.com/office/drawing/2010/main">
+              <a14:hiddenEffects xmlns:a14="http://schemas.microsoft.com/office/drawing/2010/main" xmlns="">
                 <a:effectLst>
                   <a:outerShdw blurRad="63500" dist="38099" dir="2700000" algn="ctr" rotWithShape="0">
                     <a:schemeClr val="bg2">
@@ -3684,7 +3723,7 @@
               </a14:hiddenEffects>
             </a:ext>
             <a:ext uri="{FAA26D3D-D897-4be2-8F04-BA451C77F1D7}">
-              <ma14:placeholderFlag xmlns:ma14="http://schemas.microsoft.com/office/mac/drawingml/2011/main" val="1"/>
+              <ma14:placeholderFlag xmlns:ma14="http://schemas.microsoft.com/office/mac/drawingml/2011/main" xmlns="" val="1"/>
             </a:ext>
           </a:extLst>
         </p:spPr>
@@ -3729,14 +3768,14 @@
           <a:effectLst/>
           <a:extLst>
             <a:ext uri="{909E8E84-426E-40dd-AFC4-6F175D3DCCD1}">
-              <a14:hiddenFill xmlns:a14="http://schemas.microsoft.com/office/drawing/2010/main">
+              <a14:hiddenFill xmlns:a14="http://schemas.microsoft.com/office/drawing/2010/main" xmlns="">
                 <a:solidFill>
                   <a:srgbClr val="FFFFFF"/>
                 </a:solidFill>
               </a14:hiddenFill>
             </a:ext>
             <a:ext uri="{91240B29-F687-4f45-9708-019B960494DF}">
-              <a14:hiddenLine xmlns:a14="http://schemas.microsoft.com/office/drawing/2010/main" w="9525">
+              <a14:hiddenLine xmlns:a14="http://schemas.microsoft.com/office/drawing/2010/main" xmlns="" w="9525">
                 <a:solidFill>
                   <a:srgbClr val="808080"/>
                 </a:solidFill>
@@ -3746,7 +3785,7 @@
               </a14:hiddenLine>
             </a:ext>
             <a:ext uri="{AF507438-7753-43e0-B8FC-AC1667EBCBE1}">
-              <a14:hiddenEffects xmlns:a14="http://schemas.microsoft.com/office/drawing/2010/main">
+              <a14:hiddenEffects xmlns:a14="http://schemas.microsoft.com/office/drawing/2010/main" xmlns="">
                 <a:effectLst>
                   <a:outerShdw blurRad="63500" dist="38099" dir="2700000" algn="ctr" rotWithShape="0">
                     <a:schemeClr val="bg2">
@@ -3757,7 +3796,7 @@
               </a14:hiddenEffects>
             </a:ext>
             <a:ext uri="{FAA26D3D-D897-4be2-8F04-BA451C77F1D7}">
-              <ma14:placeholderFlag xmlns:ma14="http://schemas.microsoft.com/office/mac/drawingml/2011/main" val="1"/>
+              <ma14:placeholderFlag xmlns:ma14="http://schemas.microsoft.com/office/mac/drawingml/2011/main" xmlns="" val="1"/>
             </a:ext>
           </a:extLst>
         </p:spPr>
@@ -3858,14 +3897,14 @@
           <a:effectLst/>
           <a:extLst>
             <a:ext uri="{909E8E84-426E-40dd-AFC4-6F175D3DCCD1}">
-              <a14:hiddenFill xmlns:a14="http://schemas.microsoft.com/office/drawing/2010/main">
+              <a14:hiddenFill xmlns:a14="http://schemas.microsoft.com/office/drawing/2010/main" xmlns="">
                 <a:solidFill>
                   <a:srgbClr val="FFFFFF"/>
                 </a:solidFill>
               </a14:hiddenFill>
             </a:ext>
             <a:ext uri="{91240B29-F687-4f45-9708-019B960494DF}">
-              <a14:hiddenLine xmlns:a14="http://schemas.microsoft.com/office/drawing/2010/main" w="9525">
+              <a14:hiddenLine xmlns:a14="http://schemas.microsoft.com/office/drawing/2010/main" xmlns="" w="9525">
                 <a:solidFill>
                   <a:srgbClr val="808080"/>
                 </a:solidFill>
@@ -3875,7 +3914,7 @@
               </a14:hiddenLine>
             </a:ext>
             <a:ext uri="{AF507438-7753-43e0-B8FC-AC1667EBCBE1}">
-              <a14:hiddenEffects xmlns:a14="http://schemas.microsoft.com/office/drawing/2010/main">
+              <a14:hiddenEffects xmlns:a14="http://schemas.microsoft.com/office/drawing/2010/main" xmlns="">
                 <a:effectLst>
                   <a:outerShdw blurRad="63500" dist="38099" dir="2700000" algn="ctr" rotWithShape="0">
                     <a:schemeClr val="bg2">
@@ -3886,7 +3925,7 @@
               </a14:hiddenEffects>
             </a:ext>
             <a:ext uri="{FAA26D3D-D897-4be2-8F04-BA451C77F1D7}">
-              <ma14:placeholderFlag xmlns:ma14="http://schemas.microsoft.com/office/mac/drawingml/2011/main" val="1"/>
+              <ma14:placeholderFlag xmlns:ma14="http://schemas.microsoft.com/office/mac/drawingml/2011/main" xmlns="" val="1"/>
             </a:ext>
           </a:extLst>
         </p:spPr>
@@ -3941,14 +3980,14 @@
           <a:effectLst/>
           <a:extLst>
             <a:ext uri="{909E8E84-426E-40dd-AFC4-6F175D3DCCD1}">
-              <a14:hiddenFill xmlns:a14="http://schemas.microsoft.com/office/drawing/2010/main">
+              <a14:hiddenFill xmlns:a14="http://schemas.microsoft.com/office/drawing/2010/main" xmlns="">
                 <a:solidFill>
                   <a:srgbClr val="FFFFFF"/>
                 </a:solidFill>
               </a14:hiddenFill>
             </a:ext>
             <a:ext uri="{91240B29-F687-4f45-9708-019B960494DF}">
-              <a14:hiddenLine xmlns:a14="http://schemas.microsoft.com/office/drawing/2010/main" w="9525">
+              <a14:hiddenLine xmlns:a14="http://schemas.microsoft.com/office/drawing/2010/main" xmlns="" w="9525">
                 <a:solidFill>
                   <a:srgbClr val="808080"/>
                 </a:solidFill>
@@ -3958,7 +3997,7 @@
               </a14:hiddenLine>
             </a:ext>
             <a:ext uri="{AF507438-7753-43e0-B8FC-AC1667EBCBE1}">
-              <a14:hiddenEffects xmlns:a14="http://schemas.microsoft.com/office/drawing/2010/main">
+              <a14:hiddenEffects xmlns:a14="http://schemas.microsoft.com/office/drawing/2010/main" xmlns="">
                 <a:effectLst>
                   <a:outerShdw blurRad="63500" dist="38099" dir="2700000" algn="ctr" rotWithShape="0">
                     <a:schemeClr val="bg2">
@@ -3969,7 +4008,7 @@
               </a14:hiddenEffects>
             </a:ext>
             <a:ext uri="{FAA26D3D-D897-4be2-8F04-BA451C77F1D7}">
-              <ma14:placeholderFlag xmlns:ma14="http://schemas.microsoft.com/office/mac/drawingml/2011/main" val="1"/>
+              <ma14:placeholderFlag xmlns:ma14="http://schemas.microsoft.com/office/mac/drawingml/2011/main" xmlns="" val="1"/>
             </a:ext>
           </a:extLst>
         </p:spPr>
@@ -4025,14 +4064,14 @@
           <a:effectLst/>
           <a:extLst>
             <a:ext uri="{909E8E84-426E-40dd-AFC4-6F175D3DCCD1}">
-              <a14:hiddenFill xmlns:a14="http://schemas.microsoft.com/office/drawing/2010/main">
+              <a14:hiddenFill xmlns:a14="http://schemas.microsoft.com/office/drawing/2010/main" xmlns="">
                 <a:solidFill>
                   <a:srgbClr val="FFFFFF"/>
                 </a:solidFill>
               </a14:hiddenFill>
             </a:ext>
             <a:ext uri="{91240B29-F687-4f45-9708-019B960494DF}">
-              <a14:hiddenLine xmlns:a14="http://schemas.microsoft.com/office/drawing/2010/main" w="9525">
+              <a14:hiddenLine xmlns:a14="http://schemas.microsoft.com/office/drawing/2010/main" xmlns="" w="9525">
                 <a:solidFill>
                   <a:srgbClr val="808080"/>
                 </a:solidFill>
@@ -4042,7 +4081,7 @@
               </a14:hiddenLine>
             </a:ext>
             <a:ext uri="{AF507438-7753-43e0-B8FC-AC1667EBCBE1}">
-              <a14:hiddenEffects xmlns:a14="http://schemas.microsoft.com/office/drawing/2010/main">
+              <a14:hiddenEffects xmlns:a14="http://schemas.microsoft.com/office/drawing/2010/main" xmlns="">
                 <a:effectLst>
                   <a:outerShdw blurRad="63500" dist="38099" dir="2700000" algn="ctr" rotWithShape="0">
                     <a:schemeClr val="bg2">
@@ -4053,7 +4092,7 @@
               </a14:hiddenEffects>
             </a:ext>
             <a:ext uri="{FAA26D3D-D897-4be2-8F04-BA451C77F1D7}">
-              <ma14:placeholderFlag xmlns:ma14="http://schemas.microsoft.com/office/mac/drawingml/2011/main" val="1"/>
+              <ma14:placeholderFlag xmlns:ma14="http://schemas.microsoft.com/office/mac/drawingml/2011/main" xmlns="" val="1"/>
             </a:ext>
           </a:extLst>
         </p:spPr>
@@ -4082,7 +4121,7 @@
             <a:fld id="{5C6DD839-2E5C-A142-A315-95906FA82491}" type="slidenum">
               <a:rPr lang="en-US"/>
               <a:pPr/>
-              <a:t>‹Nr.›</a:t>
+              <a:t>‹#›</a:t>
             </a:fld>
             <a:endParaRPr lang="en-US"/>
           </a:p>
@@ -4746,292 +4785,16 @@
           </a:p>
         </p:txBody>
       </p:sp>
-      <p:sp>
-        <p:nvSpPr>
-          <p:cNvPr id="3074" name="Text Box 2"/>
-          <p:cNvSpPr txBox="1">
-            <a:spLocks noChangeArrowheads="1"/>
-          </p:cNvSpPr>
-          <p:nvPr/>
-        </p:nvSpPr>
-        <p:spPr bwMode="auto">
-          <a:xfrm>
-            <a:off x="6530975" y="7150100"/>
-            <a:ext cx="3478213" cy="601663"/>
-          </a:xfrm>
-          <a:prstGeom prst="rect">
-            <a:avLst/>
-          </a:prstGeom>
-          <a:noFill/>
-          <a:ln>
-            <a:noFill/>
-          </a:ln>
-          <a:effectLst/>
-          <a:extLst>
-            <a:ext uri="{909E8E84-426E-40dd-AFC4-6F175D3DCCD1}">
-              <a14:hiddenFill xmlns:a14="http://schemas.microsoft.com/office/drawing/2010/main">
-                <a:solidFill>
-                  <a:srgbClr val="FFFFFF"/>
-                </a:solidFill>
-              </a14:hiddenFill>
-            </a:ext>
-            <a:ext uri="{91240B29-F687-4f45-9708-019B960494DF}">
-              <a14:hiddenLine xmlns:a14="http://schemas.microsoft.com/office/drawing/2010/main" w="9525">
-                <a:solidFill>
-                  <a:srgbClr val="000000"/>
-                </a:solidFill>
-                <a:round/>
-                <a:headEnd/>
-                <a:tailEnd/>
-              </a14:hiddenLine>
-            </a:ext>
-            <a:ext uri="{AF507438-7753-43e0-B8FC-AC1667EBCBE1}">
-              <a14:hiddenEffects xmlns:a14="http://schemas.microsoft.com/office/drawing/2010/main">
-                <a:effectLst>
-                  <a:outerShdw blurRad="63500" dist="38099" dir="2700000" algn="ctr" rotWithShape="0">
-                    <a:srgbClr val="000000">
-                      <a:alpha val="74998"/>
-                    </a:srgbClr>
-                  </a:outerShdw>
-                </a:effectLst>
-              </a14:hiddenEffects>
-            </a:ext>
-          </a:extLst>
-        </p:spPr>
-        <p:txBody>
-          <a:bodyPr lIns="90000" tIns="60876" rIns="90000" bIns="45000"/>
-          <a:lstStyle>
-            <a:lvl1pPr>
-              <a:tabLst>
-                <a:tab pos="723900" algn="l"/>
-                <a:tab pos="1447800" algn="l"/>
-                <a:tab pos="2171700" algn="l"/>
-                <a:tab pos="2895600" algn="l"/>
-              </a:tabLst>
-              <a:defRPr>
-                <a:solidFill>
-                  <a:srgbClr val="000000"/>
-                </a:solidFill>
-                <a:latin typeface="Arial" charset="0"/>
-                <a:ea typeface="宋体" charset="0"/>
-                <a:cs typeface="宋体" charset="0"/>
-              </a:defRPr>
-            </a:lvl1pPr>
-            <a:lvl2pPr>
-              <a:tabLst>
-                <a:tab pos="723900" algn="l"/>
-                <a:tab pos="1447800" algn="l"/>
-                <a:tab pos="2171700" algn="l"/>
-                <a:tab pos="2895600" algn="l"/>
-              </a:tabLst>
-              <a:defRPr>
-                <a:solidFill>
-                  <a:srgbClr val="000000"/>
-                </a:solidFill>
-                <a:latin typeface="Arial" charset="0"/>
-                <a:ea typeface="宋体" charset="0"/>
-                <a:cs typeface="宋体" charset="0"/>
-              </a:defRPr>
-            </a:lvl2pPr>
-            <a:lvl3pPr>
-              <a:tabLst>
-                <a:tab pos="723900" algn="l"/>
-                <a:tab pos="1447800" algn="l"/>
-                <a:tab pos="2171700" algn="l"/>
-                <a:tab pos="2895600" algn="l"/>
-              </a:tabLst>
-              <a:defRPr>
-                <a:solidFill>
-                  <a:srgbClr val="000000"/>
-                </a:solidFill>
-                <a:latin typeface="Arial" charset="0"/>
-                <a:ea typeface="宋体" charset="0"/>
-                <a:cs typeface="宋体" charset="0"/>
-              </a:defRPr>
-            </a:lvl3pPr>
-            <a:lvl4pPr>
-              <a:tabLst>
-                <a:tab pos="723900" algn="l"/>
-                <a:tab pos="1447800" algn="l"/>
-                <a:tab pos="2171700" algn="l"/>
-                <a:tab pos="2895600" algn="l"/>
-              </a:tabLst>
-              <a:defRPr>
-                <a:solidFill>
-                  <a:srgbClr val="000000"/>
-                </a:solidFill>
-                <a:latin typeface="Arial" charset="0"/>
-                <a:ea typeface="宋体" charset="0"/>
-                <a:cs typeface="宋体" charset="0"/>
-              </a:defRPr>
-            </a:lvl4pPr>
-            <a:lvl5pPr>
-              <a:tabLst>
-                <a:tab pos="723900" algn="l"/>
-                <a:tab pos="1447800" algn="l"/>
-                <a:tab pos="2171700" algn="l"/>
-                <a:tab pos="2895600" algn="l"/>
-              </a:tabLst>
-              <a:defRPr>
-                <a:solidFill>
-                  <a:srgbClr val="000000"/>
-                </a:solidFill>
-                <a:latin typeface="Arial" charset="0"/>
-                <a:ea typeface="宋体" charset="0"/>
-                <a:cs typeface="宋体" charset="0"/>
-              </a:defRPr>
-            </a:lvl5pPr>
-            <a:lvl6pPr marL="2514600" indent="-228600" defTabSz="449263" fontAlgn="base" hangingPunct="0">
-              <a:lnSpc>
-                <a:spcPct val="93000"/>
-              </a:lnSpc>
-              <a:spcBef>
-                <a:spcPct val="0"/>
-              </a:spcBef>
-              <a:spcAft>
-                <a:spcPct val="0"/>
-              </a:spcAft>
-              <a:buClr>
-                <a:srgbClr val="000000"/>
-              </a:buClr>
-              <a:buSzPct val="100000"/>
-              <a:buFont typeface="Times New Roman" charset="0"/>
-              <a:tabLst>
-                <a:tab pos="723900" algn="l"/>
-                <a:tab pos="1447800" algn="l"/>
-                <a:tab pos="2171700" algn="l"/>
-                <a:tab pos="2895600" algn="l"/>
-              </a:tabLst>
-              <a:defRPr>
-                <a:solidFill>
-                  <a:srgbClr val="000000"/>
-                </a:solidFill>
-                <a:latin typeface="Arial" charset="0"/>
-                <a:ea typeface="宋体" charset="0"/>
-                <a:cs typeface="宋体" charset="0"/>
-              </a:defRPr>
-            </a:lvl6pPr>
-            <a:lvl7pPr marL="2971800" indent="-228600" defTabSz="449263" fontAlgn="base" hangingPunct="0">
-              <a:lnSpc>
-                <a:spcPct val="93000"/>
-              </a:lnSpc>
-              <a:spcBef>
-                <a:spcPct val="0"/>
-              </a:spcBef>
-              <a:spcAft>
-                <a:spcPct val="0"/>
-              </a:spcAft>
-              <a:buClr>
-                <a:srgbClr val="000000"/>
-              </a:buClr>
-              <a:buSzPct val="100000"/>
-              <a:buFont typeface="Times New Roman" charset="0"/>
-              <a:tabLst>
-                <a:tab pos="723900" algn="l"/>
-                <a:tab pos="1447800" algn="l"/>
-                <a:tab pos="2171700" algn="l"/>
-                <a:tab pos="2895600" algn="l"/>
-              </a:tabLst>
-              <a:defRPr>
-                <a:solidFill>
-                  <a:srgbClr val="000000"/>
-                </a:solidFill>
-                <a:latin typeface="Arial" charset="0"/>
-                <a:ea typeface="宋体" charset="0"/>
-                <a:cs typeface="宋体" charset="0"/>
-              </a:defRPr>
-            </a:lvl7pPr>
-            <a:lvl8pPr marL="3429000" indent="-228600" defTabSz="449263" fontAlgn="base" hangingPunct="0">
-              <a:lnSpc>
-                <a:spcPct val="93000"/>
-              </a:lnSpc>
-              <a:spcBef>
-                <a:spcPct val="0"/>
-              </a:spcBef>
-              <a:spcAft>
-                <a:spcPct val="0"/>
-              </a:spcAft>
-              <a:buClr>
-                <a:srgbClr val="000000"/>
-              </a:buClr>
-              <a:buSzPct val="100000"/>
-              <a:buFont typeface="Times New Roman" charset="0"/>
-              <a:tabLst>
-                <a:tab pos="723900" algn="l"/>
-                <a:tab pos="1447800" algn="l"/>
-                <a:tab pos="2171700" algn="l"/>
-                <a:tab pos="2895600" algn="l"/>
-              </a:tabLst>
-              <a:defRPr>
-                <a:solidFill>
-                  <a:srgbClr val="000000"/>
-                </a:solidFill>
-                <a:latin typeface="Arial" charset="0"/>
-                <a:ea typeface="宋体" charset="0"/>
-                <a:cs typeface="宋体" charset="0"/>
-              </a:defRPr>
-            </a:lvl8pPr>
-            <a:lvl9pPr marL="3886200" indent="-228600" defTabSz="449263" fontAlgn="base" hangingPunct="0">
-              <a:lnSpc>
-                <a:spcPct val="93000"/>
-              </a:lnSpc>
-              <a:spcBef>
-                <a:spcPct val="0"/>
-              </a:spcBef>
-              <a:spcAft>
-                <a:spcPct val="0"/>
-              </a:spcAft>
-              <a:buClr>
-                <a:srgbClr val="000000"/>
-              </a:buClr>
-              <a:buSzPct val="100000"/>
-              <a:buFont typeface="Times New Roman" charset="0"/>
-              <a:tabLst>
-                <a:tab pos="723900" algn="l"/>
-                <a:tab pos="1447800" algn="l"/>
-                <a:tab pos="2171700" algn="l"/>
-                <a:tab pos="2895600" algn="l"/>
-              </a:tabLst>
-              <a:defRPr>
-                <a:solidFill>
-                  <a:srgbClr val="000000"/>
-                </a:solidFill>
-                <a:latin typeface="Arial" charset="0"/>
-                <a:ea typeface="宋体" charset="0"/>
-                <a:cs typeface="宋体" charset="0"/>
-              </a:defRPr>
-            </a:lvl9pPr>
-          </a:lstStyle>
-          <a:p>
-            <a:r>
-              <a:rPr lang="en-US"/>
-              <a:t>Powered by www.</a:t>
-            </a:r>
-            <a:r>
-              <a:rPr lang="en-US">
-                <a:solidFill>
-                  <a:srgbClr val="FF0000"/>
-                </a:solidFill>
-              </a:rPr>
-              <a:t>Red</a:t>
-            </a:r>
-            <a:r>
-              <a:rPr lang="en-US"/>
-              <a:t>Office.com</a:t>
-            </a:r>
-          </a:p>
-        </p:txBody>
-      </p:sp>
     </p:spTree>
   </p:cSld>
   <p:clrMapOvr>
     <a:masterClrMapping/>
   </p:clrMapOvr>
-  <p:transition xmlns:p14="http://schemas.microsoft.com/office/powerpoint/2010/main" spd="med"/>
+  <p:transition spd="med"/>
   <p:timing>
     <p:tnLst>
       <p:par>
-        <p:cTn xmlns:p14="http://schemas.microsoft.com/office/powerpoint/2010/main" id="1" dur="indefinite" restart="never" nodeType="tmRoot">
+        <p:cTn id="1" dur="indefinite" restart="never" nodeType="tmRoot">
           <p:childTnLst>
             <p:seq concurrent="1" nextAc="seek">
               <p:cTn id="2" dur="0" nodeType="mainSeq"/>
@@ -5077,7 +4840,7 @@
       </p:grpSpPr>
       <p:sp>
         <p:nvSpPr>
-          <p:cNvPr id="2" name="Titel 1"/>
+          <p:cNvPr id="2" name="Title 1"/>
           <p:cNvSpPr>
             <a:spLocks noGrp="1"/>
           </p:cNvSpPr>
@@ -5085,290 +4848,66 @@
             <p:ph type="title"/>
           </p:nvPr>
         </p:nvSpPr>
-        <p:spPr/>
+        <p:spPr>
+          <a:xfrm>
+            <a:off x="1727944" y="301625"/>
+            <a:ext cx="7844681" cy="1260475"/>
+          </a:xfrm>
+        </p:spPr>
         <p:txBody>
           <a:bodyPr/>
           <a:lstStyle/>
           <a:p>
             <a:r>
-              <a:rPr lang="de-DE" dirty="0" err="1" smtClean="0"/>
-              <a:t>Ressouren</a:t>
-            </a:r>
-            <a:endParaRPr lang="de-DE" dirty="0"/>
-          </a:p>
-        </p:txBody>
-      </p:sp>
-      <p:sp>
-        <p:nvSpPr>
-          <p:cNvPr id="6" name="Textfeld 5"/>
-          <p:cNvSpPr txBox="1"/>
-          <p:nvPr/>
+              <a:rPr lang="de-CH" dirty="0" smtClean="0"/>
+              <a:t>Idee</a:t>
+            </a:r>
+            <a:endParaRPr lang="de-CH" dirty="0"/>
+          </a:p>
+        </p:txBody>
+      </p:sp>
+      <p:sp>
+        <p:nvSpPr>
+          <p:cNvPr id="3" name="Content Placeholder 2"/>
+          <p:cNvSpPr>
+            <a:spLocks noGrp="1"/>
+          </p:cNvSpPr>
+          <p:nvPr>
+            <p:ph idx="1"/>
+          </p:nvPr>
         </p:nvSpPr>
         <p:spPr>
           <a:xfrm>
-            <a:off x="3044379" y="1847079"/>
-            <a:ext cx="4941076" cy="353174"/>
+            <a:off x="1727944" y="1768475"/>
+            <a:ext cx="7844681" cy="4987925"/>
           </a:xfrm>
-          <a:prstGeom prst="rect">
-            <a:avLst/>
-          </a:prstGeom>
-          <a:noFill/>
         </p:spPr>
         <p:txBody>
-          <a:bodyPr wrap="none" rtlCol="0">
-            <a:spAutoFit/>
-          </a:bodyPr>
+          <a:bodyPr/>
           <a:lstStyle/>
           <a:p>
-            <a:r>
-              <a:rPr lang="de-DE" dirty="0" smtClean="0"/>
-              <a:t>- Team bestehend aus 4 Informatikingenieuren</a:t>
-            </a:r>
-            <a:endParaRPr lang="de-DE" dirty="0"/>
-          </a:p>
-        </p:txBody>
-      </p:sp>
-      <p:sp>
-        <p:nvSpPr>
-          <p:cNvPr id="7" name="Textfeld 6"/>
-          <p:cNvSpPr txBox="1"/>
-          <p:nvPr/>
-        </p:nvSpPr>
-        <p:spPr>
-          <a:xfrm>
-            <a:off x="3051564" y="2202527"/>
-            <a:ext cx="1736924" cy="353174"/>
-          </a:xfrm>
-          <a:prstGeom prst="rect">
-            <a:avLst/>
-          </a:prstGeom>
-          <a:noFill/>
-        </p:spPr>
-        <p:txBody>
-          <a:bodyPr wrap="none" rtlCol="0">
-            <a:spAutoFit/>
-          </a:bodyPr>
-          <a:lstStyle/>
-          <a:p>
-            <a:r>
-              <a:rPr lang="de-DE" dirty="0" smtClean="0"/>
-              <a:t>- 1 Projektleiter</a:t>
-            </a:r>
-            <a:endParaRPr lang="de-DE" dirty="0"/>
-          </a:p>
-        </p:txBody>
-      </p:sp>
-      <p:sp>
-        <p:nvSpPr>
-          <p:cNvPr id="9" name="Textfeld 8"/>
-          <p:cNvSpPr txBox="1"/>
-          <p:nvPr/>
-        </p:nvSpPr>
-        <p:spPr>
-          <a:xfrm>
-            <a:off x="3051564" y="2562567"/>
-            <a:ext cx="1519053" cy="353174"/>
-          </a:xfrm>
-          <a:prstGeom prst="rect">
-            <a:avLst/>
-          </a:prstGeom>
-          <a:noFill/>
-        </p:spPr>
-        <p:txBody>
-          <a:bodyPr wrap="none" rtlCol="0">
-            <a:spAutoFit/>
-          </a:bodyPr>
-          <a:lstStyle/>
-          <a:p>
-            <a:r>
-              <a:rPr lang="de-DE" dirty="0" smtClean="0"/>
-              <a:t>- Fähigkeiten</a:t>
-            </a:r>
-          </a:p>
-        </p:txBody>
-      </p:sp>
-      <p:sp>
-        <p:nvSpPr>
-          <p:cNvPr id="10" name="Textfeld 9"/>
-          <p:cNvSpPr txBox="1"/>
-          <p:nvPr/>
-        </p:nvSpPr>
-        <p:spPr>
-          <a:xfrm>
-            <a:off x="4677027" y="2922607"/>
-            <a:ext cx="2326278" cy="353174"/>
-          </a:xfrm>
-          <a:prstGeom prst="rect">
-            <a:avLst/>
-          </a:prstGeom>
-          <a:noFill/>
-        </p:spPr>
-        <p:txBody>
-          <a:bodyPr wrap="none" rtlCol="0">
-            <a:spAutoFit/>
-          </a:bodyPr>
-          <a:lstStyle/>
-          <a:p>
-            <a:pPr marL="285750" indent="-285750">
-              <a:buFontTx/>
-              <a:buChar char="-"/>
+            <a:pPr marL="457200" indent="-457200">
+              <a:buFont typeface="Arial" panose="020B0604020202020204" pitchFamily="34" charset="0"/>
+              <a:buChar char="•"/>
             </a:pPr>
             <a:r>
-              <a:rPr lang="de-DE" dirty="0" smtClean="0"/>
-              <a:t>Systemarchitektur</a:t>
-            </a:r>
-          </a:p>
-        </p:txBody>
-      </p:sp>
-      <p:sp>
-        <p:nvSpPr>
-          <p:cNvPr id="11" name="Textfeld 10"/>
-          <p:cNvSpPr txBox="1"/>
-          <p:nvPr/>
-        </p:nvSpPr>
-        <p:spPr>
-          <a:xfrm>
-            <a:off x="4680272" y="3282647"/>
-            <a:ext cx="3942105" cy="353174"/>
-          </a:xfrm>
-          <a:prstGeom prst="rect">
-            <a:avLst/>
-          </a:prstGeom>
-          <a:noFill/>
-        </p:spPr>
-        <p:txBody>
-          <a:bodyPr wrap="none" rtlCol="0">
-            <a:spAutoFit/>
-          </a:bodyPr>
-          <a:lstStyle/>
-          <a:p>
-            <a:pPr marL="285750" indent="-285750">
-              <a:buFontTx/>
-              <a:buChar char="-"/>
-            </a:pPr>
-            <a:r>
-              <a:rPr lang="de-DE" dirty="0" smtClean="0"/>
-              <a:t>Objektorientierte Programmierung</a:t>
-            </a:r>
-          </a:p>
-        </p:txBody>
-      </p:sp>
-      <p:sp>
-        <p:nvSpPr>
-          <p:cNvPr id="12" name="Textfeld 11"/>
-          <p:cNvSpPr txBox="1"/>
-          <p:nvPr/>
-        </p:nvSpPr>
-        <p:spPr>
-          <a:xfrm>
-            <a:off x="4680272" y="3642687"/>
-            <a:ext cx="3057247" cy="353174"/>
-          </a:xfrm>
-          <a:prstGeom prst="rect">
-            <a:avLst/>
-          </a:prstGeom>
-          <a:noFill/>
-        </p:spPr>
-        <p:txBody>
-          <a:bodyPr wrap="none" rtlCol="0">
-            <a:spAutoFit/>
-          </a:bodyPr>
-          <a:lstStyle/>
-          <a:p>
-            <a:pPr marL="285750" indent="-285750">
-              <a:buFontTx/>
-              <a:buChar char="-"/>
-            </a:pPr>
-            <a:r>
-              <a:rPr lang="de-DE" dirty="0" smtClean="0"/>
-              <a:t>Objektorientiertes Design</a:t>
-            </a:r>
-          </a:p>
-        </p:txBody>
-      </p:sp>
-      <p:sp>
-        <p:nvSpPr>
-          <p:cNvPr id="13" name="Textfeld 12"/>
-          <p:cNvSpPr txBox="1"/>
-          <p:nvPr/>
-        </p:nvSpPr>
-        <p:spPr>
-          <a:xfrm>
-            <a:off x="3096096" y="4074735"/>
-            <a:ext cx="5047588" cy="353174"/>
-          </a:xfrm>
-          <a:prstGeom prst="rect">
-            <a:avLst/>
-          </a:prstGeom>
-          <a:noFill/>
-        </p:spPr>
-        <p:txBody>
-          <a:bodyPr wrap="none" rtlCol="0">
-            <a:spAutoFit/>
-          </a:bodyPr>
-          <a:lstStyle/>
-          <a:p>
-            <a:r>
-              <a:rPr lang="de-DE" dirty="0" smtClean="0"/>
-              <a:t>- Wissen zur Entwicklung von Spielen aneignen</a:t>
-            </a:r>
-          </a:p>
-        </p:txBody>
-      </p:sp>
-      <p:sp>
-        <p:nvSpPr>
-          <p:cNvPr id="14" name="Textfeld 13"/>
-          <p:cNvSpPr txBox="1"/>
-          <p:nvPr/>
-        </p:nvSpPr>
-        <p:spPr>
-          <a:xfrm>
-            <a:off x="3096096" y="4434775"/>
-            <a:ext cx="4701565" cy="353174"/>
-          </a:xfrm>
-          <a:prstGeom prst="rect">
-            <a:avLst/>
-          </a:prstGeom>
-          <a:noFill/>
-        </p:spPr>
-        <p:txBody>
-          <a:bodyPr wrap="none" rtlCol="0">
-            <a:spAutoFit/>
-          </a:bodyPr>
-          <a:lstStyle/>
-          <a:p>
-            <a:r>
-              <a:rPr lang="de-DE" dirty="0" smtClean="0"/>
-              <a:t>- Gesamtaufwand ca. 250 Personenstunden</a:t>
-            </a:r>
+              <a:rPr lang="de-CH" dirty="0" smtClean="0"/>
+              <a:t>Namen</a:t>
+            </a:r>
+            <a:endParaRPr lang="de-CH" dirty="0"/>
           </a:p>
         </p:txBody>
       </p:sp>
     </p:spTree>
     <p:extLst>
       <p:ext uri="{BB962C8B-B14F-4D97-AF65-F5344CB8AC3E}">
-        <p14:creationId xmlns:p14="http://schemas.microsoft.com/office/powerpoint/2010/main" val="2876731778"/>
+        <p14:creationId xmlns:p14="http://schemas.microsoft.com/office/powerpoint/2010/main" val="2436569743"/>
       </p:ext>
     </p:extLst>
   </p:cSld>
   <p:clrMapOvr>
     <a:masterClrMapping/>
   </p:clrMapOvr>
-  <mc:AlternateContent xmlns:mc="http://schemas.openxmlformats.org/markup-compatibility/2006">
-    <mc:Choice xmlns:p14="http://schemas.microsoft.com/office/powerpoint/2010/main" Requires="p14">
-      <p:transition spd="slow" p14:dur="2000"/>
-    </mc:Choice>
-    <mc:Fallback>
-      <p:transition xmlns:p14="http://schemas.microsoft.com/office/powerpoint/2010/main" spd="slow"/>
-    </mc:Fallback>
-  </mc:AlternateContent>
-  <p:timing>
-    <p:tnLst>
-      <p:par>
-        <p:cTn xmlns:p14="http://schemas.microsoft.com/office/powerpoint/2010/main" id="1" dur="indefinite" restart="never" nodeType="tmRoot"/>
-      </p:par>
-    </p:tnLst>
-  </p:timing>
 </p:sld>
 </file>
 
@@ -5391,7 +4930,7 @@
       </p:grpSpPr>
       <p:sp>
         <p:nvSpPr>
-          <p:cNvPr id="2" name="Titel 1"/>
+          <p:cNvPr id="2" name="Title 1"/>
           <p:cNvSpPr>
             <a:spLocks noGrp="1"/>
           </p:cNvSpPr>
@@ -5399,116 +4938,71 @@
             <p:ph type="title"/>
           </p:nvPr>
         </p:nvSpPr>
-        <p:spPr/>
+        <p:spPr>
+          <a:xfrm>
+            <a:off x="1727944" y="301625"/>
+            <a:ext cx="7844681" cy="1260475"/>
+          </a:xfrm>
+        </p:spPr>
         <p:txBody>
           <a:bodyPr/>
           <a:lstStyle/>
           <a:p>
             <a:r>
-              <a:rPr lang="de-DE" dirty="0" smtClean="0"/>
-              <a:t>Risiken</a:t>
-            </a:r>
-            <a:endParaRPr lang="de-DE" dirty="0"/>
-          </a:p>
-        </p:txBody>
-      </p:sp>
-      <p:sp>
-        <p:nvSpPr>
-          <p:cNvPr id="6" name="Textfeld 5"/>
-          <p:cNvSpPr txBox="1"/>
-          <p:nvPr/>
-        </p:nvSpPr>
+              <a:rPr lang="de-CH" dirty="0" smtClean="0"/>
+              <a:t>Hauptanwendungsfall</a:t>
+            </a:r>
+            <a:endParaRPr lang="de-CH" dirty="0"/>
+          </a:p>
+        </p:txBody>
+      </p:sp>
+      <p:pic>
+        <p:nvPicPr>
+          <p:cNvPr id="4" name="Content Placeholder 3"/>
+          <p:cNvPicPr>
+            <a:picLocks noGrp="1"/>
+          </p:cNvPicPr>
+          <p:nvPr>
+            <p:ph idx="1"/>
+          </p:nvPr>
+        </p:nvPicPr>
+        <p:blipFill>
+          <a:blip r:embed="rId2">
+            <a:clrChange>
+              <a:clrFrom>
+                <a:srgbClr val="FFFFFF"/>
+              </a:clrFrom>
+              <a:clrTo>
+                <a:srgbClr val="FFFFFF">
+                  <a:alpha val="0"/>
+                </a:srgbClr>
+              </a:clrTo>
+            </a:clrChange>
+          </a:blip>
+          <a:stretch>
+            <a:fillRect/>
+          </a:stretch>
+        </p:blipFill>
         <p:spPr>
           <a:xfrm>
-            <a:off x="3044379" y="1847079"/>
-            <a:ext cx="5098534" cy="353174"/>
+            <a:off x="2231999" y="1562100"/>
+            <a:ext cx="7340625" cy="5458097"/>
           </a:xfrm>
           <a:prstGeom prst="rect">
             <a:avLst/>
           </a:prstGeom>
-          <a:noFill/>
         </p:spPr>
-        <p:txBody>
-          <a:bodyPr wrap="none" rtlCol="0">
-            <a:spAutoFit/>
-          </a:bodyPr>
-          <a:lstStyle/>
-          <a:p>
-            <a:pPr lvl="0"/>
-            <a:r>
-              <a:rPr lang="de-DE" dirty="0" smtClean="0"/>
-              <a:t>- </a:t>
-            </a:r>
-            <a:r>
-              <a:rPr lang="de-DE" dirty="0"/>
-              <a:t>Fehlende Erfahrung in Game-Programmierung</a:t>
-            </a:r>
-          </a:p>
-        </p:txBody>
-      </p:sp>
-      <p:sp>
-        <p:nvSpPr>
-          <p:cNvPr id="7" name="Textfeld 6"/>
-          <p:cNvSpPr txBox="1"/>
-          <p:nvPr/>
-        </p:nvSpPr>
-        <p:spPr>
-          <a:xfrm>
-            <a:off x="3051564" y="2202527"/>
-            <a:ext cx="5688915" cy="353174"/>
-          </a:xfrm>
-          <a:prstGeom prst="rect">
-            <a:avLst/>
-          </a:prstGeom>
-          <a:noFill/>
-        </p:spPr>
-        <p:txBody>
-          <a:bodyPr wrap="none" rtlCol="0">
-            <a:spAutoFit/>
-          </a:bodyPr>
-          <a:lstStyle/>
-          <a:p>
-            <a:pPr lvl="0"/>
-            <a:r>
-              <a:rPr lang="de-DE" dirty="0" smtClean="0"/>
-              <a:t>- </a:t>
-            </a:r>
-            <a:r>
-              <a:rPr lang="de-DE" dirty="0" err="1"/>
-              <a:t>Grosser</a:t>
-            </a:r>
-            <a:r>
-              <a:rPr lang="de-DE" dirty="0"/>
-              <a:t> Umfang für die zur Verfügung stehende Zeit</a:t>
-            </a:r>
-          </a:p>
-        </p:txBody>
-      </p:sp>
+      </p:pic>
     </p:spTree>
     <p:extLst>
       <p:ext uri="{BB962C8B-B14F-4D97-AF65-F5344CB8AC3E}">
-        <p14:creationId xmlns:p14="http://schemas.microsoft.com/office/powerpoint/2010/main" val="1010235464"/>
+        <p14:creationId xmlns:p14="http://schemas.microsoft.com/office/powerpoint/2010/main" val="3428895994"/>
       </p:ext>
     </p:extLst>
   </p:cSld>
   <p:clrMapOvr>
     <a:masterClrMapping/>
   </p:clrMapOvr>
-  <mc:AlternateContent xmlns:mc="http://schemas.openxmlformats.org/markup-compatibility/2006">
-    <mc:Choice xmlns:p14="http://schemas.microsoft.com/office/powerpoint/2010/main" Requires="p14">
-      <p:transition spd="slow" p14:dur="2000"/>
-    </mc:Choice>
-    <mc:Fallback>
-      <p:transition xmlns:p14="http://schemas.microsoft.com/office/powerpoint/2010/main" spd="slow"/>
-    </mc:Fallback>
-  </mc:AlternateContent>
-  <p:timing>
-    <p:tnLst>
-      <p:par>
-        <p:cTn xmlns:p14="http://schemas.microsoft.com/office/powerpoint/2010/main" id="1" dur="indefinite" restart="never" nodeType="tmRoot"/>
-      </p:par>
-    </p:tnLst>
-  </p:timing>
 </p:sld>
 </file>
 
@@ -5531,7 +5025,7 @@
       </p:grpSpPr>
       <p:sp>
         <p:nvSpPr>
-          <p:cNvPr id="2" name="Titel 1"/>
+          <p:cNvPr id="2" name="Title 1"/>
           <p:cNvSpPr>
             <a:spLocks noGrp="1"/>
           </p:cNvSpPr>
@@ -5539,163 +5033,62 @@
             <p:ph type="title"/>
           </p:nvPr>
         </p:nvSpPr>
-        <p:spPr/>
+        <p:spPr>
+          <a:xfrm>
+            <a:off x="1727944" y="301625"/>
+            <a:ext cx="7844681" cy="1260475"/>
+          </a:xfrm>
+        </p:spPr>
         <p:txBody>
           <a:bodyPr/>
           <a:lstStyle/>
           <a:p>
             <a:r>
-              <a:rPr lang="de-DE" dirty="0" smtClean="0"/>
-              <a:t>Grobplanung</a:t>
-            </a:r>
-            <a:endParaRPr lang="de-DE" dirty="0"/>
-          </a:p>
-        </p:txBody>
-      </p:sp>
-      <p:sp>
-        <p:nvSpPr>
-          <p:cNvPr id="6" name="Textfeld 5"/>
-          <p:cNvSpPr txBox="1"/>
-          <p:nvPr/>
+              <a:rPr lang="de-CH" dirty="0" smtClean="0"/>
+              <a:t>Weitere Anforderungen</a:t>
+            </a:r>
+            <a:endParaRPr lang="de-CH" dirty="0"/>
+          </a:p>
+        </p:txBody>
+      </p:sp>
+      <p:sp>
+        <p:nvSpPr>
+          <p:cNvPr id="3" name="Content Placeholder 2"/>
+          <p:cNvSpPr>
+            <a:spLocks noGrp="1"/>
+          </p:cNvSpPr>
+          <p:nvPr>
+            <p:ph idx="1"/>
+          </p:nvPr>
         </p:nvSpPr>
         <p:spPr>
           <a:xfrm>
-            <a:off x="3044379" y="1847079"/>
-            <a:ext cx="4286112" cy="353174"/>
+            <a:off x="1727944" y="1768475"/>
+            <a:ext cx="7844681" cy="4987925"/>
           </a:xfrm>
-          <a:prstGeom prst="rect">
-            <a:avLst/>
-          </a:prstGeom>
-          <a:noFill/>
         </p:spPr>
         <p:txBody>
-          <a:bodyPr wrap="none" rtlCol="0">
-            <a:spAutoFit/>
-          </a:bodyPr>
+          <a:bodyPr/>
           <a:lstStyle/>
           <a:p>
-            <a:pPr lvl="0"/>
-            <a:r>
-              <a:rPr lang="de-DE" dirty="0" smtClean="0"/>
-              <a:t>- Gesamtdauer des Projekts 14 Wochen</a:t>
-            </a:r>
-            <a:endParaRPr lang="de-DE" dirty="0"/>
-          </a:p>
-        </p:txBody>
-      </p:sp>
-      <p:sp>
-        <p:nvSpPr>
-          <p:cNvPr id="7" name="Textfeld 6"/>
-          <p:cNvSpPr txBox="1"/>
-          <p:nvPr/>
-        </p:nvSpPr>
-        <p:spPr>
-          <a:xfrm>
-            <a:off x="3051564" y="2202527"/>
-            <a:ext cx="3657634" cy="353174"/>
-          </a:xfrm>
-          <a:prstGeom prst="rect">
-            <a:avLst/>
-          </a:prstGeom>
-          <a:noFill/>
-        </p:spPr>
-        <p:txBody>
-          <a:bodyPr wrap="none" rtlCol="0">
-            <a:spAutoFit/>
-          </a:bodyPr>
-          <a:lstStyle/>
-          <a:p>
-            <a:pPr lvl="0"/>
-            <a:r>
-              <a:rPr lang="de-DE" dirty="0" smtClean="0"/>
-              <a:t>- Iterationsdauer von einer Woche</a:t>
-            </a:r>
-            <a:endParaRPr lang="de-DE" dirty="0"/>
-          </a:p>
-        </p:txBody>
-      </p:sp>
-      <p:graphicFrame>
-        <p:nvGraphicFramePr>
-          <p:cNvPr id="3" name="Objekt 2"/>
-          <p:cNvGraphicFramePr>
-            <a:graphicFrameLocks noChangeAspect="1"/>
-          </p:cNvGraphicFramePr>
-          <p:nvPr>
-            <p:extLst>
-              <p:ext uri="{D42A27DB-BD31-4B8C-83A1-F6EECF244321}">
-                <p14:modId xmlns:p14="http://schemas.microsoft.com/office/powerpoint/2010/main" val="2376220250"/>
-              </p:ext>
-            </p:extLst>
-          </p:nvPr>
-        </p:nvGraphicFramePr>
-        <p:xfrm>
-          <a:off x="2056703" y="2627709"/>
-          <a:ext cx="7736137" cy="4774777"/>
-        </p:xfrm>
-        <a:graphic>
-          <a:graphicData uri="http://schemas.openxmlformats.org/presentationml/2006/ole">
-            <mc:AlternateContent xmlns:mc="http://schemas.openxmlformats.org/markup-compatibility/2006">
-              <mc:Choice xmlns:v="urn:schemas-microsoft-com:vml" Requires="v">
-                <p:oleObj spid="_x0000_s1025" name="Dokument" r:id="rId3" imgW="5905500" imgH="3644900" progId="Word.Document.12">
-                  <p:embed/>
-                </p:oleObj>
-              </mc:Choice>
-              <mc:Fallback>
-                <p:oleObj name="Dokument" r:id="rId3" imgW="5905500" imgH="3644900" progId="Word.Document.12">
-                  <p:embed/>
-                  <p:pic>
-                    <p:nvPicPr>
-                      <p:cNvPr id="0" name=""/>
-                      <p:cNvPicPr/>
-                      <p:nvPr/>
-                    </p:nvPicPr>
-                    <p:blipFill>
-                      <a:blip r:embed="rId4"/>
-                      <a:stretch>
-                        <a:fillRect/>
-                      </a:stretch>
-                    </p:blipFill>
-                    <p:spPr>
-                      <a:xfrm>
-                        <a:off x="2056703" y="2627709"/>
-                        <a:ext cx="7736137" cy="4774777"/>
-                      </a:xfrm>
-                      <a:prstGeom prst="rect">
-                        <a:avLst/>
-                      </a:prstGeom>
-                    </p:spPr>
-                  </p:pic>
-                </p:oleObj>
-              </mc:Fallback>
-            </mc:AlternateContent>
-          </a:graphicData>
-        </a:graphic>
-      </p:graphicFrame>
+            <a:pPr marL="457200" indent="-457200">
+              <a:buFont typeface="Arial" panose="020B0604020202020204" pitchFamily="34" charset="0"/>
+              <a:buChar char="•"/>
+            </a:pPr>
+            <a:endParaRPr lang="de-CH" dirty="0"/>
+          </a:p>
+        </p:txBody>
+      </p:sp>
     </p:spTree>
     <p:extLst>
       <p:ext uri="{BB962C8B-B14F-4D97-AF65-F5344CB8AC3E}">
-        <p14:creationId xmlns:p14="http://schemas.microsoft.com/office/powerpoint/2010/main" val="4126107018"/>
+        <p14:creationId xmlns:p14="http://schemas.microsoft.com/office/powerpoint/2010/main" val="213647772"/>
       </p:ext>
     </p:extLst>
   </p:cSld>
   <p:clrMapOvr>
     <a:masterClrMapping/>
   </p:clrMapOvr>
-  <mc:AlternateContent xmlns:mc="http://schemas.openxmlformats.org/markup-compatibility/2006">
-    <mc:Choice xmlns:p14="http://schemas.microsoft.com/office/powerpoint/2010/main" Requires="p14">
-      <p:transition spd="slow" p14:dur="2000"/>
-    </mc:Choice>
-    <mc:Fallback>
-      <p:transition xmlns:p14="http://schemas.microsoft.com/office/powerpoint/2010/main" spd="slow"/>
-    </mc:Fallback>
-  </mc:AlternateContent>
-  <p:timing>
-    <p:tnLst>
-      <p:par>
-        <p:cTn xmlns:p14="http://schemas.microsoft.com/office/powerpoint/2010/main" id="1" dur="indefinite" restart="never" nodeType="tmRoot"/>
-      </p:par>
-    </p:tnLst>
-  </p:timing>
 </p:sld>
 </file>
 
@@ -5732,6 +5125,1743 @@
           <a:lstStyle/>
           <a:p>
             <a:r>
+              <a:rPr lang="de-DE" dirty="0" err="1" smtClean="0"/>
+              <a:t>Ressouren</a:t>
+            </a:r>
+            <a:endParaRPr lang="de-DE" dirty="0"/>
+          </a:p>
+        </p:txBody>
+      </p:sp>
+      <p:sp>
+        <p:nvSpPr>
+          <p:cNvPr id="6" name="Textfeld 5"/>
+          <p:cNvSpPr txBox="1"/>
+          <p:nvPr/>
+        </p:nvSpPr>
+        <p:spPr>
+          <a:xfrm>
+            <a:off x="3044379" y="1847079"/>
+            <a:ext cx="4941076" cy="353174"/>
+          </a:xfrm>
+          <a:prstGeom prst="rect">
+            <a:avLst/>
+          </a:prstGeom>
+          <a:noFill/>
+        </p:spPr>
+        <p:txBody>
+          <a:bodyPr wrap="none" rtlCol="0">
+            <a:spAutoFit/>
+          </a:bodyPr>
+          <a:lstStyle/>
+          <a:p>
+            <a:r>
+              <a:rPr lang="de-DE" dirty="0" smtClean="0"/>
+              <a:t>- Team bestehend aus 4 Informatikingenieuren</a:t>
+            </a:r>
+            <a:endParaRPr lang="de-DE" dirty="0"/>
+          </a:p>
+        </p:txBody>
+      </p:sp>
+      <p:sp>
+        <p:nvSpPr>
+          <p:cNvPr id="7" name="Textfeld 6"/>
+          <p:cNvSpPr txBox="1"/>
+          <p:nvPr/>
+        </p:nvSpPr>
+        <p:spPr>
+          <a:xfrm>
+            <a:off x="3051564" y="2202527"/>
+            <a:ext cx="1736924" cy="353174"/>
+          </a:xfrm>
+          <a:prstGeom prst="rect">
+            <a:avLst/>
+          </a:prstGeom>
+          <a:noFill/>
+        </p:spPr>
+        <p:txBody>
+          <a:bodyPr wrap="none" rtlCol="0">
+            <a:spAutoFit/>
+          </a:bodyPr>
+          <a:lstStyle/>
+          <a:p>
+            <a:r>
+              <a:rPr lang="de-DE" dirty="0" smtClean="0"/>
+              <a:t>- 1 Projektleiter</a:t>
+            </a:r>
+            <a:endParaRPr lang="de-DE" dirty="0"/>
+          </a:p>
+        </p:txBody>
+      </p:sp>
+      <p:sp>
+        <p:nvSpPr>
+          <p:cNvPr id="9" name="Textfeld 8"/>
+          <p:cNvSpPr txBox="1"/>
+          <p:nvPr/>
+        </p:nvSpPr>
+        <p:spPr>
+          <a:xfrm>
+            <a:off x="3051564" y="2562567"/>
+            <a:ext cx="1519053" cy="353174"/>
+          </a:xfrm>
+          <a:prstGeom prst="rect">
+            <a:avLst/>
+          </a:prstGeom>
+          <a:noFill/>
+        </p:spPr>
+        <p:txBody>
+          <a:bodyPr wrap="none" rtlCol="0">
+            <a:spAutoFit/>
+          </a:bodyPr>
+          <a:lstStyle/>
+          <a:p>
+            <a:r>
+              <a:rPr lang="de-DE" dirty="0" smtClean="0"/>
+              <a:t>- Fähigkeiten</a:t>
+            </a:r>
+          </a:p>
+        </p:txBody>
+      </p:sp>
+      <p:sp>
+        <p:nvSpPr>
+          <p:cNvPr id="10" name="Textfeld 9"/>
+          <p:cNvSpPr txBox="1"/>
+          <p:nvPr/>
+        </p:nvSpPr>
+        <p:spPr>
+          <a:xfrm>
+            <a:off x="4677027" y="2922607"/>
+            <a:ext cx="2326278" cy="353174"/>
+          </a:xfrm>
+          <a:prstGeom prst="rect">
+            <a:avLst/>
+          </a:prstGeom>
+          <a:noFill/>
+        </p:spPr>
+        <p:txBody>
+          <a:bodyPr wrap="none" rtlCol="0">
+            <a:spAutoFit/>
+          </a:bodyPr>
+          <a:lstStyle/>
+          <a:p>
+            <a:pPr marL="285750" indent="-285750">
+              <a:buFontTx/>
+              <a:buChar char="-"/>
+            </a:pPr>
+            <a:r>
+              <a:rPr lang="de-DE" dirty="0" smtClean="0"/>
+              <a:t>Systemarchitektur</a:t>
+            </a:r>
+          </a:p>
+        </p:txBody>
+      </p:sp>
+      <p:sp>
+        <p:nvSpPr>
+          <p:cNvPr id="11" name="Textfeld 10"/>
+          <p:cNvSpPr txBox="1"/>
+          <p:nvPr/>
+        </p:nvSpPr>
+        <p:spPr>
+          <a:xfrm>
+            <a:off x="4680272" y="3282647"/>
+            <a:ext cx="3942105" cy="353174"/>
+          </a:xfrm>
+          <a:prstGeom prst="rect">
+            <a:avLst/>
+          </a:prstGeom>
+          <a:noFill/>
+        </p:spPr>
+        <p:txBody>
+          <a:bodyPr wrap="none" rtlCol="0">
+            <a:spAutoFit/>
+          </a:bodyPr>
+          <a:lstStyle/>
+          <a:p>
+            <a:pPr marL="285750" indent="-285750">
+              <a:buFontTx/>
+              <a:buChar char="-"/>
+            </a:pPr>
+            <a:r>
+              <a:rPr lang="de-DE" dirty="0" smtClean="0"/>
+              <a:t>Objektorientierte Programmierung</a:t>
+            </a:r>
+          </a:p>
+        </p:txBody>
+      </p:sp>
+      <p:sp>
+        <p:nvSpPr>
+          <p:cNvPr id="12" name="Textfeld 11"/>
+          <p:cNvSpPr txBox="1"/>
+          <p:nvPr/>
+        </p:nvSpPr>
+        <p:spPr>
+          <a:xfrm>
+            <a:off x="4680272" y="3642687"/>
+            <a:ext cx="3057247" cy="353174"/>
+          </a:xfrm>
+          <a:prstGeom prst="rect">
+            <a:avLst/>
+          </a:prstGeom>
+          <a:noFill/>
+        </p:spPr>
+        <p:txBody>
+          <a:bodyPr wrap="none" rtlCol="0">
+            <a:spAutoFit/>
+          </a:bodyPr>
+          <a:lstStyle/>
+          <a:p>
+            <a:pPr marL="285750" indent="-285750">
+              <a:buFontTx/>
+              <a:buChar char="-"/>
+            </a:pPr>
+            <a:r>
+              <a:rPr lang="de-DE" dirty="0" smtClean="0"/>
+              <a:t>Objektorientiertes Design</a:t>
+            </a:r>
+          </a:p>
+        </p:txBody>
+      </p:sp>
+      <p:sp>
+        <p:nvSpPr>
+          <p:cNvPr id="13" name="Textfeld 12"/>
+          <p:cNvSpPr txBox="1"/>
+          <p:nvPr/>
+        </p:nvSpPr>
+        <p:spPr>
+          <a:xfrm>
+            <a:off x="3096096" y="4074735"/>
+            <a:ext cx="5047588" cy="353174"/>
+          </a:xfrm>
+          <a:prstGeom prst="rect">
+            <a:avLst/>
+          </a:prstGeom>
+          <a:noFill/>
+        </p:spPr>
+        <p:txBody>
+          <a:bodyPr wrap="none" rtlCol="0">
+            <a:spAutoFit/>
+          </a:bodyPr>
+          <a:lstStyle/>
+          <a:p>
+            <a:r>
+              <a:rPr lang="de-DE" dirty="0" smtClean="0"/>
+              <a:t>- Wissen zur Entwicklung von Spielen aneignen</a:t>
+            </a:r>
+          </a:p>
+        </p:txBody>
+      </p:sp>
+      <p:sp>
+        <p:nvSpPr>
+          <p:cNvPr id="14" name="Textfeld 13"/>
+          <p:cNvSpPr txBox="1"/>
+          <p:nvPr/>
+        </p:nvSpPr>
+        <p:spPr>
+          <a:xfrm>
+            <a:off x="3096096" y="4434775"/>
+            <a:ext cx="4701565" cy="353174"/>
+          </a:xfrm>
+          <a:prstGeom prst="rect">
+            <a:avLst/>
+          </a:prstGeom>
+          <a:noFill/>
+        </p:spPr>
+        <p:txBody>
+          <a:bodyPr wrap="none" rtlCol="0">
+            <a:spAutoFit/>
+          </a:bodyPr>
+          <a:lstStyle/>
+          <a:p>
+            <a:r>
+              <a:rPr lang="de-DE" dirty="0" smtClean="0"/>
+              <a:t>- Gesamtaufwand ca. 250 Personenstunden</a:t>
+            </a:r>
+          </a:p>
+        </p:txBody>
+      </p:sp>
+    </p:spTree>
+    <p:extLst>
+      <p:ext uri="{BB962C8B-B14F-4D97-AF65-F5344CB8AC3E}">
+        <p14:creationId xmlns:p14="http://schemas.microsoft.com/office/powerpoint/2010/main" val="2876731778"/>
+      </p:ext>
+    </p:extLst>
+  </p:cSld>
+  <p:clrMapOvr>
+    <a:masterClrMapping/>
+  </p:clrMapOvr>
+  <mc:AlternateContent xmlns:mc="http://schemas.openxmlformats.org/markup-compatibility/2006" xmlns:p14="http://schemas.microsoft.com/office/powerpoint/2010/main">
+    <mc:Choice Requires="p14">
+      <p:transition spd="slow" p14:dur="2000"/>
+    </mc:Choice>
+    <mc:Fallback xmlns="">
+      <p:transition xmlns:p14="http://schemas.microsoft.com/office/powerpoint/2010/main" spd="slow"/>
+    </mc:Fallback>
+  </mc:AlternateContent>
+  <p:timing>
+    <p:tnLst>
+      <p:par>
+        <p:cTn id="1" dur="indefinite" restart="never" nodeType="tmRoot"/>
+      </p:par>
+    </p:tnLst>
+  </p:timing>
+</p:sld>
+</file>
+
+<file path=ppt/slides/slide6.xml><?xml version="1.0" encoding="utf-8"?>
+<p:sld xmlns:a="http://schemas.openxmlformats.org/drawingml/2006/main" xmlns:r="http://schemas.openxmlformats.org/officeDocument/2006/relationships" xmlns:p="http://schemas.openxmlformats.org/presentationml/2006/main">
+  <p:cSld>
+    <p:spTree>
+      <p:nvGrpSpPr>
+        <p:cNvPr id="1" name=""/>
+        <p:cNvGrpSpPr/>
+        <p:nvPr/>
+      </p:nvGrpSpPr>
+      <p:grpSpPr>
+        <a:xfrm>
+          <a:off x="0" y="0"/>
+          <a:ext cx="0" cy="0"/>
+          <a:chOff x="0" y="0"/>
+          <a:chExt cx="0" cy="0"/>
+        </a:xfrm>
+      </p:grpSpPr>
+      <p:sp>
+        <p:nvSpPr>
+          <p:cNvPr id="2" name="Titel 1"/>
+          <p:cNvSpPr>
+            <a:spLocks noGrp="1"/>
+          </p:cNvSpPr>
+          <p:nvPr>
+            <p:ph type="title"/>
+          </p:nvPr>
+        </p:nvSpPr>
+        <p:spPr/>
+        <p:txBody>
+          <a:bodyPr/>
+          <a:lstStyle/>
+          <a:p>
+            <a:r>
+              <a:rPr lang="de-DE" dirty="0" smtClean="0"/>
+              <a:t>Risiken</a:t>
+            </a:r>
+            <a:endParaRPr lang="de-DE" dirty="0"/>
+          </a:p>
+        </p:txBody>
+      </p:sp>
+      <p:sp>
+        <p:nvSpPr>
+          <p:cNvPr id="6" name="Textfeld 5"/>
+          <p:cNvSpPr txBox="1"/>
+          <p:nvPr/>
+        </p:nvSpPr>
+        <p:spPr>
+          <a:xfrm>
+            <a:off x="3044379" y="1847079"/>
+            <a:ext cx="5098534" cy="353174"/>
+          </a:xfrm>
+          <a:prstGeom prst="rect">
+            <a:avLst/>
+          </a:prstGeom>
+          <a:noFill/>
+        </p:spPr>
+        <p:txBody>
+          <a:bodyPr wrap="none" rtlCol="0">
+            <a:spAutoFit/>
+          </a:bodyPr>
+          <a:lstStyle/>
+          <a:p>
+            <a:pPr lvl="0"/>
+            <a:r>
+              <a:rPr lang="de-DE" dirty="0" smtClean="0"/>
+              <a:t>- </a:t>
+            </a:r>
+            <a:r>
+              <a:rPr lang="de-DE" dirty="0"/>
+              <a:t>Fehlende Erfahrung in Game-Programmierung</a:t>
+            </a:r>
+          </a:p>
+        </p:txBody>
+      </p:sp>
+      <p:sp>
+        <p:nvSpPr>
+          <p:cNvPr id="7" name="Textfeld 6"/>
+          <p:cNvSpPr txBox="1"/>
+          <p:nvPr/>
+        </p:nvSpPr>
+        <p:spPr>
+          <a:xfrm>
+            <a:off x="3051564" y="2202527"/>
+            <a:ext cx="5688915" cy="353174"/>
+          </a:xfrm>
+          <a:prstGeom prst="rect">
+            <a:avLst/>
+          </a:prstGeom>
+          <a:noFill/>
+        </p:spPr>
+        <p:txBody>
+          <a:bodyPr wrap="none" rtlCol="0">
+            <a:spAutoFit/>
+          </a:bodyPr>
+          <a:lstStyle/>
+          <a:p>
+            <a:pPr lvl="0"/>
+            <a:r>
+              <a:rPr lang="de-DE" dirty="0" smtClean="0"/>
+              <a:t>- </a:t>
+            </a:r>
+            <a:r>
+              <a:rPr lang="de-DE" dirty="0" err="1"/>
+              <a:t>Grosser</a:t>
+            </a:r>
+            <a:r>
+              <a:rPr lang="de-DE" dirty="0"/>
+              <a:t> Umfang für die zur Verfügung stehende Zeit</a:t>
+            </a:r>
+          </a:p>
+        </p:txBody>
+      </p:sp>
+    </p:spTree>
+    <p:extLst>
+      <p:ext uri="{BB962C8B-B14F-4D97-AF65-F5344CB8AC3E}">
+        <p14:creationId xmlns:p14="http://schemas.microsoft.com/office/powerpoint/2010/main" val="1010235464"/>
+      </p:ext>
+    </p:extLst>
+  </p:cSld>
+  <p:clrMapOvr>
+    <a:masterClrMapping/>
+  </p:clrMapOvr>
+  <mc:AlternateContent xmlns:mc="http://schemas.openxmlformats.org/markup-compatibility/2006" xmlns:p14="http://schemas.microsoft.com/office/powerpoint/2010/main">
+    <mc:Choice Requires="p14">
+      <p:transition spd="slow" p14:dur="2000"/>
+    </mc:Choice>
+    <mc:Fallback xmlns="">
+      <p:transition xmlns:p14="http://schemas.microsoft.com/office/powerpoint/2010/main" spd="slow"/>
+    </mc:Fallback>
+  </mc:AlternateContent>
+  <p:timing>
+    <p:tnLst>
+      <p:par>
+        <p:cTn id="1" dur="indefinite" restart="never" nodeType="tmRoot"/>
+      </p:par>
+    </p:tnLst>
+  </p:timing>
+</p:sld>
+</file>
+
+<file path=ppt/slides/slide7.xml><?xml version="1.0" encoding="utf-8"?>
+<p:sld xmlns:a="http://schemas.openxmlformats.org/drawingml/2006/main" xmlns:r="http://schemas.openxmlformats.org/officeDocument/2006/relationships" xmlns:p="http://schemas.openxmlformats.org/presentationml/2006/main">
+  <p:cSld>
+    <p:spTree>
+      <p:nvGrpSpPr>
+        <p:cNvPr id="1" name=""/>
+        <p:cNvGrpSpPr/>
+        <p:nvPr/>
+      </p:nvGrpSpPr>
+      <p:grpSpPr>
+        <a:xfrm>
+          <a:off x="0" y="0"/>
+          <a:ext cx="0" cy="0"/>
+          <a:chOff x="0" y="0"/>
+          <a:chExt cx="0" cy="0"/>
+        </a:xfrm>
+      </p:grpSpPr>
+      <p:sp>
+        <p:nvSpPr>
+          <p:cNvPr id="2" name="Titel 1"/>
+          <p:cNvSpPr>
+            <a:spLocks noGrp="1"/>
+          </p:cNvSpPr>
+          <p:nvPr>
+            <p:ph type="title"/>
+          </p:nvPr>
+        </p:nvSpPr>
+        <p:spPr/>
+        <p:txBody>
+          <a:bodyPr/>
+          <a:lstStyle/>
+          <a:p>
+            <a:r>
+              <a:rPr lang="de-DE" dirty="0" smtClean="0"/>
+              <a:t>Grobplanung</a:t>
+            </a:r>
+            <a:endParaRPr lang="de-DE" dirty="0"/>
+          </a:p>
+        </p:txBody>
+      </p:sp>
+      <p:sp>
+        <p:nvSpPr>
+          <p:cNvPr id="6" name="Textfeld 5"/>
+          <p:cNvSpPr txBox="1"/>
+          <p:nvPr/>
+        </p:nvSpPr>
+        <p:spPr>
+          <a:xfrm>
+            <a:off x="3044379" y="1847079"/>
+            <a:ext cx="4286112" cy="353174"/>
+          </a:xfrm>
+          <a:prstGeom prst="rect">
+            <a:avLst/>
+          </a:prstGeom>
+          <a:noFill/>
+        </p:spPr>
+        <p:txBody>
+          <a:bodyPr wrap="none" rtlCol="0">
+            <a:spAutoFit/>
+          </a:bodyPr>
+          <a:lstStyle/>
+          <a:p>
+            <a:pPr lvl="0"/>
+            <a:r>
+              <a:rPr lang="de-DE" dirty="0" smtClean="0"/>
+              <a:t>- Gesamtdauer des Projekts 14 Wochen</a:t>
+            </a:r>
+            <a:endParaRPr lang="de-DE" dirty="0"/>
+          </a:p>
+        </p:txBody>
+      </p:sp>
+      <p:sp>
+        <p:nvSpPr>
+          <p:cNvPr id="7" name="Textfeld 6"/>
+          <p:cNvSpPr txBox="1"/>
+          <p:nvPr/>
+        </p:nvSpPr>
+        <p:spPr>
+          <a:xfrm>
+            <a:off x="3051564" y="2202527"/>
+            <a:ext cx="3657634" cy="353174"/>
+          </a:xfrm>
+          <a:prstGeom prst="rect">
+            <a:avLst/>
+          </a:prstGeom>
+          <a:noFill/>
+        </p:spPr>
+        <p:txBody>
+          <a:bodyPr wrap="none" rtlCol="0">
+            <a:spAutoFit/>
+          </a:bodyPr>
+          <a:lstStyle/>
+          <a:p>
+            <a:pPr lvl="0"/>
+            <a:r>
+              <a:rPr lang="de-DE" dirty="0" smtClean="0"/>
+              <a:t>- Iterationsdauer von einer Woche</a:t>
+            </a:r>
+            <a:endParaRPr lang="de-DE" dirty="0"/>
+          </a:p>
+        </p:txBody>
+      </p:sp>
+      <p:graphicFrame>
+        <p:nvGraphicFramePr>
+          <p:cNvPr id="4" name="Table 3"/>
+          <p:cNvGraphicFramePr>
+            <a:graphicFrameLocks noGrp="1"/>
+          </p:cNvGraphicFramePr>
+          <p:nvPr>
+            <p:extLst>
+              <p:ext uri="{D42A27DB-BD31-4B8C-83A1-F6EECF244321}">
+                <p14:modId xmlns:p14="http://schemas.microsoft.com/office/powerpoint/2010/main" val="3218044784"/>
+              </p:ext>
+            </p:extLst>
+          </p:nvPr>
+        </p:nvGraphicFramePr>
+        <p:xfrm>
+          <a:off x="2083793" y="2699717"/>
+          <a:ext cx="7488832" cy="4392491"/>
+        </p:xfrm>
+        <a:graphic>
+          <a:graphicData uri="http://schemas.openxmlformats.org/drawingml/2006/table">
+            <a:tbl>
+              <a:tblPr firstRow="1" firstCol="1" bandRow="1">
+                <a:tableStyleId>{9D7B26C5-4107-4FEC-AEDC-1716B250A1EF}</a:tableStyleId>
+              </a:tblPr>
+              <a:tblGrid>
+                <a:gridCol w="1444351"/>
+                <a:gridCol w="1296239"/>
+                <a:gridCol w="4748242"/>
+              </a:tblGrid>
+              <a:tr h="462367">
+                <a:tc>
+                  <a:txBody>
+                    <a:bodyPr/>
+                    <a:lstStyle/>
+                    <a:p>
+                      <a:pPr algn="l">
+                        <a:spcAft>
+                          <a:spcPts val="0"/>
+                        </a:spcAft>
+                      </a:pPr>
+                      <a:r>
+                        <a:rPr lang="de-DE" sz="1400" dirty="0">
+                          <a:effectLst/>
+                        </a:rPr>
+                        <a:t>Phase</a:t>
+                      </a:r>
+                      <a:endParaRPr lang="de-CH" sz="1400" dirty="0">
+                        <a:effectLst/>
+                        <a:latin typeface="Cambria" panose="02040503050406030204" pitchFamily="18" charset="0"/>
+                        <a:ea typeface="MS Mincho" panose="02020609040205080304" pitchFamily="49" charset="-128"/>
+                        <a:cs typeface="Times New Roman" panose="02020603050405020304" pitchFamily="18" charset="0"/>
+                      </a:endParaRPr>
+                    </a:p>
+                  </a:txBody>
+                  <a:tcPr marL="68580" marR="68580" marT="0" marB="0"/>
+                </a:tc>
+                <a:tc>
+                  <a:txBody>
+                    <a:bodyPr/>
+                    <a:lstStyle/>
+                    <a:p>
+                      <a:pPr indent="327660" algn="l">
+                        <a:spcAft>
+                          <a:spcPts val="0"/>
+                        </a:spcAft>
+                      </a:pPr>
+                      <a:r>
+                        <a:rPr lang="de-DE" sz="1400" dirty="0">
+                          <a:effectLst/>
+                        </a:rPr>
+                        <a:t>Iteration</a:t>
+                      </a:r>
+                      <a:endParaRPr lang="de-CH" sz="1400" dirty="0">
+                        <a:effectLst/>
+                        <a:latin typeface="Cambria" panose="02040503050406030204" pitchFamily="18" charset="0"/>
+                        <a:ea typeface="MS Mincho" panose="02020609040205080304" pitchFamily="49" charset="-128"/>
+                        <a:cs typeface="Times New Roman" panose="02020603050405020304" pitchFamily="18" charset="0"/>
+                      </a:endParaRPr>
+                    </a:p>
+                  </a:txBody>
+                  <a:tcPr marL="68580" marR="68580" marT="0" marB="0"/>
+                </a:tc>
+                <a:tc>
+                  <a:txBody>
+                    <a:bodyPr/>
+                    <a:lstStyle/>
+                    <a:p>
+                      <a:pPr algn="l">
+                        <a:spcAft>
+                          <a:spcPts val="0"/>
+                        </a:spcAft>
+                      </a:pPr>
+                      <a:r>
+                        <a:rPr lang="de-DE" sz="1400" dirty="0">
+                          <a:effectLst/>
+                        </a:rPr>
+                        <a:t>Ziel</a:t>
+                      </a:r>
+                      <a:endParaRPr lang="de-CH" sz="1400" dirty="0">
+                        <a:effectLst/>
+                        <a:latin typeface="Cambria" panose="02040503050406030204" pitchFamily="18" charset="0"/>
+                        <a:ea typeface="MS Mincho" panose="02020609040205080304" pitchFamily="49" charset="-128"/>
+                        <a:cs typeface="Times New Roman" panose="02020603050405020304" pitchFamily="18" charset="0"/>
+                      </a:endParaRPr>
+                    </a:p>
+                  </a:txBody>
+                  <a:tcPr marL="68580" marR="68580" marT="0" marB="0"/>
+                </a:tc>
+              </a:tr>
+              <a:tr h="231184">
+                <a:tc>
+                  <a:txBody>
+                    <a:bodyPr/>
+                    <a:lstStyle/>
+                    <a:p>
+                      <a:pPr>
+                        <a:spcAft>
+                          <a:spcPts val="0"/>
+                        </a:spcAft>
+                      </a:pPr>
+                      <a:r>
+                        <a:rPr lang="de-DE" sz="1200">
+                          <a:effectLst/>
+                        </a:rPr>
+                        <a:t>Inception</a:t>
+                      </a:r>
+                      <a:endParaRPr lang="de-CH" sz="1200">
+                        <a:effectLst/>
+                        <a:latin typeface="Cambria" panose="02040503050406030204" pitchFamily="18" charset="0"/>
+                        <a:ea typeface="MS Mincho" panose="02020609040205080304" pitchFamily="49" charset="-128"/>
+                        <a:cs typeface="Times New Roman" panose="02020603050405020304" pitchFamily="18" charset="0"/>
+                      </a:endParaRPr>
+                    </a:p>
+                  </a:txBody>
+                  <a:tcPr marL="68580" marR="68580" marT="0" marB="0"/>
+                </a:tc>
+                <a:tc>
+                  <a:txBody>
+                    <a:bodyPr/>
+                    <a:lstStyle/>
+                    <a:p>
+                      <a:pPr>
+                        <a:spcAft>
+                          <a:spcPts val="0"/>
+                        </a:spcAft>
+                      </a:pPr>
+                      <a:r>
+                        <a:rPr lang="de-DE" sz="1200">
+                          <a:effectLst/>
+                        </a:rPr>
+                        <a:t>1</a:t>
+                      </a:r>
+                      <a:endParaRPr lang="de-CH" sz="1200">
+                        <a:effectLst/>
+                        <a:latin typeface="Cambria" panose="02040503050406030204" pitchFamily="18" charset="0"/>
+                        <a:ea typeface="MS Mincho" panose="02020609040205080304" pitchFamily="49" charset="-128"/>
+                        <a:cs typeface="Times New Roman" panose="02020603050405020304" pitchFamily="18" charset="0"/>
+                      </a:endParaRPr>
+                    </a:p>
+                  </a:txBody>
+                  <a:tcPr marL="68580" marR="68580" marT="0" marB="0"/>
+                </a:tc>
+                <a:tc>
+                  <a:txBody>
+                    <a:bodyPr/>
+                    <a:lstStyle/>
+                    <a:p>
+                      <a:pPr>
+                        <a:spcAft>
+                          <a:spcPts val="0"/>
+                        </a:spcAft>
+                      </a:pPr>
+                      <a:r>
+                        <a:rPr lang="de-DE" sz="1200">
+                          <a:effectLst/>
+                        </a:rPr>
+                        <a:t>Gruppenbildung, Themeneruierung, Wahl des PL</a:t>
+                      </a:r>
+                      <a:endParaRPr lang="de-CH" sz="1200">
+                        <a:effectLst/>
+                        <a:latin typeface="Cambria" panose="02040503050406030204" pitchFamily="18" charset="0"/>
+                        <a:ea typeface="MS Mincho" panose="02020609040205080304" pitchFamily="49" charset="-128"/>
+                        <a:cs typeface="Times New Roman" panose="02020603050405020304" pitchFamily="18" charset="0"/>
+                      </a:endParaRPr>
+                    </a:p>
+                  </a:txBody>
+                  <a:tcPr marL="68580" marR="68580" marT="0" marB="0"/>
+                </a:tc>
+              </a:tr>
+              <a:tr h="231184">
+                <a:tc>
+                  <a:txBody>
+                    <a:bodyPr/>
+                    <a:lstStyle/>
+                    <a:p>
+                      <a:pPr>
+                        <a:spcAft>
+                          <a:spcPts val="0"/>
+                        </a:spcAft>
+                      </a:pPr>
+                      <a:r>
+                        <a:rPr lang="de-DE" sz="1200">
+                          <a:effectLst/>
+                        </a:rPr>
+                        <a:t> </a:t>
+                      </a:r>
+                      <a:endParaRPr lang="de-CH" sz="1200">
+                        <a:effectLst/>
+                        <a:latin typeface="Cambria" panose="02040503050406030204" pitchFamily="18" charset="0"/>
+                        <a:ea typeface="MS Mincho" panose="02020609040205080304" pitchFamily="49" charset="-128"/>
+                        <a:cs typeface="Times New Roman" panose="02020603050405020304" pitchFamily="18" charset="0"/>
+                      </a:endParaRPr>
+                    </a:p>
+                  </a:txBody>
+                  <a:tcPr marL="68580" marR="68580" marT="0" marB="0"/>
+                </a:tc>
+                <a:tc>
+                  <a:txBody>
+                    <a:bodyPr/>
+                    <a:lstStyle/>
+                    <a:p>
+                      <a:pPr>
+                        <a:spcAft>
+                          <a:spcPts val="0"/>
+                        </a:spcAft>
+                      </a:pPr>
+                      <a:r>
+                        <a:rPr lang="de-DE" sz="1200">
+                          <a:effectLst/>
+                        </a:rPr>
+                        <a:t>2</a:t>
+                      </a:r>
+                      <a:endParaRPr lang="de-CH" sz="1200">
+                        <a:effectLst/>
+                        <a:latin typeface="Cambria" panose="02040503050406030204" pitchFamily="18" charset="0"/>
+                        <a:ea typeface="MS Mincho" panose="02020609040205080304" pitchFamily="49" charset="-128"/>
+                        <a:cs typeface="Times New Roman" panose="02020603050405020304" pitchFamily="18" charset="0"/>
+                      </a:endParaRPr>
+                    </a:p>
+                  </a:txBody>
+                  <a:tcPr marL="68580" marR="68580" marT="0" marB="0"/>
+                </a:tc>
+                <a:tc>
+                  <a:txBody>
+                    <a:bodyPr/>
+                    <a:lstStyle/>
+                    <a:p>
+                      <a:pPr>
+                        <a:spcAft>
+                          <a:spcPts val="0"/>
+                        </a:spcAft>
+                      </a:pPr>
+                      <a:r>
+                        <a:rPr lang="de-DE" sz="1200">
+                          <a:effectLst/>
+                        </a:rPr>
+                        <a:t>Projektskizze erstellt,  Präsentation erstellt</a:t>
+                      </a:r>
+                      <a:endParaRPr lang="de-CH" sz="1200">
+                        <a:effectLst/>
+                        <a:latin typeface="Cambria" panose="02040503050406030204" pitchFamily="18" charset="0"/>
+                        <a:ea typeface="MS Mincho" panose="02020609040205080304" pitchFamily="49" charset="-128"/>
+                        <a:cs typeface="Times New Roman" panose="02020603050405020304" pitchFamily="18" charset="0"/>
+                      </a:endParaRPr>
+                    </a:p>
+                  </a:txBody>
+                  <a:tcPr marL="68580" marR="68580" marT="0" marB="0"/>
+                </a:tc>
+              </a:tr>
+              <a:tr h="462367">
+                <a:tc>
+                  <a:txBody>
+                    <a:bodyPr/>
+                    <a:lstStyle/>
+                    <a:p>
+                      <a:pPr>
+                        <a:spcAft>
+                          <a:spcPts val="0"/>
+                        </a:spcAft>
+                      </a:pPr>
+                      <a:r>
+                        <a:rPr lang="de-DE" sz="1200">
+                          <a:effectLst/>
+                        </a:rPr>
+                        <a:t>Elaboration</a:t>
+                      </a:r>
+                      <a:endParaRPr lang="de-CH" sz="1200">
+                        <a:effectLst/>
+                        <a:latin typeface="Cambria" panose="02040503050406030204" pitchFamily="18" charset="0"/>
+                        <a:ea typeface="MS Mincho" panose="02020609040205080304" pitchFamily="49" charset="-128"/>
+                        <a:cs typeface="Times New Roman" panose="02020603050405020304" pitchFamily="18" charset="0"/>
+                      </a:endParaRPr>
+                    </a:p>
+                  </a:txBody>
+                  <a:tcPr marL="68580" marR="68580" marT="0" marB="0"/>
+                </a:tc>
+                <a:tc>
+                  <a:txBody>
+                    <a:bodyPr/>
+                    <a:lstStyle/>
+                    <a:p>
+                      <a:pPr>
+                        <a:spcAft>
+                          <a:spcPts val="0"/>
+                        </a:spcAft>
+                      </a:pPr>
+                      <a:r>
+                        <a:rPr lang="de-DE" sz="1200">
+                          <a:effectLst/>
+                        </a:rPr>
+                        <a:t>3</a:t>
+                      </a:r>
+                      <a:endParaRPr lang="de-CH" sz="1200">
+                        <a:effectLst/>
+                        <a:latin typeface="Cambria" panose="02040503050406030204" pitchFamily="18" charset="0"/>
+                        <a:ea typeface="MS Mincho" panose="02020609040205080304" pitchFamily="49" charset="-128"/>
+                        <a:cs typeface="Times New Roman" panose="02020603050405020304" pitchFamily="18" charset="0"/>
+                      </a:endParaRPr>
+                    </a:p>
+                  </a:txBody>
+                  <a:tcPr marL="68580" marR="68580" marT="0" marB="0"/>
+                </a:tc>
+                <a:tc>
+                  <a:txBody>
+                    <a:bodyPr/>
+                    <a:lstStyle/>
+                    <a:p>
+                      <a:pPr>
+                        <a:spcAft>
+                          <a:spcPts val="1200"/>
+                        </a:spcAft>
+                      </a:pPr>
+                      <a:r>
+                        <a:rPr lang="de-DE" sz="1200">
+                          <a:effectLst/>
+                        </a:rPr>
+                        <a:t>50 % der Anwendungsfälle detailliert ausformuliert, Rest identifiziert und priorisiert</a:t>
+                      </a:r>
+                      <a:endParaRPr lang="de-CH" sz="1200">
+                        <a:effectLst/>
+                        <a:latin typeface="Cambria" panose="02040503050406030204" pitchFamily="18" charset="0"/>
+                        <a:ea typeface="MS Mincho" panose="02020609040205080304" pitchFamily="49" charset="-128"/>
+                        <a:cs typeface="Times New Roman" panose="02020603050405020304" pitchFamily="18" charset="0"/>
+                      </a:endParaRPr>
+                    </a:p>
+                  </a:txBody>
+                  <a:tcPr marL="68580" marR="68580" marT="0" marB="0"/>
+                </a:tc>
+              </a:tr>
+              <a:tr h="462367">
+                <a:tc>
+                  <a:txBody>
+                    <a:bodyPr/>
+                    <a:lstStyle/>
+                    <a:p>
+                      <a:pPr>
+                        <a:spcAft>
+                          <a:spcPts val="0"/>
+                        </a:spcAft>
+                      </a:pPr>
+                      <a:r>
+                        <a:rPr lang="de-DE" sz="1200">
+                          <a:effectLst/>
+                        </a:rPr>
+                        <a:t> </a:t>
+                      </a:r>
+                      <a:endParaRPr lang="de-CH" sz="1200">
+                        <a:effectLst/>
+                        <a:latin typeface="Cambria" panose="02040503050406030204" pitchFamily="18" charset="0"/>
+                        <a:ea typeface="MS Mincho" panose="02020609040205080304" pitchFamily="49" charset="-128"/>
+                        <a:cs typeface="Times New Roman" panose="02020603050405020304" pitchFamily="18" charset="0"/>
+                      </a:endParaRPr>
+                    </a:p>
+                  </a:txBody>
+                  <a:tcPr marL="68580" marR="68580" marT="0" marB="0"/>
+                </a:tc>
+                <a:tc>
+                  <a:txBody>
+                    <a:bodyPr/>
+                    <a:lstStyle/>
+                    <a:p>
+                      <a:pPr>
+                        <a:spcAft>
+                          <a:spcPts val="0"/>
+                        </a:spcAft>
+                      </a:pPr>
+                      <a:r>
+                        <a:rPr lang="de-DE" sz="1200">
+                          <a:effectLst/>
+                        </a:rPr>
+                        <a:t>4</a:t>
+                      </a:r>
+                      <a:endParaRPr lang="de-CH" sz="1200">
+                        <a:effectLst/>
+                        <a:latin typeface="Cambria" panose="02040503050406030204" pitchFamily="18" charset="0"/>
+                        <a:ea typeface="MS Mincho" panose="02020609040205080304" pitchFamily="49" charset="-128"/>
+                        <a:cs typeface="Times New Roman" panose="02020603050405020304" pitchFamily="18" charset="0"/>
+                      </a:endParaRPr>
+                    </a:p>
+                  </a:txBody>
+                  <a:tcPr marL="68580" marR="68580" marT="0" marB="0"/>
+                </a:tc>
+                <a:tc>
+                  <a:txBody>
+                    <a:bodyPr/>
+                    <a:lstStyle/>
+                    <a:p>
+                      <a:pPr>
+                        <a:spcAft>
+                          <a:spcPts val="0"/>
+                        </a:spcAft>
+                      </a:pPr>
+                      <a:r>
+                        <a:rPr lang="de-DE" sz="1200">
+                          <a:effectLst/>
+                        </a:rPr>
+                        <a:t>80 % der Anwendungsfälle detailliert ausformuliert, eine erste Architektur wurde erstellt</a:t>
+                      </a:r>
+                      <a:endParaRPr lang="de-CH" sz="1200">
+                        <a:effectLst/>
+                        <a:latin typeface="Cambria" panose="02040503050406030204" pitchFamily="18" charset="0"/>
+                        <a:ea typeface="MS Mincho" panose="02020609040205080304" pitchFamily="49" charset="-128"/>
+                        <a:cs typeface="Times New Roman" panose="02020603050405020304" pitchFamily="18" charset="0"/>
+                      </a:endParaRPr>
+                    </a:p>
+                  </a:txBody>
+                  <a:tcPr marL="68580" marR="68580" marT="0" marB="0"/>
+                </a:tc>
+              </a:tr>
+              <a:tr h="462367">
+                <a:tc>
+                  <a:txBody>
+                    <a:bodyPr/>
+                    <a:lstStyle/>
+                    <a:p>
+                      <a:pPr>
+                        <a:spcAft>
+                          <a:spcPts val="0"/>
+                        </a:spcAft>
+                      </a:pPr>
+                      <a:r>
+                        <a:rPr lang="de-DE" sz="1200">
+                          <a:effectLst/>
+                        </a:rPr>
+                        <a:t> </a:t>
+                      </a:r>
+                      <a:endParaRPr lang="de-CH" sz="1200">
+                        <a:effectLst/>
+                        <a:latin typeface="Cambria" panose="02040503050406030204" pitchFamily="18" charset="0"/>
+                        <a:ea typeface="MS Mincho" panose="02020609040205080304" pitchFamily="49" charset="-128"/>
+                        <a:cs typeface="Times New Roman" panose="02020603050405020304" pitchFamily="18" charset="0"/>
+                      </a:endParaRPr>
+                    </a:p>
+                  </a:txBody>
+                  <a:tcPr marL="68580" marR="68580" marT="0" marB="0"/>
+                </a:tc>
+                <a:tc>
+                  <a:txBody>
+                    <a:bodyPr/>
+                    <a:lstStyle/>
+                    <a:p>
+                      <a:pPr>
+                        <a:spcAft>
+                          <a:spcPts val="0"/>
+                        </a:spcAft>
+                      </a:pPr>
+                      <a:r>
+                        <a:rPr lang="de-DE" sz="1200">
+                          <a:effectLst/>
+                        </a:rPr>
+                        <a:t>5</a:t>
+                      </a:r>
+                      <a:endParaRPr lang="de-CH" sz="1200">
+                        <a:effectLst/>
+                        <a:latin typeface="Cambria" panose="02040503050406030204" pitchFamily="18" charset="0"/>
+                        <a:ea typeface="MS Mincho" panose="02020609040205080304" pitchFamily="49" charset="-128"/>
+                        <a:cs typeface="Times New Roman" panose="02020603050405020304" pitchFamily="18" charset="0"/>
+                      </a:endParaRPr>
+                    </a:p>
+                  </a:txBody>
+                  <a:tcPr marL="68580" marR="68580" marT="0" marB="0"/>
+                </a:tc>
+                <a:tc>
+                  <a:txBody>
+                    <a:bodyPr/>
+                    <a:lstStyle/>
+                    <a:p>
+                      <a:pPr>
+                        <a:spcAft>
+                          <a:spcPts val="0"/>
+                        </a:spcAft>
+                      </a:pPr>
+                      <a:r>
+                        <a:rPr lang="de-DE" sz="1200">
+                          <a:effectLst/>
+                        </a:rPr>
+                        <a:t>Zusätzliche Spezifikationen definiert, Anwendungsfalldiagramm erstellt</a:t>
+                      </a:r>
+                      <a:endParaRPr lang="de-CH" sz="1200">
+                        <a:effectLst/>
+                        <a:latin typeface="Cambria" panose="02040503050406030204" pitchFamily="18" charset="0"/>
+                        <a:ea typeface="MS Mincho" panose="02020609040205080304" pitchFamily="49" charset="-128"/>
+                        <a:cs typeface="Times New Roman" panose="02020603050405020304" pitchFamily="18" charset="0"/>
+                      </a:endParaRPr>
+                    </a:p>
+                  </a:txBody>
+                  <a:tcPr marL="68580" marR="68580" marT="0" marB="0"/>
+                </a:tc>
+              </a:tr>
+              <a:tr h="462367">
+                <a:tc>
+                  <a:txBody>
+                    <a:bodyPr/>
+                    <a:lstStyle/>
+                    <a:p>
+                      <a:pPr>
+                        <a:spcAft>
+                          <a:spcPts val="0"/>
+                        </a:spcAft>
+                      </a:pPr>
+                      <a:r>
+                        <a:rPr lang="de-DE" sz="1200">
+                          <a:effectLst/>
+                        </a:rPr>
+                        <a:t> </a:t>
+                      </a:r>
+                      <a:endParaRPr lang="de-CH" sz="1200">
+                        <a:effectLst/>
+                        <a:latin typeface="Cambria" panose="02040503050406030204" pitchFamily="18" charset="0"/>
+                        <a:ea typeface="MS Mincho" panose="02020609040205080304" pitchFamily="49" charset="-128"/>
+                        <a:cs typeface="Times New Roman" panose="02020603050405020304" pitchFamily="18" charset="0"/>
+                      </a:endParaRPr>
+                    </a:p>
+                  </a:txBody>
+                  <a:tcPr marL="68580" marR="68580" marT="0" marB="0"/>
+                </a:tc>
+                <a:tc>
+                  <a:txBody>
+                    <a:bodyPr/>
+                    <a:lstStyle/>
+                    <a:p>
+                      <a:pPr>
+                        <a:spcAft>
+                          <a:spcPts val="0"/>
+                        </a:spcAft>
+                      </a:pPr>
+                      <a:r>
+                        <a:rPr lang="de-DE" sz="1200">
+                          <a:effectLst/>
+                        </a:rPr>
+                        <a:t>6</a:t>
+                      </a:r>
+                      <a:endParaRPr lang="de-CH" sz="1200">
+                        <a:effectLst/>
+                        <a:latin typeface="Cambria" panose="02040503050406030204" pitchFamily="18" charset="0"/>
+                        <a:ea typeface="MS Mincho" panose="02020609040205080304" pitchFamily="49" charset="-128"/>
+                        <a:cs typeface="Times New Roman" panose="02020603050405020304" pitchFamily="18" charset="0"/>
+                      </a:endParaRPr>
+                    </a:p>
+                  </a:txBody>
+                  <a:tcPr marL="68580" marR="68580" marT="0" marB="0"/>
+                </a:tc>
+                <a:tc>
+                  <a:txBody>
+                    <a:bodyPr/>
+                    <a:lstStyle/>
+                    <a:p>
+                      <a:pPr>
+                        <a:spcAft>
+                          <a:spcPts val="0"/>
+                        </a:spcAft>
+                      </a:pPr>
+                      <a:r>
+                        <a:rPr lang="de-DE" sz="1200">
+                          <a:effectLst/>
+                        </a:rPr>
+                        <a:t>System-Sequenzdiagramm und Systemverträge Domänenmodell und Glossar erstellt</a:t>
+                      </a:r>
+                      <a:endParaRPr lang="de-CH" sz="1200">
+                        <a:effectLst/>
+                        <a:latin typeface="Cambria" panose="02040503050406030204" pitchFamily="18" charset="0"/>
+                        <a:ea typeface="MS Mincho" panose="02020609040205080304" pitchFamily="49" charset="-128"/>
+                        <a:cs typeface="Times New Roman" panose="02020603050405020304" pitchFamily="18" charset="0"/>
+                      </a:endParaRPr>
+                    </a:p>
+                  </a:txBody>
+                  <a:tcPr marL="68580" marR="68580" marT="0" marB="0"/>
+                </a:tc>
+              </a:tr>
+              <a:tr h="231184">
+                <a:tc>
+                  <a:txBody>
+                    <a:bodyPr/>
+                    <a:lstStyle/>
+                    <a:p>
+                      <a:pPr>
+                        <a:spcAft>
+                          <a:spcPts val="0"/>
+                        </a:spcAft>
+                      </a:pPr>
+                      <a:r>
+                        <a:rPr lang="de-DE" sz="1200">
+                          <a:effectLst/>
+                        </a:rPr>
+                        <a:t>Construction</a:t>
+                      </a:r>
+                      <a:endParaRPr lang="de-CH" sz="1200">
+                        <a:effectLst/>
+                        <a:latin typeface="Cambria" panose="02040503050406030204" pitchFamily="18" charset="0"/>
+                        <a:ea typeface="MS Mincho" panose="02020609040205080304" pitchFamily="49" charset="-128"/>
+                        <a:cs typeface="Times New Roman" panose="02020603050405020304" pitchFamily="18" charset="0"/>
+                      </a:endParaRPr>
+                    </a:p>
+                  </a:txBody>
+                  <a:tcPr marL="68580" marR="68580" marT="0" marB="0"/>
+                </a:tc>
+                <a:tc>
+                  <a:txBody>
+                    <a:bodyPr/>
+                    <a:lstStyle/>
+                    <a:p>
+                      <a:pPr>
+                        <a:spcAft>
+                          <a:spcPts val="0"/>
+                        </a:spcAft>
+                      </a:pPr>
+                      <a:r>
+                        <a:rPr lang="de-DE" sz="1200">
+                          <a:effectLst/>
+                        </a:rPr>
+                        <a:t>7</a:t>
+                      </a:r>
+                      <a:endParaRPr lang="de-CH" sz="1200">
+                        <a:effectLst/>
+                        <a:latin typeface="Cambria" panose="02040503050406030204" pitchFamily="18" charset="0"/>
+                        <a:ea typeface="MS Mincho" panose="02020609040205080304" pitchFamily="49" charset="-128"/>
+                        <a:cs typeface="Times New Roman" panose="02020603050405020304" pitchFamily="18" charset="0"/>
+                      </a:endParaRPr>
+                    </a:p>
+                  </a:txBody>
+                  <a:tcPr marL="68580" marR="68580" marT="0" marB="0"/>
+                </a:tc>
+                <a:tc>
+                  <a:txBody>
+                    <a:bodyPr/>
+                    <a:lstStyle/>
+                    <a:p>
+                      <a:pPr>
+                        <a:spcAft>
+                          <a:spcPts val="0"/>
+                        </a:spcAft>
+                      </a:pPr>
+                      <a:r>
+                        <a:rPr lang="de-DE" sz="1200">
+                          <a:effectLst/>
+                        </a:rPr>
+                        <a:t>20 % der UCs realisiert und getestet, UI Prototyp</a:t>
+                      </a:r>
+                      <a:endParaRPr lang="de-CH" sz="1200">
+                        <a:effectLst/>
+                        <a:latin typeface="Cambria" panose="02040503050406030204" pitchFamily="18" charset="0"/>
+                        <a:ea typeface="MS Mincho" panose="02020609040205080304" pitchFamily="49" charset="-128"/>
+                        <a:cs typeface="Times New Roman" panose="02020603050405020304" pitchFamily="18" charset="0"/>
+                      </a:endParaRPr>
+                    </a:p>
+                  </a:txBody>
+                  <a:tcPr marL="68580" marR="68580" marT="0" marB="0"/>
+                </a:tc>
+              </a:tr>
+              <a:tr h="231184">
+                <a:tc>
+                  <a:txBody>
+                    <a:bodyPr/>
+                    <a:lstStyle/>
+                    <a:p>
+                      <a:pPr>
+                        <a:spcAft>
+                          <a:spcPts val="0"/>
+                        </a:spcAft>
+                      </a:pPr>
+                      <a:r>
+                        <a:rPr lang="de-DE" sz="1200">
+                          <a:effectLst/>
+                        </a:rPr>
+                        <a:t> </a:t>
+                      </a:r>
+                      <a:endParaRPr lang="de-CH" sz="1200">
+                        <a:effectLst/>
+                        <a:latin typeface="Cambria" panose="02040503050406030204" pitchFamily="18" charset="0"/>
+                        <a:ea typeface="MS Mincho" panose="02020609040205080304" pitchFamily="49" charset="-128"/>
+                        <a:cs typeface="Times New Roman" panose="02020603050405020304" pitchFamily="18" charset="0"/>
+                      </a:endParaRPr>
+                    </a:p>
+                  </a:txBody>
+                  <a:tcPr marL="68580" marR="68580" marT="0" marB="0"/>
+                </a:tc>
+                <a:tc>
+                  <a:txBody>
+                    <a:bodyPr/>
+                    <a:lstStyle/>
+                    <a:p>
+                      <a:pPr>
+                        <a:spcAft>
+                          <a:spcPts val="0"/>
+                        </a:spcAft>
+                      </a:pPr>
+                      <a:r>
+                        <a:rPr lang="de-DE" sz="1200">
+                          <a:effectLst/>
+                        </a:rPr>
+                        <a:t>8</a:t>
+                      </a:r>
+                      <a:endParaRPr lang="de-CH" sz="1200">
+                        <a:effectLst/>
+                        <a:latin typeface="Cambria" panose="02040503050406030204" pitchFamily="18" charset="0"/>
+                        <a:ea typeface="MS Mincho" panose="02020609040205080304" pitchFamily="49" charset="-128"/>
+                        <a:cs typeface="Times New Roman" panose="02020603050405020304" pitchFamily="18" charset="0"/>
+                      </a:endParaRPr>
+                    </a:p>
+                  </a:txBody>
+                  <a:tcPr marL="68580" marR="68580" marT="0" marB="0"/>
+                </a:tc>
+                <a:tc>
+                  <a:txBody>
+                    <a:bodyPr/>
+                    <a:lstStyle/>
+                    <a:p>
+                      <a:pPr>
+                        <a:spcAft>
+                          <a:spcPts val="0"/>
+                        </a:spcAft>
+                      </a:pPr>
+                      <a:r>
+                        <a:rPr lang="de-DE" sz="1200">
+                          <a:effectLst/>
+                        </a:rPr>
+                        <a:t>40 % der UCs realisiert und getestet</a:t>
+                      </a:r>
+                      <a:endParaRPr lang="de-CH" sz="1200">
+                        <a:effectLst/>
+                        <a:latin typeface="Cambria" panose="02040503050406030204" pitchFamily="18" charset="0"/>
+                        <a:ea typeface="MS Mincho" panose="02020609040205080304" pitchFamily="49" charset="-128"/>
+                        <a:cs typeface="Times New Roman" panose="02020603050405020304" pitchFamily="18" charset="0"/>
+                      </a:endParaRPr>
+                    </a:p>
+                  </a:txBody>
+                  <a:tcPr marL="68580" marR="68580" marT="0" marB="0"/>
+                </a:tc>
+              </a:tr>
+              <a:tr h="231184">
+                <a:tc>
+                  <a:txBody>
+                    <a:bodyPr/>
+                    <a:lstStyle/>
+                    <a:p>
+                      <a:pPr>
+                        <a:spcAft>
+                          <a:spcPts val="0"/>
+                        </a:spcAft>
+                      </a:pPr>
+                      <a:r>
+                        <a:rPr lang="de-DE" sz="1200">
+                          <a:effectLst/>
+                        </a:rPr>
+                        <a:t> </a:t>
+                      </a:r>
+                      <a:endParaRPr lang="de-CH" sz="1200">
+                        <a:effectLst/>
+                        <a:latin typeface="Cambria" panose="02040503050406030204" pitchFamily="18" charset="0"/>
+                        <a:ea typeface="MS Mincho" panose="02020609040205080304" pitchFamily="49" charset="-128"/>
+                        <a:cs typeface="Times New Roman" panose="02020603050405020304" pitchFamily="18" charset="0"/>
+                      </a:endParaRPr>
+                    </a:p>
+                  </a:txBody>
+                  <a:tcPr marL="68580" marR="68580" marT="0" marB="0"/>
+                </a:tc>
+                <a:tc>
+                  <a:txBody>
+                    <a:bodyPr/>
+                    <a:lstStyle/>
+                    <a:p>
+                      <a:pPr>
+                        <a:spcAft>
+                          <a:spcPts val="0"/>
+                        </a:spcAft>
+                      </a:pPr>
+                      <a:r>
+                        <a:rPr lang="de-DE" sz="1200">
+                          <a:effectLst/>
+                        </a:rPr>
+                        <a:t>9</a:t>
+                      </a:r>
+                      <a:endParaRPr lang="de-CH" sz="1200">
+                        <a:effectLst/>
+                        <a:latin typeface="Cambria" panose="02040503050406030204" pitchFamily="18" charset="0"/>
+                        <a:ea typeface="MS Mincho" panose="02020609040205080304" pitchFamily="49" charset="-128"/>
+                        <a:cs typeface="Times New Roman" panose="02020603050405020304" pitchFamily="18" charset="0"/>
+                      </a:endParaRPr>
+                    </a:p>
+                  </a:txBody>
+                  <a:tcPr marL="68580" marR="68580" marT="0" marB="0"/>
+                </a:tc>
+                <a:tc>
+                  <a:txBody>
+                    <a:bodyPr/>
+                    <a:lstStyle/>
+                    <a:p>
+                      <a:pPr>
+                        <a:spcAft>
+                          <a:spcPts val="0"/>
+                        </a:spcAft>
+                      </a:pPr>
+                      <a:r>
+                        <a:rPr lang="de-DE" sz="1200">
+                          <a:effectLst/>
+                        </a:rPr>
+                        <a:t>70 % der UCs realisiert und getestet</a:t>
+                      </a:r>
+                      <a:endParaRPr lang="de-CH" sz="1200">
+                        <a:effectLst/>
+                        <a:latin typeface="Cambria" panose="02040503050406030204" pitchFamily="18" charset="0"/>
+                        <a:ea typeface="MS Mincho" panose="02020609040205080304" pitchFamily="49" charset="-128"/>
+                        <a:cs typeface="Times New Roman" panose="02020603050405020304" pitchFamily="18" charset="0"/>
+                      </a:endParaRPr>
+                    </a:p>
+                  </a:txBody>
+                  <a:tcPr marL="68580" marR="68580" marT="0" marB="0"/>
+                </a:tc>
+              </a:tr>
+              <a:tr h="231184">
+                <a:tc>
+                  <a:txBody>
+                    <a:bodyPr/>
+                    <a:lstStyle/>
+                    <a:p>
+                      <a:pPr>
+                        <a:spcAft>
+                          <a:spcPts val="0"/>
+                        </a:spcAft>
+                      </a:pPr>
+                      <a:r>
+                        <a:rPr lang="de-DE" sz="1200">
+                          <a:effectLst/>
+                        </a:rPr>
+                        <a:t> </a:t>
+                      </a:r>
+                      <a:endParaRPr lang="de-CH" sz="1200">
+                        <a:effectLst/>
+                        <a:latin typeface="Cambria" panose="02040503050406030204" pitchFamily="18" charset="0"/>
+                        <a:ea typeface="MS Mincho" panose="02020609040205080304" pitchFamily="49" charset="-128"/>
+                        <a:cs typeface="Times New Roman" panose="02020603050405020304" pitchFamily="18" charset="0"/>
+                      </a:endParaRPr>
+                    </a:p>
+                  </a:txBody>
+                  <a:tcPr marL="68580" marR="68580" marT="0" marB="0"/>
+                </a:tc>
+                <a:tc>
+                  <a:txBody>
+                    <a:bodyPr/>
+                    <a:lstStyle/>
+                    <a:p>
+                      <a:pPr>
+                        <a:spcAft>
+                          <a:spcPts val="0"/>
+                        </a:spcAft>
+                      </a:pPr>
+                      <a:r>
+                        <a:rPr lang="de-DE" sz="1200">
+                          <a:effectLst/>
+                        </a:rPr>
+                        <a:t>10</a:t>
+                      </a:r>
+                      <a:endParaRPr lang="de-CH" sz="1200">
+                        <a:effectLst/>
+                        <a:latin typeface="Cambria" panose="02040503050406030204" pitchFamily="18" charset="0"/>
+                        <a:ea typeface="MS Mincho" panose="02020609040205080304" pitchFamily="49" charset="-128"/>
+                        <a:cs typeface="Times New Roman" panose="02020603050405020304" pitchFamily="18" charset="0"/>
+                      </a:endParaRPr>
+                    </a:p>
+                  </a:txBody>
+                  <a:tcPr marL="68580" marR="68580" marT="0" marB="0"/>
+                </a:tc>
+                <a:tc>
+                  <a:txBody>
+                    <a:bodyPr/>
+                    <a:lstStyle/>
+                    <a:p>
+                      <a:pPr>
+                        <a:spcAft>
+                          <a:spcPts val="0"/>
+                        </a:spcAft>
+                      </a:pPr>
+                      <a:r>
+                        <a:rPr lang="de-DE" sz="1200">
+                          <a:effectLst/>
+                        </a:rPr>
+                        <a:t>85 % der UCs realisiert und getestet</a:t>
+                      </a:r>
+                      <a:endParaRPr lang="de-CH" sz="1200">
+                        <a:effectLst/>
+                        <a:latin typeface="Cambria" panose="02040503050406030204" pitchFamily="18" charset="0"/>
+                        <a:ea typeface="MS Mincho" panose="02020609040205080304" pitchFamily="49" charset="-128"/>
+                        <a:cs typeface="Times New Roman" panose="02020603050405020304" pitchFamily="18" charset="0"/>
+                      </a:endParaRPr>
+                    </a:p>
+                  </a:txBody>
+                  <a:tcPr marL="68580" marR="68580" marT="0" marB="0"/>
+                </a:tc>
+              </a:tr>
+              <a:tr h="231184">
+                <a:tc>
+                  <a:txBody>
+                    <a:bodyPr/>
+                    <a:lstStyle/>
+                    <a:p>
+                      <a:pPr>
+                        <a:spcAft>
+                          <a:spcPts val="0"/>
+                        </a:spcAft>
+                      </a:pPr>
+                      <a:r>
+                        <a:rPr lang="de-DE" sz="1200">
+                          <a:effectLst/>
+                        </a:rPr>
+                        <a:t> </a:t>
+                      </a:r>
+                      <a:endParaRPr lang="de-CH" sz="1200">
+                        <a:effectLst/>
+                        <a:latin typeface="Cambria" panose="02040503050406030204" pitchFamily="18" charset="0"/>
+                        <a:ea typeface="MS Mincho" panose="02020609040205080304" pitchFamily="49" charset="-128"/>
+                        <a:cs typeface="Times New Roman" panose="02020603050405020304" pitchFamily="18" charset="0"/>
+                      </a:endParaRPr>
+                    </a:p>
+                  </a:txBody>
+                  <a:tcPr marL="68580" marR="68580" marT="0" marB="0"/>
+                </a:tc>
+                <a:tc>
+                  <a:txBody>
+                    <a:bodyPr/>
+                    <a:lstStyle/>
+                    <a:p>
+                      <a:pPr>
+                        <a:spcAft>
+                          <a:spcPts val="0"/>
+                        </a:spcAft>
+                      </a:pPr>
+                      <a:r>
+                        <a:rPr lang="de-DE" sz="1200">
+                          <a:effectLst/>
+                        </a:rPr>
+                        <a:t>11</a:t>
+                      </a:r>
+                      <a:endParaRPr lang="de-CH" sz="1200">
+                        <a:effectLst/>
+                        <a:latin typeface="Cambria" panose="02040503050406030204" pitchFamily="18" charset="0"/>
+                        <a:ea typeface="MS Mincho" panose="02020609040205080304" pitchFamily="49" charset="-128"/>
+                        <a:cs typeface="Times New Roman" panose="02020603050405020304" pitchFamily="18" charset="0"/>
+                      </a:endParaRPr>
+                    </a:p>
+                  </a:txBody>
+                  <a:tcPr marL="68580" marR="68580" marT="0" marB="0"/>
+                </a:tc>
+                <a:tc>
+                  <a:txBody>
+                    <a:bodyPr/>
+                    <a:lstStyle/>
+                    <a:p>
+                      <a:pPr>
+                        <a:spcAft>
+                          <a:spcPts val="0"/>
+                        </a:spcAft>
+                      </a:pPr>
+                      <a:r>
+                        <a:rPr lang="de-DE" sz="1200">
+                          <a:effectLst/>
+                        </a:rPr>
+                        <a:t>100 % der UCs realisiert und getestet, UI fertig</a:t>
+                      </a:r>
+                      <a:endParaRPr lang="de-CH" sz="1200">
+                        <a:effectLst/>
+                        <a:latin typeface="Cambria" panose="02040503050406030204" pitchFamily="18" charset="0"/>
+                        <a:ea typeface="MS Mincho" panose="02020609040205080304" pitchFamily="49" charset="-128"/>
+                        <a:cs typeface="Times New Roman" panose="02020603050405020304" pitchFamily="18" charset="0"/>
+                      </a:endParaRPr>
+                    </a:p>
+                  </a:txBody>
+                  <a:tcPr marL="68580" marR="68580" marT="0" marB="0"/>
+                </a:tc>
+              </a:tr>
+              <a:tr h="231184">
+                <a:tc>
+                  <a:txBody>
+                    <a:bodyPr/>
+                    <a:lstStyle/>
+                    <a:p>
+                      <a:pPr>
+                        <a:spcAft>
+                          <a:spcPts val="0"/>
+                        </a:spcAft>
+                      </a:pPr>
+                      <a:r>
+                        <a:rPr lang="de-DE" sz="1200">
+                          <a:effectLst/>
+                        </a:rPr>
+                        <a:t>Transition</a:t>
+                      </a:r>
+                      <a:endParaRPr lang="de-CH" sz="1200">
+                        <a:effectLst/>
+                        <a:latin typeface="Cambria" panose="02040503050406030204" pitchFamily="18" charset="0"/>
+                        <a:ea typeface="MS Mincho" panose="02020609040205080304" pitchFamily="49" charset="-128"/>
+                        <a:cs typeface="Times New Roman" panose="02020603050405020304" pitchFamily="18" charset="0"/>
+                      </a:endParaRPr>
+                    </a:p>
+                  </a:txBody>
+                  <a:tcPr marL="68580" marR="68580" marT="0" marB="0"/>
+                </a:tc>
+                <a:tc>
+                  <a:txBody>
+                    <a:bodyPr/>
+                    <a:lstStyle/>
+                    <a:p>
+                      <a:pPr>
+                        <a:spcAft>
+                          <a:spcPts val="0"/>
+                        </a:spcAft>
+                      </a:pPr>
+                      <a:r>
+                        <a:rPr lang="de-DE" sz="1200">
+                          <a:effectLst/>
+                        </a:rPr>
+                        <a:t>12</a:t>
+                      </a:r>
+                      <a:endParaRPr lang="de-CH" sz="1200">
+                        <a:effectLst/>
+                        <a:latin typeface="Cambria" panose="02040503050406030204" pitchFamily="18" charset="0"/>
+                        <a:ea typeface="MS Mincho" panose="02020609040205080304" pitchFamily="49" charset="-128"/>
+                        <a:cs typeface="Times New Roman" panose="02020603050405020304" pitchFamily="18" charset="0"/>
+                      </a:endParaRPr>
+                    </a:p>
+                  </a:txBody>
+                  <a:tcPr marL="68580" marR="68580" marT="0" marB="0"/>
+                </a:tc>
+                <a:tc>
+                  <a:txBody>
+                    <a:bodyPr/>
+                    <a:lstStyle/>
+                    <a:p>
+                      <a:pPr>
+                        <a:spcAft>
+                          <a:spcPts val="0"/>
+                        </a:spcAft>
+                      </a:pPr>
+                      <a:r>
+                        <a:rPr lang="de-DE" sz="1200">
+                          <a:effectLst/>
+                        </a:rPr>
+                        <a:t>Systemtest und Dokumentation </a:t>
+                      </a:r>
+                      <a:endParaRPr lang="de-CH" sz="1200">
+                        <a:effectLst/>
+                        <a:latin typeface="Cambria" panose="02040503050406030204" pitchFamily="18" charset="0"/>
+                        <a:ea typeface="MS Mincho" panose="02020609040205080304" pitchFamily="49" charset="-128"/>
+                        <a:cs typeface="Times New Roman" panose="02020603050405020304" pitchFamily="18" charset="0"/>
+                      </a:endParaRPr>
+                    </a:p>
+                  </a:txBody>
+                  <a:tcPr marL="68580" marR="68580" marT="0" marB="0"/>
+                </a:tc>
+              </a:tr>
+              <a:tr h="231184">
+                <a:tc>
+                  <a:txBody>
+                    <a:bodyPr/>
+                    <a:lstStyle/>
+                    <a:p>
+                      <a:pPr>
+                        <a:spcAft>
+                          <a:spcPts val="0"/>
+                        </a:spcAft>
+                      </a:pPr>
+                      <a:r>
+                        <a:rPr lang="de-DE" sz="1200">
+                          <a:effectLst/>
+                        </a:rPr>
+                        <a:t> </a:t>
+                      </a:r>
+                      <a:endParaRPr lang="de-CH" sz="1200">
+                        <a:effectLst/>
+                        <a:latin typeface="Cambria" panose="02040503050406030204" pitchFamily="18" charset="0"/>
+                        <a:ea typeface="MS Mincho" panose="02020609040205080304" pitchFamily="49" charset="-128"/>
+                        <a:cs typeface="Times New Roman" panose="02020603050405020304" pitchFamily="18" charset="0"/>
+                      </a:endParaRPr>
+                    </a:p>
+                  </a:txBody>
+                  <a:tcPr marL="68580" marR="68580" marT="0" marB="0"/>
+                </a:tc>
+                <a:tc>
+                  <a:txBody>
+                    <a:bodyPr/>
+                    <a:lstStyle/>
+                    <a:p>
+                      <a:pPr>
+                        <a:spcAft>
+                          <a:spcPts val="0"/>
+                        </a:spcAft>
+                      </a:pPr>
+                      <a:r>
+                        <a:rPr lang="de-DE" sz="1200">
+                          <a:effectLst/>
+                        </a:rPr>
+                        <a:t>13</a:t>
+                      </a:r>
+                      <a:endParaRPr lang="de-CH" sz="1200">
+                        <a:effectLst/>
+                        <a:latin typeface="Cambria" panose="02040503050406030204" pitchFamily="18" charset="0"/>
+                        <a:ea typeface="MS Mincho" panose="02020609040205080304" pitchFamily="49" charset="-128"/>
+                        <a:cs typeface="Times New Roman" panose="02020603050405020304" pitchFamily="18" charset="0"/>
+                      </a:endParaRPr>
+                    </a:p>
+                  </a:txBody>
+                  <a:tcPr marL="68580" marR="68580" marT="0" marB="0"/>
+                </a:tc>
+                <a:tc>
+                  <a:txBody>
+                    <a:bodyPr/>
+                    <a:lstStyle/>
+                    <a:p>
+                      <a:pPr>
+                        <a:spcAft>
+                          <a:spcPts val="0"/>
+                        </a:spcAft>
+                      </a:pPr>
+                      <a:r>
+                        <a:rPr lang="de-DE" sz="1200" dirty="0">
+                          <a:effectLst/>
+                        </a:rPr>
+                        <a:t>Schlusspräsentation</a:t>
+                      </a:r>
+                      <a:endParaRPr lang="de-CH" sz="1200" dirty="0">
+                        <a:effectLst/>
+                        <a:latin typeface="Cambria" panose="02040503050406030204" pitchFamily="18" charset="0"/>
+                        <a:ea typeface="MS Mincho" panose="02020609040205080304" pitchFamily="49" charset="-128"/>
+                        <a:cs typeface="Times New Roman" panose="02020603050405020304" pitchFamily="18" charset="0"/>
+                      </a:endParaRPr>
+                    </a:p>
+                  </a:txBody>
+                  <a:tcPr marL="68580" marR="68580" marT="0" marB="0"/>
+                </a:tc>
+              </a:tr>
+            </a:tbl>
+          </a:graphicData>
+        </a:graphic>
+      </p:graphicFrame>
+    </p:spTree>
+    <p:extLst>
+      <p:ext uri="{BB962C8B-B14F-4D97-AF65-F5344CB8AC3E}">
+        <p14:creationId xmlns:p14="http://schemas.microsoft.com/office/powerpoint/2010/main" val="4126107018"/>
+      </p:ext>
+    </p:extLst>
+  </p:cSld>
+  <p:clrMapOvr>
+    <a:masterClrMapping/>
+  </p:clrMapOvr>
+  <mc:AlternateContent xmlns:mc="http://schemas.openxmlformats.org/markup-compatibility/2006" xmlns:p14="http://schemas.microsoft.com/office/powerpoint/2010/main">
+    <mc:Choice Requires="p14">
+      <p:transition spd="slow" p14:dur="2000"/>
+    </mc:Choice>
+    <mc:Fallback xmlns="">
+      <p:transition xmlns:p14="http://schemas.microsoft.com/office/powerpoint/2010/main" spd="slow"/>
+    </mc:Fallback>
+  </mc:AlternateContent>
+  <p:timing>
+    <p:tnLst>
+      <p:par>
+        <p:cTn id="1" dur="indefinite" restart="never" nodeType="tmRoot"/>
+      </p:par>
+    </p:tnLst>
+  </p:timing>
+</p:sld>
+</file>
+
+<file path=ppt/slides/slide8.xml><?xml version="1.0" encoding="utf-8"?>
+<p:sld xmlns:a="http://schemas.openxmlformats.org/drawingml/2006/main" xmlns:r="http://schemas.openxmlformats.org/officeDocument/2006/relationships" xmlns:p="http://schemas.openxmlformats.org/presentationml/2006/main">
+  <p:cSld>
+    <p:spTree>
+      <p:nvGrpSpPr>
+        <p:cNvPr id="1" name=""/>
+        <p:cNvGrpSpPr/>
+        <p:nvPr/>
+      </p:nvGrpSpPr>
+      <p:grpSpPr>
+        <a:xfrm>
+          <a:off x="0" y="0"/>
+          <a:ext cx="0" cy="0"/>
+          <a:chOff x="0" y="0"/>
+          <a:chExt cx="0" cy="0"/>
+        </a:xfrm>
+      </p:grpSpPr>
+      <p:sp>
+        <p:nvSpPr>
+          <p:cNvPr id="2" name="Titel 1"/>
+          <p:cNvSpPr>
+            <a:spLocks noGrp="1"/>
+          </p:cNvSpPr>
+          <p:nvPr>
+            <p:ph type="title"/>
+          </p:nvPr>
+        </p:nvSpPr>
+        <p:spPr/>
+        <p:txBody>
+          <a:bodyPr/>
+          <a:lstStyle/>
+          <a:p>
+            <a:r>
               <a:rPr lang="de-DE" dirty="0" smtClean="0"/>
               <a:t>Kundennutzen</a:t>
             </a:r>
@@ -5925,21 +7055,107 @@
   <p:clrMapOvr>
     <a:masterClrMapping/>
   </p:clrMapOvr>
-  <mc:AlternateContent xmlns:mc="http://schemas.openxmlformats.org/markup-compatibility/2006">
-    <mc:Choice xmlns:p14="http://schemas.microsoft.com/office/powerpoint/2010/main" Requires="p14">
+  <mc:AlternateContent xmlns:mc="http://schemas.openxmlformats.org/markup-compatibility/2006" xmlns:p14="http://schemas.microsoft.com/office/powerpoint/2010/main">
+    <mc:Choice Requires="p14">
       <p:transition spd="slow" p14:dur="2000"/>
     </mc:Choice>
-    <mc:Fallback>
+    <mc:Fallback xmlns="">
       <p:transition xmlns:p14="http://schemas.microsoft.com/office/powerpoint/2010/main" spd="slow"/>
     </mc:Fallback>
   </mc:AlternateContent>
   <p:timing>
     <p:tnLst>
       <p:par>
-        <p:cTn xmlns:p14="http://schemas.microsoft.com/office/powerpoint/2010/main" id="1" dur="indefinite" restart="never" nodeType="tmRoot"/>
+        <p:cTn id="1" dur="indefinite" restart="never" nodeType="tmRoot"/>
       </p:par>
     </p:tnLst>
   </p:timing>
+</p:sld>
+</file>
+
+<file path=ppt/slides/slide9.xml><?xml version="1.0" encoding="utf-8"?>
+<p:sld xmlns:a="http://schemas.openxmlformats.org/drawingml/2006/main" xmlns:r="http://schemas.openxmlformats.org/officeDocument/2006/relationships" xmlns:p="http://schemas.openxmlformats.org/presentationml/2006/main">
+  <p:cSld>
+    <p:spTree>
+      <p:nvGrpSpPr>
+        <p:cNvPr id="1" name=""/>
+        <p:cNvGrpSpPr/>
+        <p:nvPr/>
+      </p:nvGrpSpPr>
+      <p:grpSpPr>
+        <a:xfrm>
+          <a:off x="0" y="0"/>
+          <a:ext cx="0" cy="0"/>
+          <a:chOff x="0" y="0"/>
+          <a:chExt cx="0" cy="0"/>
+        </a:xfrm>
+      </p:grpSpPr>
+      <p:sp>
+        <p:nvSpPr>
+          <p:cNvPr id="2" name="Title 1"/>
+          <p:cNvSpPr>
+            <a:spLocks noGrp="1"/>
+          </p:cNvSpPr>
+          <p:nvPr>
+            <p:ph type="title"/>
+          </p:nvPr>
+        </p:nvSpPr>
+        <p:spPr>
+          <a:xfrm>
+            <a:off x="1727944" y="301625"/>
+            <a:ext cx="7844681" cy="1260475"/>
+          </a:xfrm>
+        </p:spPr>
+        <p:txBody>
+          <a:bodyPr/>
+          <a:lstStyle/>
+          <a:p>
+            <a:r>
+              <a:rPr lang="de-CH" dirty="0" smtClean="0"/>
+              <a:t>Wirtschaftlichkeit</a:t>
+            </a:r>
+            <a:endParaRPr lang="de-CH" dirty="0"/>
+          </a:p>
+        </p:txBody>
+      </p:sp>
+      <p:sp>
+        <p:nvSpPr>
+          <p:cNvPr id="3" name="Content Placeholder 2"/>
+          <p:cNvSpPr>
+            <a:spLocks noGrp="1"/>
+          </p:cNvSpPr>
+          <p:nvPr>
+            <p:ph idx="1"/>
+          </p:nvPr>
+        </p:nvSpPr>
+        <p:spPr>
+          <a:xfrm>
+            <a:off x="1727944" y="1768475"/>
+            <a:ext cx="7844681" cy="4987925"/>
+          </a:xfrm>
+        </p:spPr>
+        <p:txBody>
+          <a:bodyPr/>
+          <a:lstStyle/>
+          <a:p>
+            <a:pPr marL="457200" indent="-457200">
+              <a:buFont typeface="Arial" panose="020B0604020202020204" pitchFamily="34" charset="0"/>
+              <a:buChar char="•"/>
+            </a:pPr>
+            <a:endParaRPr lang="de-CH" dirty="0"/>
+          </a:p>
+        </p:txBody>
+      </p:sp>
+    </p:spTree>
+    <p:extLst>
+      <p:ext uri="{BB962C8B-B14F-4D97-AF65-F5344CB8AC3E}">
+        <p14:creationId xmlns:p14="http://schemas.microsoft.com/office/powerpoint/2010/main" val="303706923"/>
+      </p:ext>
+    </p:extLst>
+  </p:cSld>
+  <p:clrMapOvr>
+    <a:masterClrMapping/>
+  </p:clrMapOvr>
 </p:sld>
 </file>
 
@@ -6189,7 +7405,7 @@
         <a:effectLst/>
         <a:extLst>
           <a:ext uri="{AF507438-7753-43e0-B8FC-AC1667EBCBE1}">
-            <a14:hiddenEffects xmlns:a14="http://schemas.microsoft.com/office/drawing/2010/main">
+            <a14:hiddenEffects xmlns:a14="http://schemas.microsoft.com/office/drawing/2010/main" xmlns="">
               <a:effectLst>
                 <a:outerShdw blurRad="63500" dist="38099" dir="2700000" algn="ctr" rotWithShape="0">
                   <a:schemeClr val="bg2">
@@ -6265,7 +7481,7 @@
         <a:effectLst/>
         <a:extLst>
           <a:ext uri="{AF507438-7753-43e0-B8FC-AC1667EBCBE1}">
-            <a14:hiddenEffects xmlns:a14="http://schemas.microsoft.com/office/drawing/2010/main">
+            <a14:hiddenEffects xmlns:a14="http://schemas.microsoft.com/office/drawing/2010/main" xmlns="">
               <a:effectLst>
                 <a:outerShdw blurRad="63500" dist="38099" dir="2700000" algn="ctr" rotWithShape="0">
                   <a:schemeClr val="bg2">

</xml_diff>

<commit_message>
Präsentation: meinen Inhalt eingefügt (Erweiterte Anforderungen, Ideen)
</commit_message>
<xml_diff>
--- a/Planung/projektskizze_nad.pptx
+++ b/Planung/projektskizze_nad.pptx
@@ -5,7 +5,7 @@
     <p:sldMasterId id="2147483648" r:id="rId1"/>
   </p:sldMasterIdLst>
   <p:notesMasterIdLst>
-    <p:notesMasterId r:id="rId13"/>
+    <p:notesMasterId r:id="rId14"/>
   </p:notesMasterIdLst>
   <p:sldIdLst>
     <p:sldId id="256" r:id="rId2"/>
@@ -13,12 +13,13 @@
     <p:sldId id="269" r:id="rId4"/>
     <p:sldId id="264" r:id="rId5"/>
     <p:sldId id="265" r:id="rId6"/>
-    <p:sldId id="257" r:id="rId7"/>
-    <p:sldId id="258" r:id="rId8"/>
-    <p:sldId id="259" r:id="rId9"/>
-    <p:sldId id="260" r:id="rId10"/>
-    <p:sldId id="266" r:id="rId11"/>
-    <p:sldId id="268" r:id="rId12"/>
+    <p:sldId id="271" r:id="rId7"/>
+    <p:sldId id="257" r:id="rId8"/>
+    <p:sldId id="258" r:id="rId9"/>
+    <p:sldId id="259" r:id="rId10"/>
+    <p:sldId id="260" r:id="rId11"/>
+    <p:sldId id="266" r:id="rId12"/>
+    <p:sldId id="268" r:id="rId13"/>
   </p:sldIdLst>
   <p:sldSz cx="10080625" cy="7559675"/>
   <p:notesSz cx="7559675" cy="10691813"/>
@@ -189,7 +190,7 @@
   </p:defaultTextStyle>
   <p:extLst>
     <p:ext uri="{EFAFB233-063F-42B5-8137-9DF3F51BA10A}">
-      <p15:sldGuideLst xmlns:p15="http://schemas.microsoft.com/office/powerpoint/2012/main" xmlns="">
+      <p15:sldGuideLst xmlns="" xmlns:p15="http://schemas.microsoft.com/office/powerpoint/2012/main">
         <p15:guide id="1" orient="horz" pos="2160">
           <p15:clr>
             <a:srgbClr val="A4A3A4"/>
@@ -203,7 +204,7 @@
       </p15:sldGuideLst>
     </p:ext>
     <p:ext uri="{2D200454-40CA-4A62-9FC3-DE9A4176ACB9}">
-      <p15:notesGuideLst xmlns:p15="http://schemas.microsoft.com/office/powerpoint/2012/main" xmlns="">
+      <p15:notesGuideLst xmlns="" xmlns:p15="http://schemas.microsoft.com/office/powerpoint/2012/main">
         <p15:guide id="1" orient="horz" pos="2880">
           <p15:clr>
             <a:srgbClr val="A4A3A4"/>
@@ -269,14 +270,14 @@
           </a:ln>
           <a:effectLst/>
           <a:extLst>
-            <a:ext uri="{909E8E84-426E-40DD-AFC4-6F175D3DCCD1}">
+            <a:ext uri="{909E8E84-426E-40dd-AFC4-6F175D3DCCD1}">
               <a14:hiddenFill xmlns:a14="http://schemas.microsoft.com/office/drawing/2010/main">
                 <a:solidFill>
                   <a:srgbClr val="FFFFFF"/>
                 </a:solidFill>
               </a14:hiddenFill>
             </a:ext>
-            <a:ext uri="{91240B29-F687-4F45-9708-019B960494DF}">
+            <a:ext uri="{91240B29-F687-4f45-9708-019B960494DF}">
               <a14:hiddenLine xmlns:a14="http://schemas.microsoft.com/office/drawing/2010/main" w="9525">
                 <a:solidFill>
                   <a:srgbClr val="808080"/>
@@ -286,7 +287,7 @@
                 <a:tailEnd/>
               </a14:hiddenLine>
             </a:ext>
-            <a:ext uri="{AF507438-7753-43E0-B8FC-AC1667EBCBE1}">
+            <a:ext uri="{AF507438-7753-43e0-B8FC-AC1667EBCBE1}">
               <a14:hiddenEffects xmlns:a14="http://schemas.microsoft.com/office/drawing/2010/main">
                 <a:effectLst>
                   <a:outerShdw blurRad="63500" dist="38099" dir="2700000" algn="ctr" rotWithShape="0">
@@ -298,7 +299,7 @@
               </a14:hiddenEffects>
             </a:ext>
             <a:ext uri="{FAA26D3D-D897-4be2-8F04-BA451C77F1D7}">
-              <ma14:placeholderFlag xmlns:ma14="http://schemas.microsoft.com/office/mac/drawingml/2011/main" xmlns="" val="1"/>
+              <ma14:placeholderFlag xmlns:ma14="http://schemas.microsoft.com/office/mac/drawingml/2011/main" val="1"/>
             </a:ext>
           </a:extLst>
         </p:spPr>
@@ -327,14 +328,14 @@
           </a:ln>
           <a:effectLst/>
           <a:extLst>
-            <a:ext uri="{909E8E84-426E-40DD-AFC4-6F175D3DCCD1}">
+            <a:ext uri="{909E8E84-426E-40dd-AFC4-6F175D3DCCD1}">
               <a14:hiddenFill xmlns:a14="http://schemas.microsoft.com/office/drawing/2010/main">
                 <a:solidFill>
                   <a:srgbClr val="FFFFFF"/>
                 </a:solidFill>
               </a14:hiddenFill>
             </a:ext>
-            <a:ext uri="{91240B29-F687-4F45-9708-019B960494DF}">
+            <a:ext uri="{91240B29-F687-4f45-9708-019B960494DF}">
               <a14:hiddenLine xmlns:a14="http://schemas.microsoft.com/office/drawing/2010/main" w="9525">
                 <a:solidFill>
                   <a:srgbClr val="808080"/>
@@ -344,7 +345,7 @@
                 <a:tailEnd/>
               </a14:hiddenLine>
             </a:ext>
-            <a:ext uri="{AF507438-7753-43E0-B8FC-AC1667EBCBE1}">
+            <a:ext uri="{AF507438-7753-43e0-B8FC-AC1667EBCBE1}">
               <a14:hiddenEffects xmlns:a14="http://schemas.microsoft.com/office/drawing/2010/main">
                 <a:effectLst>
                   <a:outerShdw blurRad="63500" dist="38099" dir="2700000" algn="ctr" rotWithShape="0">
@@ -356,7 +357,7 @@
               </a14:hiddenEffects>
             </a:ext>
             <a:ext uri="{FAA26D3D-D897-4be2-8F04-BA451C77F1D7}">
-              <ma14:placeholderFlag xmlns:ma14="http://schemas.microsoft.com/office/mac/drawingml/2011/main" xmlns="" val="1"/>
+              <ma14:placeholderFlag xmlns:ma14="http://schemas.microsoft.com/office/mac/drawingml/2011/main" val="1"/>
             </a:ext>
           </a:extLst>
         </p:spPr>
@@ -397,14 +398,14 @@
           </a:ln>
           <a:effectLst/>
           <a:extLst>
-            <a:ext uri="{909E8E84-426E-40DD-AFC4-6F175D3DCCD1}">
+            <a:ext uri="{909E8E84-426E-40dd-AFC4-6F175D3DCCD1}">
               <a14:hiddenFill xmlns:a14="http://schemas.microsoft.com/office/drawing/2010/main">
                 <a:solidFill>
                   <a:srgbClr val="FFFFFF"/>
                 </a:solidFill>
               </a14:hiddenFill>
             </a:ext>
-            <a:ext uri="{91240B29-F687-4F45-9708-019B960494DF}">
+            <a:ext uri="{91240B29-F687-4f45-9708-019B960494DF}">
               <a14:hiddenLine xmlns:a14="http://schemas.microsoft.com/office/drawing/2010/main" w="9525">
                 <a:solidFill>
                   <a:srgbClr val="808080"/>
@@ -414,7 +415,7 @@
                 <a:tailEnd/>
               </a14:hiddenLine>
             </a:ext>
-            <a:ext uri="{AF507438-7753-43E0-B8FC-AC1667EBCBE1}">
+            <a:ext uri="{AF507438-7753-43e0-B8FC-AC1667EBCBE1}">
               <a14:hiddenEffects xmlns:a14="http://schemas.microsoft.com/office/drawing/2010/main">
                 <a:effectLst>
                   <a:outerShdw blurRad="63500" dist="38099" dir="2700000" algn="ctr" rotWithShape="0">
@@ -426,7 +427,7 @@
               </a14:hiddenEffects>
             </a:ext>
             <a:ext uri="{FAA26D3D-D897-4be2-8F04-BA451C77F1D7}">
-              <ma14:placeholderFlag xmlns:ma14="http://schemas.microsoft.com/office/mac/drawingml/2011/main" xmlns="" val="1"/>
+              <ma14:placeholderFlag xmlns:ma14="http://schemas.microsoft.com/office/mac/drawingml/2011/main" val="1"/>
             </a:ext>
           </a:extLst>
         </p:spPr>
@@ -481,14 +482,14 @@
           </a:ln>
           <a:effectLst/>
           <a:extLst>
-            <a:ext uri="{909E8E84-426E-40DD-AFC4-6F175D3DCCD1}">
+            <a:ext uri="{909E8E84-426E-40dd-AFC4-6F175D3DCCD1}">
               <a14:hiddenFill xmlns:a14="http://schemas.microsoft.com/office/drawing/2010/main">
                 <a:solidFill>
                   <a:srgbClr val="FFFFFF"/>
                 </a:solidFill>
               </a14:hiddenFill>
             </a:ext>
-            <a:ext uri="{91240B29-F687-4F45-9708-019B960494DF}">
+            <a:ext uri="{91240B29-F687-4f45-9708-019B960494DF}">
               <a14:hiddenLine xmlns:a14="http://schemas.microsoft.com/office/drawing/2010/main" w="9525">
                 <a:solidFill>
                   <a:srgbClr val="808080"/>
@@ -498,7 +499,7 @@
                 <a:tailEnd/>
               </a14:hiddenLine>
             </a:ext>
-            <a:ext uri="{AF507438-7753-43E0-B8FC-AC1667EBCBE1}">
+            <a:ext uri="{AF507438-7753-43e0-B8FC-AC1667EBCBE1}">
               <a14:hiddenEffects xmlns:a14="http://schemas.microsoft.com/office/drawing/2010/main">
                 <a:effectLst>
                   <a:outerShdw blurRad="63500" dist="38099" dir="2700000" algn="ctr" rotWithShape="0">
@@ -510,7 +511,7 @@
               </a14:hiddenEffects>
             </a:ext>
             <a:ext uri="{FAA26D3D-D897-4be2-8F04-BA451C77F1D7}">
-              <ma14:placeholderFlag xmlns:ma14="http://schemas.microsoft.com/office/mac/drawingml/2011/main" xmlns="" val="1"/>
+              <ma14:placeholderFlag xmlns:ma14="http://schemas.microsoft.com/office/mac/drawingml/2011/main" val="1"/>
             </a:ext>
           </a:extLst>
         </p:spPr>
@@ -565,14 +566,14 @@
           </a:ln>
           <a:effectLst/>
           <a:extLst>
-            <a:ext uri="{909E8E84-426E-40DD-AFC4-6F175D3DCCD1}">
+            <a:ext uri="{909E8E84-426E-40dd-AFC4-6F175D3DCCD1}">
               <a14:hiddenFill xmlns:a14="http://schemas.microsoft.com/office/drawing/2010/main">
                 <a:solidFill>
                   <a:srgbClr val="FFFFFF"/>
                 </a:solidFill>
               </a14:hiddenFill>
             </a:ext>
-            <a:ext uri="{91240B29-F687-4F45-9708-019B960494DF}">
+            <a:ext uri="{91240B29-F687-4f45-9708-019B960494DF}">
               <a14:hiddenLine xmlns:a14="http://schemas.microsoft.com/office/drawing/2010/main" w="9525">
                 <a:solidFill>
                   <a:srgbClr val="808080"/>
@@ -582,7 +583,7 @@
                 <a:tailEnd/>
               </a14:hiddenLine>
             </a:ext>
-            <a:ext uri="{AF507438-7753-43E0-B8FC-AC1667EBCBE1}">
+            <a:ext uri="{AF507438-7753-43e0-B8FC-AC1667EBCBE1}">
               <a14:hiddenEffects xmlns:a14="http://schemas.microsoft.com/office/drawing/2010/main">
                 <a:effectLst>
                   <a:outerShdw blurRad="63500" dist="38099" dir="2700000" algn="ctr" rotWithShape="0">
@@ -594,7 +595,7 @@
               </a14:hiddenEffects>
             </a:ext>
             <a:ext uri="{FAA26D3D-D897-4be2-8F04-BA451C77F1D7}">
-              <ma14:placeholderFlag xmlns:ma14="http://schemas.microsoft.com/office/mac/drawingml/2011/main" xmlns="" val="1"/>
+              <ma14:placeholderFlag xmlns:ma14="http://schemas.microsoft.com/office/mac/drawingml/2011/main" val="1"/>
             </a:ext>
           </a:extLst>
         </p:spPr>
@@ -649,14 +650,14 @@
           </a:ln>
           <a:effectLst/>
           <a:extLst>
-            <a:ext uri="{909E8E84-426E-40DD-AFC4-6F175D3DCCD1}">
+            <a:ext uri="{909E8E84-426E-40dd-AFC4-6F175D3DCCD1}">
               <a14:hiddenFill xmlns:a14="http://schemas.microsoft.com/office/drawing/2010/main">
                 <a:solidFill>
                   <a:srgbClr val="FFFFFF"/>
                 </a:solidFill>
               </a14:hiddenFill>
             </a:ext>
-            <a:ext uri="{91240B29-F687-4F45-9708-019B960494DF}">
+            <a:ext uri="{91240B29-F687-4f45-9708-019B960494DF}">
               <a14:hiddenLine xmlns:a14="http://schemas.microsoft.com/office/drawing/2010/main" w="9525">
                 <a:solidFill>
                   <a:srgbClr val="808080"/>
@@ -666,7 +667,7 @@
                 <a:tailEnd/>
               </a14:hiddenLine>
             </a:ext>
-            <a:ext uri="{AF507438-7753-43E0-B8FC-AC1667EBCBE1}">
+            <a:ext uri="{AF507438-7753-43e0-B8FC-AC1667EBCBE1}">
               <a14:hiddenEffects xmlns:a14="http://schemas.microsoft.com/office/drawing/2010/main">
                 <a:effectLst>
                   <a:outerShdw blurRad="63500" dist="38099" dir="2700000" algn="ctr" rotWithShape="0">
@@ -678,7 +679,7 @@
               </a14:hiddenEffects>
             </a:ext>
             <a:ext uri="{FAA26D3D-D897-4be2-8F04-BA451C77F1D7}">
-              <ma14:placeholderFlag xmlns:ma14="http://schemas.microsoft.com/office/mac/drawingml/2011/main" xmlns="" val="1"/>
+              <ma14:placeholderFlag xmlns:ma14="http://schemas.microsoft.com/office/mac/drawingml/2011/main" val="1"/>
             </a:ext>
           </a:extLst>
         </p:spPr>
@@ -953,7 +954,7 @@
             <a:tailEnd/>
           </a:ln>
           <a:extLst>
-            <a:ext uri="{AF507438-7753-43E0-B8FC-AC1667EBCBE1}">
+            <a:ext uri="{AF507438-7753-43e0-B8FC-AC1667EBCBE1}">
               <a14:hiddenEffects xmlns:a14="http://schemas.microsoft.com/office/drawing/2010/main">
                 <a:effectLst>
                   <a:outerShdw blurRad="63500" dist="38099" dir="2700000" algn="ctr" rotWithShape="0">
@@ -988,14 +989,14 @@
           <a:noFill/>
           <a:ln/>
           <a:extLst>
-            <a:ext uri="{909E8E84-426E-40DD-AFC4-6F175D3DCCD1}">
+            <a:ext uri="{909E8E84-426E-40dd-AFC4-6F175D3DCCD1}">
               <a14:hiddenFill xmlns:a14="http://schemas.microsoft.com/office/drawing/2010/main">
                 <a:solidFill>
                   <a:srgbClr val="FFFFFF"/>
                 </a:solidFill>
               </a14:hiddenFill>
             </a:ext>
-            <a:ext uri="{91240B29-F687-4F45-9708-019B960494DF}">
+            <a:ext uri="{91240B29-F687-4f45-9708-019B960494DF}">
               <a14:hiddenLine xmlns:a14="http://schemas.microsoft.com/office/drawing/2010/main" w="9525">
                 <a:solidFill>
                   <a:srgbClr val="808080"/>
@@ -1005,7 +1006,7 @@
                 <a:tailEnd/>
               </a14:hiddenLine>
             </a:ext>
-            <a:ext uri="{AF507438-7753-43E0-B8FC-AC1667EBCBE1}">
+            <a:ext uri="{AF507438-7753-43e0-B8FC-AC1667EBCBE1}">
               <a14:hiddenEffects xmlns:a14="http://schemas.microsoft.com/office/drawing/2010/main">
                 <a:effectLst>
                   <a:outerShdw blurRad="63500" dist="38099" dir="2700000" algn="ctr" rotWithShape="0">
@@ -1084,7 +1085,7 @@
             <a:fld id="{511573D2-CE3B-B847-B193-A58F98F48F64}" type="slidenum">
               <a:rPr lang="en-US"/>
               <a:pPr/>
-              <a:t>11</a:t>
+              <a:t>12</a:t>
             </a:fld>
             <a:endParaRPr lang="en-US"/>
           </a:p>
@@ -1120,7 +1121,7 @@
             <a:tailEnd/>
           </a:ln>
           <a:extLst>
-            <a:ext uri="{AF507438-7753-43E0-B8FC-AC1667EBCBE1}">
+            <a:ext uri="{AF507438-7753-43e0-B8FC-AC1667EBCBE1}">
               <a14:hiddenEffects xmlns:a14="http://schemas.microsoft.com/office/drawing/2010/main">
                 <a:effectLst>
                   <a:outerShdw blurRad="63500" dist="38099" dir="2700000" algn="ctr" rotWithShape="0">
@@ -1155,14 +1156,14 @@
           <a:noFill/>
           <a:ln/>
           <a:extLst>
-            <a:ext uri="{909E8E84-426E-40DD-AFC4-6F175D3DCCD1}">
+            <a:ext uri="{909E8E84-426E-40dd-AFC4-6F175D3DCCD1}">
               <a14:hiddenFill xmlns:a14="http://schemas.microsoft.com/office/drawing/2010/main">
                 <a:solidFill>
                   <a:srgbClr val="FFFFFF"/>
                 </a:solidFill>
               </a14:hiddenFill>
             </a:ext>
-            <a:ext uri="{91240B29-F687-4F45-9708-019B960494DF}">
+            <a:ext uri="{91240B29-F687-4f45-9708-019B960494DF}">
               <a14:hiddenLine xmlns:a14="http://schemas.microsoft.com/office/drawing/2010/main" w="9525">
                 <a:solidFill>
                   <a:srgbClr val="808080"/>
@@ -1172,7 +1173,7 @@
                 <a:tailEnd/>
               </a14:hiddenLine>
             </a:ext>
-            <a:ext uri="{AF507438-7753-43E0-B8FC-AC1667EBCBE1}">
+            <a:ext uri="{AF507438-7753-43e0-B8FC-AC1667EBCBE1}">
               <a14:hiddenEffects xmlns:a14="http://schemas.microsoft.com/office/drawing/2010/main">
                 <a:effectLst>
                   <a:outerShdw blurRad="63500" dist="38099" dir="2700000" algn="ctr" rotWithShape="0">
@@ -3863,14 +3864,14 @@
           </a:ln>
           <a:effectLst/>
           <a:extLst>
-            <a:ext uri="{909E8E84-426E-40DD-AFC4-6F175D3DCCD1}">
+            <a:ext uri="{909E8E84-426E-40dd-AFC4-6F175D3DCCD1}">
               <a14:hiddenFill xmlns:a14="http://schemas.microsoft.com/office/drawing/2010/main">
                 <a:solidFill>
                   <a:srgbClr val="FFFFFF"/>
                 </a:solidFill>
               </a14:hiddenFill>
             </a:ext>
-            <a:ext uri="{91240B29-F687-4F45-9708-019B960494DF}">
+            <a:ext uri="{91240B29-F687-4f45-9708-019B960494DF}">
               <a14:hiddenLine xmlns:a14="http://schemas.microsoft.com/office/drawing/2010/main" w="9525">
                 <a:solidFill>
                   <a:srgbClr val="808080"/>
@@ -3880,7 +3881,7 @@
                 <a:tailEnd/>
               </a14:hiddenLine>
             </a:ext>
-            <a:ext uri="{AF507438-7753-43E0-B8FC-AC1667EBCBE1}">
+            <a:ext uri="{AF507438-7753-43e0-B8FC-AC1667EBCBE1}">
               <a14:hiddenEffects xmlns:a14="http://schemas.microsoft.com/office/drawing/2010/main">
                 <a:effectLst>
                   <a:outerShdw blurRad="63500" dist="38099" dir="2700000" algn="ctr" rotWithShape="0">
@@ -3892,7 +3893,7 @@
               </a14:hiddenEffects>
             </a:ext>
             <a:ext uri="{FAA26D3D-D897-4be2-8F04-BA451C77F1D7}">
-              <ma14:placeholderFlag xmlns:ma14="http://schemas.microsoft.com/office/mac/drawingml/2011/main" xmlns="" val="1"/>
+              <ma14:placeholderFlag xmlns:ma14="http://schemas.microsoft.com/office/mac/drawingml/2011/main" val="1"/>
             </a:ext>
           </a:extLst>
         </p:spPr>
@@ -3936,14 +3937,14 @@
           </a:ln>
           <a:effectLst/>
           <a:extLst>
-            <a:ext uri="{909E8E84-426E-40DD-AFC4-6F175D3DCCD1}">
+            <a:ext uri="{909E8E84-426E-40dd-AFC4-6F175D3DCCD1}">
               <a14:hiddenFill xmlns:a14="http://schemas.microsoft.com/office/drawing/2010/main">
                 <a:solidFill>
                   <a:srgbClr val="FFFFFF"/>
                 </a:solidFill>
               </a14:hiddenFill>
             </a:ext>
-            <a:ext uri="{91240B29-F687-4F45-9708-019B960494DF}">
+            <a:ext uri="{91240B29-F687-4f45-9708-019B960494DF}">
               <a14:hiddenLine xmlns:a14="http://schemas.microsoft.com/office/drawing/2010/main" w="9525">
                 <a:solidFill>
                   <a:srgbClr val="808080"/>
@@ -3953,7 +3954,7 @@
                 <a:tailEnd/>
               </a14:hiddenLine>
             </a:ext>
-            <a:ext uri="{AF507438-7753-43E0-B8FC-AC1667EBCBE1}">
+            <a:ext uri="{AF507438-7753-43e0-B8FC-AC1667EBCBE1}">
               <a14:hiddenEffects xmlns:a14="http://schemas.microsoft.com/office/drawing/2010/main">
                 <a:effectLst>
                   <a:outerShdw blurRad="63500" dist="38099" dir="2700000" algn="ctr" rotWithShape="0">
@@ -3965,7 +3966,7 @@
               </a14:hiddenEffects>
             </a:ext>
             <a:ext uri="{FAA26D3D-D897-4be2-8F04-BA451C77F1D7}">
-              <ma14:placeholderFlag xmlns:ma14="http://schemas.microsoft.com/office/mac/drawingml/2011/main" xmlns="" val="1"/>
+              <ma14:placeholderFlag xmlns:ma14="http://schemas.microsoft.com/office/mac/drawingml/2011/main" val="1"/>
             </a:ext>
           </a:extLst>
         </p:spPr>
@@ -4065,14 +4066,14 @@
           </a:ln>
           <a:effectLst/>
           <a:extLst>
-            <a:ext uri="{909E8E84-426E-40DD-AFC4-6F175D3DCCD1}">
+            <a:ext uri="{909E8E84-426E-40dd-AFC4-6F175D3DCCD1}">
               <a14:hiddenFill xmlns:a14="http://schemas.microsoft.com/office/drawing/2010/main">
                 <a:solidFill>
                   <a:srgbClr val="FFFFFF"/>
                 </a:solidFill>
               </a14:hiddenFill>
             </a:ext>
-            <a:ext uri="{91240B29-F687-4F45-9708-019B960494DF}">
+            <a:ext uri="{91240B29-F687-4f45-9708-019B960494DF}">
               <a14:hiddenLine xmlns:a14="http://schemas.microsoft.com/office/drawing/2010/main" w="9525">
                 <a:solidFill>
                   <a:srgbClr val="808080"/>
@@ -4082,7 +4083,7 @@
                 <a:tailEnd/>
               </a14:hiddenLine>
             </a:ext>
-            <a:ext uri="{AF507438-7753-43E0-B8FC-AC1667EBCBE1}">
+            <a:ext uri="{AF507438-7753-43e0-B8FC-AC1667EBCBE1}">
               <a14:hiddenEffects xmlns:a14="http://schemas.microsoft.com/office/drawing/2010/main">
                 <a:effectLst>
                   <a:outerShdw blurRad="63500" dist="38099" dir="2700000" algn="ctr" rotWithShape="0">
@@ -4094,7 +4095,7 @@
               </a14:hiddenEffects>
             </a:ext>
             <a:ext uri="{FAA26D3D-D897-4be2-8F04-BA451C77F1D7}">
-              <ma14:placeholderFlag xmlns:ma14="http://schemas.microsoft.com/office/mac/drawingml/2011/main" xmlns="" val="1"/>
+              <ma14:placeholderFlag xmlns:ma14="http://schemas.microsoft.com/office/mac/drawingml/2011/main" val="1"/>
             </a:ext>
           </a:extLst>
         </p:spPr>
@@ -4148,14 +4149,14 @@
           </a:ln>
           <a:effectLst/>
           <a:extLst>
-            <a:ext uri="{909E8E84-426E-40DD-AFC4-6F175D3DCCD1}">
+            <a:ext uri="{909E8E84-426E-40dd-AFC4-6F175D3DCCD1}">
               <a14:hiddenFill xmlns:a14="http://schemas.microsoft.com/office/drawing/2010/main">
                 <a:solidFill>
                   <a:srgbClr val="FFFFFF"/>
                 </a:solidFill>
               </a14:hiddenFill>
             </a:ext>
-            <a:ext uri="{91240B29-F687-4F45-9708-019B960494DF}">
+            <a:ext uri="{91240B29-F687-4f45-9708-019B960494DF}">
               <a14:hiddenLine xmlns:a14="http://schemas.microsoft.com/office/drawing/2010/main" w="9525">
                 <a:solidFill>
                   <a:srgbClr val="808080"/>
@@ -4165,7 +4166,7 @@
                 <a:tailEnd/>
               </a14:hiddenLine>
             </a:ext>
-            <a:ext uri="{AF507438-7753-43E0-B8FC-AC1667EBCBE1}">
+            <a:ext uri="{AF507438-7753-43e0-B8FC-AC1667EBCBE1}">
               <a14:hiddenEffects xmlns:a14="http://schemas.microsoft.com/office/drawing/2010/main">
                 <a:effectLst>
                   <a:outerShdw blurRad="63500" dist="38099" dir="2700000" algn="ctr" rotWithShape="0">
@@ -4177,7 +4178,7 @@
               </a14:hiddenEffects>
             </a:ext>
             <a:ext uri="{FAA26D3D-D897-4be2-8F04-BA451C77F1D7}">
-              <ma14:placeholderFlag xmlns:ma14="http://schemas.microsoft.com/office/mac/drawingml/2011/main" xmlns="" val="1"/>
+              <ma14:placeholderFlag xmlns:ma14="http://schemas.microsoft.com/office/mac/drawingml/2011/main" val="1"/>
             </a:ext>
           </a:extLst>
         </p:spPr>
@@ -4232,14 +4233,14 @@
           </a:ln>
           <a:effectLst/>
           <a:extLst>
-            <a:ext uri="{909E8E84-426E-40DD-AFC4-6F175D3DCCD1}">
+            <a:ext uri="{909E8E84-426E-40dd-AFC4-6F175D3DCCD1}">
               <a14:hiddenFill xmlns:a14="http://schemas.microsoft.com/office/drawing/2010/main">
                 <a:solidFill>
                   <a:srgbClr val="FFFFFF"/>
                 </a:solidFill>
               </a14:hiddenFill>
             </a:ext>
-            <a:ext uri="{91240B29-F687-4F45-9708-019B960494DF}">
+            <a:ext uri="{91240B29-F687-4f45-9708-019B960494DF}">
               <a14:hiddenLine xmlns:a14="http://schemas.microsoft.com/office/drawing/2010/main" w="9525">
                 <a:solidFill>
                   <a:srgbClr val="808080"/>
@@ -4249,7 +4250,7 @@
                 <a:tailEnd/>
               </a14:hiddenLine>
             </a:ext>
-            <a:ext uri="{AF507438-7753-43E0-B8FC-AC1667EBCBE1}">
+            <a:ext uri="{AF507438-7753-43e0-B8FC-AC1667EBCBE1}">
               <a14:hiddenEffects xmlns:a14="http://schemas.microsoft.com/office/drawing/2010/main">
                 <a:effectLst>
                   <a:outerShdw blurRad="63500" dist="38099" dir="2700000" algn="ctr" rotWithShape="0">
@@ -4261,7 +4262,7 @@
               </a14:hiddenEffects>
             </a:ext>
             <a:ext uri="{FAA26D3D-D897-4be2-8F04-BA451C77F1D7}">
-              <ma14:placeholderFlag xmlns:ma14="http://schemas.microsoft.com/office/mac/drawingml/2011/main" xmlns="" val="1"/>
+              <ma14:placeholderFlag xmlns:ma14="http://schemas.microsoft.com/office/mac/drawingml/2011/main" val="1"/>
             </a:ext>
           </a:extLst>
         </p:spPr>
@@ -4959,11 +4960,11 @@
   <p:clrMapOvr>
     <a:masterClrMapping/>
   </p:clrMapOvr>
-  <p:transition spd="med"/>
+  <p:transition xmlns:p14="http://schemas.microsoft.com/office/powerpoint/2010/main" spd="med"/>
   <p:timing>
     <p:tnLst>
       <p:par>
-        <p:cTn id="1" dur="indefinite" restart="never" nodeType="tmRoot">
+        <p:cTn xmlns:p14="http://schemas.microsoft.com/office/powerpoint/2010/main" id="1" dur="indefinite" restart="never" nodeType="tmRoot">
           <p:childTnLst>
             <p:seq concurrent="1" nextAc="seek">
               <p:cTn id="2" dur="0" nodeType="mainSeq"/>
@@ -5009,6 +5010,250 @@
       </p:grpSpPr>
       <p:sp>
         <p:nvSpPr>
+          <p:cNvPr id="2" name="Titel 1"/>
+          <p:cNvSpPr>
+            <a:spLocks noGrp="1"/>
+          </p:cNvSpPr>
+          <p:nvPr>
+            <p:ph type="title"/>
+          </p:nvPr>
+        </p:nvSpPr>
+        <p:spPr/>
+        <p:txBody>
+          <a:bodyPr/>
+          <a:lstStyle/>
+          <a:p>
+            <a:r>
+              <a:rPr lang="de-DE" dirty="0" smtClean="0"/>
+              <a:t>Kundennutzen</a:t>
+            </a:r>
+            <a:endParaRPr lang="de-DE" dirty="0"/>
+          </a:p>
+        </p:txBody>
+      </p:sp>
+      <p:sp>
+        <p:nvSpPr>
+          <p:cNvPr id="6" name="Textfeld 5"/>
+          <p:cNvSpPr txBox="1"/>
+          <p:nvPr/>
+        </p:nvSpPr>
+        <p:spPr>
+          <a:xfrm>
+            <a:off x="3044379" y="1907629"/>
+            <a:ext cx="5740349" cy="868392"/>
+          </a:xfrm>
+          <a:prstGeom prst="rect">
+            <a:avLst/>
+          </a:prstGeom>
+          <a:noFill/>
+        </p:spPr>
+        <p:txBody>
+          <a:bodyPr wrap="square" rtlCol="0">
+            <a:spAutoFit/>
+          </a:bodyPr>
+          <a:lstStyle/>
+          <a:p>
+            <a:pPr marL="285750" lvl="0" indent="-285750">
+              <a:buFontTx/>
+              <a:buChar char="-"/>
+            </a:pPr>
+            <a:r>
+              <a:rPr lang="de-DE" dirty="0"/>
+              <a:t>In Schachvereinen und Schachkursen kann „</a:t>
+            </a:r>
+            <a:r>
+              <a:rPr lang="de-DE" dirty="0" err="1"/>
+              <a:t>necaREx</a:t>
+            </a:r>
+            <a:r>
+              <a:rPr lang="de-DE" dirty="0"/>
+              <a:t>“ als effiziente Lernsoftware eingesetzt werden</a:t>
+            </a:r>
+            <a:r>
+              <a:rPr lang="de-DE" dirty="0" smtClean="0"/>
+              <a:t>.</a:t>
+            </a:r>
+            <a:endParaRPr lang="de-DE" dirty="0"/>
+          </a:p>
+        </p:txBody>
+      </p:sp>
+      <p:sp>
+        <p:nvSpPr>
+          <p:cNvPr id="5" name="Textfeld 4"/>
+          <p:cNvSpPr txBox="1"/>
+          <p:nvPr/>
+        </p:nvSpPr>
+        <p:spPr>
+          <a:xfrm>
+            <a:off x="3044379" y="2839437"/>
+            <a:ext cx="5740349" cy="610783"/>
+          </a:xfrm>
+          <a:prstGeom prst="rect">
+            <a:avLst/>
+          </a:prstGeom>
+          <a:noFill/>
+        </p:spPr>
+        <p:txBody>
+          <a:bodyPr wrap="square" rtlCol="0">
+            <a:spAutoFit/>
+          </a:bodyPr>
+          <a:lstStyle/>
+          <a:p>
+            <a:pPr marL="285750" indent="-285750">
+              <a:buFontTx/>
+              <a:buChar char="-"/>
+            </a:pPr>
+            <a:r>
+              <a:rPr lang="de-DE" dirty="0"/>
+              <a:t>Durch das schlichte und intuitive Design ist „</a:t>
+            </a:r>
+            <a:r>
+              <a:rPr lang="de-DE" dirty="0" err="1"/>
+              <a:t>necaREx</a:t>
+            </a:r>
+            <a:r>
+              <a:rPr lang="de-DE" dirty="0"/>
+              <a:t>“ einfach und schnell zu erlernen</a:t>
+            </a:r>
+            <a:r>
+              <a:rPr lang="de-DE" dirty="0" smtClean="0"/>
+              <a:t>.</a:t>
+            </a:r>
+            <a:endParaRPr lang="de-DE" dirty="0"/>
+          </a:p>
+        </p:txBody>
+      </p:sp>
+      <p:sp>
+        <p:nvSpPr>
+          <p:cNvPr id="8" name="Textfeld 7"/>
+          <p:cNvSpPr txBox="1"/>
+          <p:nvPr/>
+        </p:nvSpPr>
+        <p:spPr>
+          <a:xfrm>
+            <a:off x="3044379" y="3529094"/>
+            <a:ext cx="5740349" cy="1126001"/>
+          </a:xfrm>
+          <a:prstGeom prst="rect">
+            <a:avLst/>
+          </a:prstGeom>
+          <a:noFill/>
+        </p:spPr>
+        <p:txBody>
+          <a:bodyPr wrap="square" rtlCol="0">
+            <a:spAutoFit/>
+          </a:bodyPr>
+          <a:lstStyle/>
+          <a:p>
+            <a:pPr marL="285750" lvl="0" indent="-285750">
+              <a:buFontTx/>
+              <a:buChar char="-"/>
+            </a:pPr>
+            <a:r>
+              <a:rPr lang="de-DE" dirty="0"/>
+              <a:t>Da ein „</a:t>
+            </a:r>
+            <a:r>
+              <a:rPr lang="de-DE" dirty="0" err="1"/>
+              <a:t>necaREx</a:t>
+            </a:r>
+            <a:r>
+              <a:rPr lang="de-DE" dirty="0"/>
+              <a:t>“ Lizenzpaket für einen angemessenen Preis erworben werden kann und ein Paket fünf Lizenzen beinhaltet, stellt es eine kostengünstige Investition dar</a:t>
+            </a:r>
+            <a:r>
+              <a:rPr lang="de-DE" dirty="0" smtClean="0"/>
+              <a:t>.</a:t>
+            </a:r>
+            <a:endParaRPr lang="de-DE" dirty="0"/>
+          </a:p>
+        </p:txBody>
+      </p:sp>
+      <p:sp>
+        <p:nvSpPr>
+          <p:cNvPr id="9" name="Textfeld 8"/>
+          <p:cNvSpPr txBox="1"/>
+          <p:nvPr/>
+        </p:nvSpPr>
+        <p:spPr>
+          <a:xfrm>
+            <a:off x="3044379" y="4742068"/>
+            <a:ext cx="5740349" cy="868392"/>
+          </a:xfrm>
+          <a:prstGeom prst="rect">
+            <a:avLst/>
+          </a:prstGeom>
+          <a:noFill/>
+        </p:spPr>
+        <p:txBody>
+          <a:bodyPr wrap="square" rtlCol="0">
+            <a:spAutoFit/>
+          </a:bodyPr>
+          <a:lstStyle/>
+          <a:p>
+            <a:pPr marL="285750" indent="-285750">
+              <a:buFontTx/>
+              <a:buChar char="-"/>
+            </a:pPr>
+            <a:r>
+              <a:rPr lang="de-DE" dirty="0"/>
+              <a:t>Dank unserer übersichtlichen Benutzeroberfläche kann der Spieler zu jeder Zeit wichtige Spielinformationen entnehmen</a:t>
+            </a:r>
+            <a:r>
+              <a:rPr lang="de-DE" dirty="0" smtClean="0"/>
+              <a:t>.</a:t>
+            </a:r>
+            <a:endParaRPr lang="de-DE" dirty="0"/>
+          </a:p>
+        </p:txBody>
+      </p:sp>
+    </p:spTree>
+    <p:extLst>
+      <p:ext uri="{BB962C8B-B14F-4D97-AF65-F5344CB8AC3E}">
+        <p14:creationId xmlns:p14="http://schemas.microsoft.com/office/powerpoint/2010/main" val="537607213"/>
+      </p:ext>
+    </p:extLst>
+  </p:cSld>
+  <p:clrMapOvr>
+    <a:masterClrMapping/>
+  </p:clrMapOvr>
+  <mc:AlternateContent xmlns:mc="http://schemas.openxmlformats.org/markup-compatibility/2006" xmlns:p14="http://schemas.microsoft.com/office/powerpoint/2010/main">
+    <mc:Choice Requires="p14">
+      <p:transition spd="slow" p14:dur="2000"/>
+    </mc:Choice>
+    <mc:Fallback xmlns="">
+      <p:transition xmlns:p14="http://schemas.microsoft.com/office/powerpoint/2010/main" spd="slow"/>
+    </mc:Fallback>
+  </mc:AlternateContent>
+  <p:timing>
+    <p:tnLst>
+      <p:par>
+        <p:cTn xmlns:p14="http://schemas.microsoft.com/office/powerpoint/2010/main" id="1" dur="indefinite" restart="never" nodeType="tmRoot"/>
+      </p:par>
+    </p:tnLst>
+  </p:timing>
+</p:sld>
+</file>
+
+<file path=ppt/slides/slide11.xml><?xml version="1.0" encoding="utf-8"?>
+<p:sld xmlns:a="http://schemas.openxmlformats.org/drawingml/2006/main" xmlns:r="http://schemas.openxmlformats.org/officeDocument/2006/relationships" xmlns:p="http://schemas.openxmlformats.org/presentationml/2006/main">
+  <p:cSld>
+    <p:spTree>
+      <p:nvGrpSpPr>
+        <p:cNvPr id="1" name=""/>
+        <p:cNvGrpSpPr/>
+        <p:nvPr/>
+      </p:nvGrpSpPr>
+      <p:grpSpPr>
+        <a:xfrm>
+          <a:off x="0" y="0"/>
+          <a:ext cx="0" cy="0"/>
+          <a:chOff x="0" y="0"/>
+          <a:chExt cx="0" cy="0"/>
+        </a:xfrm>
+      </p:grpSpPr>
+      <p:sp>
+        <p:nvSpPr>
           <p:cNvPr id="2" name="Title 1"/>
           <p:cNvSpPr>
             <a:spLocks noGrp="1"/>
@@ -5061,7 +5306,7 @@
           </a:ln>
           <a:effectLst/>
           <a:extLst>
-            <a:ext uri="{91240B29-F687-4F45-9708-019B960494DF}">
+            <a:ext uri="{91240B29-F687-4f45-9708-019B960494DF}">
               <a14:hiddenLine xmlns:a14="http://schemas.microsoft.com/office/drawing/2010/main" w="9525">
                 <a:solidFill>
                   <a:srgbClr val="000000"/>
@@ -5071,7 +5316,7 @@
                 <a:tailEnd/>
               </a14:hiddenLine>
             </a:ext>
-            <a:ext uri="{AF507438-7753-43E0-B8FC-AC1667EBCBE1}">
+            <a:ext uri="{AF507438-7753-43e0-B8FC-AC1667EBCBE1}">
               <a14:hiddenEffects xmlns:a14="http://schemas.microsoft.com/office/drawing/2010/main">
                 <a:effectLst>
                   <a:outerShdw blurRad="63500" dist="38099" dir="2700000" algn="ctr" rotWithShape="0">
@@ -5144,7 +5389,7 @@
           </a:ln>
           <a:effectLst/>
           <a:extLst>
-            <a:ext uri="{91240B29-F687-4F45-9708-019B960494DF}">
+            <a:ext uri="{91240B29-F687-4f45-9708-019B960494DF}">
               <a14:hiddenLine xmlns:a14="http://schemas.microsoft.com/office/drawing/2010/main" w="9525">
                 <a:solidFill>
                   <a:srgbClr val="000000"/>
@@ -5154,7 +5399,7 @@
                 <a:tailEnd/>
               </a14:hiddenLine>
             </a:ext>
-            <a:ext uri="{AF507438-7753-43E0-B8FC-AC1667EBCBE1}">
+            <a:ext uri="{AF507438-7753-43e0-B8FC-AC1667EBCBE1}">
               <a14:hiddenEffects xmlns:a14="http://schemas.microsoft.com/office/drawing/2010/main">
                 <a:effectLst>
                   <a:outerShdw blurRad="63500" dist="38099" dir="2700000" algn="ctr" rotWithShape="0">
@@ -5255,14 +5500,14 @@
           </a:ln>
           <a:effectLst/>
           <a:extLst>
-            <a:ext uri="{909E8E84-426E-40DD-AFC4-6F175D3DCCD1}">
+            <a:ext uri="{909E8E84-426E-40dd-AFC4-6F175D3DCCD1}">
               <a14:hiddenFill xmlns:a14="http://schemas.microsoft.com/office/drawing/2010/main">
                 <a:solidFill>
                   <a:srgbClr val="FFFFFF"/>
                 </a:solidFill>
               </a14:hiddenFill>
             </a:ext>
-            <a:ext uri="{91240B29-F687-4F45-9708-019B960494DF}">
+            <a:ext uri="{91240B29-F687-4f45-9708-019B960494DF}">
               <a14:hiddenLine xmlns:a14="http://schemas.microsoft.com/office/drawing/2010/main" w="9525">
                 <a:solidFill>
                   <a:srgbClr val="000000"/>
@@ -5272,7 +5517,7 @@
                 <a:tailEnd/>
               </a14:hiddenLine>
             </a:ext>
-            <a:ext uri="{AF507438-7753-43E0-B8FC-AC1667EBCBE1}">
+            <a:ext uri="{AF507438-7753-43e0-B8FC-AC1667EBCBE1}">
               <a14:hiddenEffects xmlns:a14="http://schemas.microsoft.com/office/drawing/2010/main">
                 <a:effectLst>
                   <a:outerShdw blurRad="63500" dist="38099" dir="2700000" algn="ctr" rotWithShape="0">
@@ -5616,14 +5861,14 @@
           </a:ln>
           <a:effectLst/>
           <a:extLst>
-            <a:ext uri="{909E8E84-426E-40DD-AFC4-6F175D3DCCD1}">
+            <a:ext uri="{909E8E84-426E-40dd-AFC4-6F175D3DCCD1}">
               <a14:hiddenFill xmlns:a14="http://schemas.microsoft.com/office/drawing/2010/main">
                 <a:solidFill>
                   <a:srgbClr val="FFFFFF"/>
                 </a:solidFill>
               </a14:hiddenFill>
             </a:ext>
-            <a:ext uri="{91240B29-F687-4F45-9708-019B960494DF}">
+            <a:ext uri="{91240B29-F687-4f45-9708-019B960494DF}">
               <a14:hiddenLine xmlns:a14="http://schemas.microsoft.com/office/drawing/2010/main" w="9525">
                 <a:solidFill>
                   <a:srgbClr val="000000"/>
@@ -5633,7 +5878,7 @@
                 <a:tailEnd/>
               </a14:hiddenLine>
             </a:ext>
-            <a:ext uri="{AF507438-7753-43E0-B8FC-AC1667EBCBE1}">
+            <a:ext uri="{AF507438-7753-43e0-B8FC-AC1667EBCBE1}">
               <a14:hiddenEffects xmlns:a14="http://schemas.microsoft.com/office/drawing/2010/main">
                 <a:effectLst>
                   <a:outerShdw blurRad="63500" dist="38099" dir="2700000" algn="ctr" rotWithShape="0">
@@ -5946,10 +6191,17 @@
   <p:clrMapOvr>
     <a:masterClrMapping/>
   </p:clrMapOvr>
+  <p:timing>
+    <p:tnLst>
+      <p:par>
+        <p:cTn xmlns:p14="http://schemas.microsoft.com/office/powerpoint/2010/main" id="1" dur="indefinite" restart="never" nodeType="tmRoot"/>
+      </p:par>
+    </p:tnLst>
+  </p:timing>
 </p:sld>
 </file>
 
-<file path=ppt/slides/slide11.xml><?xml version="1.0" encoding="utf-8"?>
+<file path=ppt/slides/slide12.xml><?xml version="1.0" encoding="utf-8"?>
 <p:sld xmlns:a="http://schemas.openxmlformats.org/drawingml/2006/main" xmlns:r="http://schemas.openxmlformats.org/officeDocument/2006/relationships" xmlns:p="http://schemas.openxmlformats.org/presentationml/2006/main">
   <p:cSld>
     <p:bg>
@@ -6019,14 +6271,14 @@
           </a:ln>
           <a:effectLst/>
           <a:extLst>
-            <a:ext uri="{909E8E84-426E-40DD-AFC4-6F175D3DCCD1}">
+            <a:ext uri="{909E8E84-426E-40dd-AFC4-6F175D3DCCD1}">
               <a14:hiddenFill xmlns:a14="http://schemas.microsoft.com/office/drawing/2010/main">
                 <a:solidFill>
                   <a:srgbClr val="FFFFFF"/>
                 </a:solidFill>
               </a14:hiddenFill>
             </a:ext>
-            <a:ext uri="{91240B29-F687-4F45-9708-019B960494DF}">
+            <a:ext uri="{91240B29-F687-4f45-9708-019B960494DF}">
               <a14:hiddenLine xmlns:a14="http://schemas.microsoft.com/office/drawing/2010/main" w="9525">
                 <a:solidFill>
                   <a:srgbClr val="808080"/>
@@ -6036,7 +6288,7 @@
                 <a:tailEnd/>
               </a14:hiddenLine>
             </a:ext>
-            <a:ext uri="{AF507438-7753-43E0-B8FC-AC1667EBCBE1}">
+            <a:ext uri="{AF507438-7753-43e0-B8FC-AC1667EBCBE1}">
               <a14:hiddenEffects xmlns:a14="http://schemas.microsoft.com/office/drawing/2010/main">
                 <a:effectLst>
                   <a:outerShdw blurRad="63500" dist="38099" dir="2700000" algn="ctr" rotWithShape="0">
@@ -6383,11 +6635,11 @@
   <p:clrMapOvr>
     <a:masterClrMapping/>
   </p:clrMapOvr>
-  <p:transition spd="med"/>
+  <p:transition xmlns:p14="http://schemas.microsoft.com/office/powerpoint/2010/main" spd="med"/>
   <p:timing>
     <p:tnLst>
       <p:par>
-        <p:cTn id="1" dur="indefinite" restart="never" nodeType="tmRoot">
+        <p:cTn xmlns:p14="http://schemas.microsoft.com/office/powerpoint/2010/main" id="1" dur="indefinite" restart="never" nodeType="tmRoot">
           <p:childTnLst>
             <p:seq concurrent="1" nextAc="seek">
               <p:cTn id="2" dur="0" nodeType="mainSeq"/>
@@ -6483,7 +6735,7 @@
           </a:ln>
           <a:effectLst/>
           <a:extLst>
-            <a:ext uri="{91240B29-F687-4F45-9708-019B960494DF}">
+            <a:ext uri="{91240B29-F687-4f45-9708-019B960494DF}">
               <a14:hiddenLine xmlns:a14="http://schemas.microsoft.com/office/drawing/2010/main" w="9525">
                 <a:solidFill>
                   <a:srgbClr val="000000"/>
@@ -6493,7 +6745,7 @@
                 <a:tailEnd/>
               </a14:hiddenLine>
             </a:ext>
-            <a:ext uri="{AF507438-7753-43E0-B8FC-AC1667EBCBE1}">
+            <a:ext uri="{AF507438-7753-43e0-B8FC-AC1667EBCBE1}">
               <a14:hiddenEffects xmlns:a14="http://schemas.microsoft.com/office/drawing/2010/main">
                 <a:effectLst>
                   <a:outerShdw blurRad="63500" dist="38099" dir="2700000" algn="ctr" rotWithShape="0">
@@ -6579,7 +6831,7 @@
           </a:ln>
           <a:effectLst/>
           <a:extLst>
-            <a:ext uri="{91240B29-F687-4F45-9708-019B960494DF}">
+            <a:ext uri="{91240B29-F687-4f45-9708-019B960494DF}">
               <a14:hiddenLine xmlns:a14="http://schemas.microsoft.com/office/drawing/2010/main" w="9525">
                 <a:solidFill>
                   <a:srgbClr val="000000"/>
@@ -6589,7 +6841,7 @@
                 <a:tailEnd/>
               </a14:hiddenLine>
             </a:ext>
-            <a:ext uri="{AF507438-7753-43E0-B8FC-AC1667EBCBE1}">
+            <a:ext uri="{AF507438-7753-43e0-B8FC-AC1667EBCBE1}">
               <a14:hiddenEffects xmlns:a14="http://schemas.microsoft.com/office/drawing/2010/main">
                 <a:effectLst>
                   <a:outerShdw blurRad="63500" dist="38099" dir="2700000" algn="ctr" rotWithShape="0">
@@ -6651,7 +6903,7 @@
           </a:ln>
           <a:effectLst/>
           <a:extLst>
-            <a:ext uri="{91240B29-F687-4F45-9708-019B960494DF}">
+            <a:ext uri="{91240B29-F687-4f45-9708-019B960494DF}">
               <a14:hiddenLine xmlns:a14="http://schemas.microsoft.com/office/drawing/2010/main" w="9525">
                 <a:solidFill>
                   <a:srgbClr val="000000"/>
@@ -6661,7 +6913,7 @@
                 <a:tailEnd/>
               </a14:hiddenLine>
             </a:ext>
-            <a:ext uri="{AF507438-7753-43E0-B8FC-AC1667EBCBE1}">
+            <a:ext uri="{AF507438-7753-43e0-B8FC-AC1667EBCBE1}">
               <a14:hiddenEffects xmlns:a14="http://schemas.microsoft.com/office/drawing/2010/main">
                 <a:effectLst>
                   <a:outerShdw blurRad="63500" dist="38099" dir="2700000" algn="ctr" rotWithShape="0">
@@ -6725,7 +6977,7 @@
           </a:ln>
           <a:effectLst/>
           <a:extLst>
-            <a:ext uri="{91240B29-F687-4F45-9708-019B960494DF}">
+            <a:ext uri="{91240B29-F687-4f45-9708-019B960494DF}">
               <a14:hiddenLine xmlns:a14="http://schemas.microsoft.com/office/drawing/2010/main" w="9525">
                 <a:solidFill>
                   <a:srgbClr val="000000"/>
@@ -6735,7 +6987,7 @@
                 <a:tailEnd/>
               </a14:hiddenLine>
             </a:ext>
-            <a:ext uri="{AF507438-7753-43E0-B8FC-AC1667EBCBE1}">
+            <a:ext uri="{AF507438-7753-43e0-B8FC-AC1667EBCBE1}">
               <a14:hiddenEffects xmlns:a14="http://schemas.microsoft.com/office/drawing/2010/main">
                 <a:effectLst>
                   <a:outerShdw blurRad="63500" dist="38099" dir="2700000" algn="ctr" rotWithShape="0">
@@ -6825,12 +7077,12 @@
           </a:ln>
           <a:effectLst/>
           <a:extLst>
-            <a:ext uri="{909E8E84-426E-40DD-AFC4-6F175D3DCCD1}">
+            <a:ext uri="{909E8E84-426E-40dd-AFC4-6F175D3DCCD1}">
               <a14:hiddenFill xmlns:a14="http://schemas.microsoft.com/office/drawing/2010/main">
                 <a:noFill/>
               </a14:hiddenFill>
             </a:ext>
-            <a:ext uri="{AF507438-7753-43E0-B8FC-AC1667EBCBE1}">
+            <a:ext uri="{AF507438-7753-43e0-B8FC-AC1667EBCBE1}">
               <a14:hiddenEffects xmlns:a14="http://schemas.microsoft.com/office/drawing/2010/main">
                 <a:effectLst>
                   <a:outerShdw blurRad="63500" dist="38099" dir="2700000" algn="ctr" rotWithShape="0">
@@ -6873,12 +7125,12 @@
           </a:ln>
           <a:effectLst/>
           <a:extLst>
-            <a:ext uri="{909E8E84-426E-40DD-AFC4-6F175D3DCCD1}">
+            <a:ext uri="{909E8E84-426E-40dd-AFC4-6F175D3DCCD1}">
               <a14:hiddenFill xmlns:a14="http://schemas.microsoft.com/office/drawing/2010/main">
                 <a:noFill/>
               </a14:hiddenFill>
             </a:ext>
-            <a:ext uri="{AF507438-7753-43E0-B8FC-AC1667EBCBE1}">
+            <a:ext uri="{AF507438-7753-43e0-B8FC-AC1667EBCBE1}">
               <a14:hiddenEffects xmlns:a14="http://schemas.microsoft.com/office/drawing/2010/main">
                 <a:effectLst>
                   <a:outerShdw blurRad="63500" dist="38099" dir="2700000" algn="ctr" rotWithShape="0">
@@ -6918,7 +7170,7 @@
           </a:ln>
           <a:effectLst/>
           <a:extLst>
-            <a:ext uri="{91240B29-F687-4F45-9708-019B960494DF}">
+            <a:ext uri="{91240B29-F687-4f45-9708-019B960494DF}">
               <a14:hiddenLine xmlns:a14="http://schemas.microsoft.com/office/drawing/2010/main" w="9525">
                 <a:solidFill>
                   <a:srgbClr val="000000"/>
@@ -6928,7 +7180,7 @@
                 <a:tailEnd/>
               </a14:hiddenLine>
             </a:ext>
-            <a:ext uri="{AF507438-7753-43E0-B8FC-AC1667EBCBE1}">
+            <a:ext uri="{AF507438-7753-43e0-B8FC-AC1667EBCBE1}">
               <a14:hiddenEffects xmlns:a14="http://schemas.microsoft.com/office/drawing/2010/main">
                 <a:effectLst>
                   <a:outerShdw blurRad="63500" dist="38099" dir="2700000" algn="ctr" rotWithShape="0">
@@ -7008,6 +7260,13 @@
   <p:clrMapOvr>
     <a:masterClrMapping/>
   </p:clrMapOvr>
+  <p:timing>
+    <p:tnLst>
+      <p:par>
+        <p:cTn xmlns:p14="http://schemas.microsoft.com/office/powerpoint/2010/main" id="1" dur="indefinite" restart="never" nodeType="tmRoot"/>
+      </p:par>
+    </p:tnLst>
+  </p:timing>
 </p:sld>
 </file>
 
@@ -7082,7 +7341,7 @@
           </a:ln>
           <a:effectLst/>
           <a:extLst>
-            <a:ext uri="{91240B29-F687-4F45-9708-019B960494DF}">
+            <a:ext uri="{91240B29-F687-4f45-9708-019B960494DF}">
               <a14:hiddenLine xmlns:a14="http://schemas.microsoft.com/office/drawing/2010/main" w="9525">
                 <a:solidFill>
                   <a:srgbClr val="000000"/>
@@ -7092,7 +7351,7 @@
                 <a:tailEnd/>
               </a14:hiddenLine>
             </a:ext>
-            <a:ext uri="{AF507438-7753-43E0-B8FC-AC1667EBCBE1}">
+            <a:ext uri="{AF507438-7753-43e0-B8FC-AC1667EBCBE1}">
               <a14:hiddenEffects xmlns:a14="http://schemas.microsoft.com/office/drawing/2010/main">
                 <a:effectLst>
                   <a:outerShdw blurRad="63500" dist="38099" dir="2700000" algn="ctr" rotWithShape="0">
@@ -7166,7 +7425,7 @@
           </a:ln>
           <a:effectLst/>
           <a:extLst>
-            <a:ext uri="{91240B29-F687-4F45-9708-019B960494DF}">
+            <a:ext uri="{91240B29-F687-4f45-9708-019B960494DF}">
               <a14:hiddenLine xmlns:a14="http://schemas.microsoft.com/office/drawing/2010/main" w="9525">
                 <a:solidFill>
                   <a:srgbClr val="000000"/>
@@ -7176,7 +7435,7 @@
                 <a:tailEnd/>
               </a14:hiddenLine>
             </a:ext>
-            <a:ext uri="{AF507438-7753-43E0-B8FC-AC1667EBCBE1}">
+            <a:ext uri="{AF507438-7753-43e0-B8FC-AC1667EBCBE1}">
               <a14:hiddenEffects xmlns:a14="http://schemas.microsoft.com/office/drawing/2010/main">
                 <a:effectLst>
                   <a:outerShdw blurRad="63500" dist="38099" dir="2700000" algn="ctr" rotWithShape="0">
@@ -7285,7 +7544,7 @@
           </a:ln>
           <a:effectLst/>
           <a:extLst>
-            <a:ext uri="{91240B29-F687-4F45-9708-019B960494DF}">
+            <a:ext uri="{91240B29-F687-4f45-9708-019B960494DF}">
               <a14:hiddenLine xmlns:a14="http://schemas.microsoft.com/office/drawing/2010/main" w="9525">
                 <a:solidFill>
                   <a:srgbClr val="000000"/>
@@ -7295,7 +7554,7 @@
                 <a:tailEnd/>
               </a14:hiddenLine>
             </a:ext>
-            <a:ext uri="{AF507438-7753-43E0-B8FC-AC1667EBCBE1}">
+            <a:ext uri="{AF507438-7753-43e0-B8FC-AC1667EBCBE1}">
               <a14:hiddenEffects xmlns:a14="http://schemas.microsoft.com/office/drawing/2010/main">
                 <a:effectLst>
                   <a:outerShdw blurRad="63500" dist="38099" dir="2700000" algn="ctr" rotWithShape="0">
@@ -7404,7 +7663,7 @@
           </a:ln>
           <a:effectLst/>
           <a:extLst>
-            <a:ext uri="{91240B29-F687-4F45-9708-019B960494DF}">
+            <a:ext uri="{91240B29-F687-4f45-9708-019B960494DF}">
               <a14:hiddenLine xmlns:a14="http://schemas.microsoft.com/office/drawing/2010/main" w="9525">
                 <a:solidFill>
                   <a:srgbClr val="000000"/>
@@ -7414,7 +7673,7 @@
                 <a:tailEnd/>
               </a14:hiddenLine>
             </a:ext>
-            <a:ext uri="{AF507438-7753-43E0-B8FC-AC1667EBCBE1}">
+            <a:ext uri="{AF507438-7753-43e0-B8FC-AC1667EBCBE1}">
               <a14:hiddenEffects xmlns:a14="http://schemas.microsoft.com/office/drawing/2010/main">
                 <a:effectLst>
                   <a:outerShdw blurRad="63500" dist="38099" dir="2700000" algn="ctr" rotWithShape="0">
@@ -7484,14 +7743,14 @@
           </a:ln>
           <a:effectLst/>
           <a:extLst>
-            <a:ext uri="{909E8E84-426E-40DD-AFC4-6F175D3DCCD1}">
+            <a:ext uri="{909E8E84-426E-40dd-AFC4-6F175D3DCCD1}">
               <a14:hiddenFill xmlns:a14="http://schemas.microsoft.com/office/drawing/2010/main">
                 <a:solidFill>
                   <a:srgbClr val="FFFFFF"/>
                 </a:solidFill>
               </a14:hiddenFill>
             </a:ext>
-            <a:ext uri="{AF507438-7753-43E0-B8FC-AC1667EBCBE1}">
+            <a:ext uri="{AF507438-7753-43e0-B8FC-AC1667EBCBE1}">
               <a14:hiddenEffects xmlns:a14="http://schemas.microsoft.com/office/drawing/2010/main">
                 <a:effectLst>
                   <a:outerShdw blurRad="63500" dist="38099" dir="2700000" algn="ctr" rotWithShape="0">
@@ -7603,14 +7862,14 @@
           </a:ln>
           <a:effectLst/>
           <a:extLst>
-            <a:ext uri="{909E8E84-426E-40DD-AFC4-6F175D3DCCD1}">
+            <a:ext uri="{909E8E84-426E-40dd-AFC4-6F175D3DCCD1}">
               <a14:hiddenFill xmlns:a14="http://schemas.microsoft.com/office/drawing/2010/main">
                 <a:solidFill>
                   <a:srgbClr val="FFFFFF"/>
                 </a:solidFill>
               </a14:hiddenFill>
             </a:ext>
-            <a:ext uri="{AF507438-7753-43E0-B8FC-AC1667EBCBE1}">
+            <a:ext uri="{AF507438-7753-43e0-B8FC-AC1667EBCBE1}">
               <a14:hiddenEffects xmlns:a14="http://schemas.microsoft.com/office/drawing/2010/main">
                 <a:effectLst>
                   <a:outerShdw blurRad="63500" dist="38099" dir="2700000" algn="ctr" rotWithShape="0">
@@ -7671,6 +7930,13 @@
   <p:clrMapOvr>
     <a:masterClrMapping/>
   </p:clrMapOvr>
+  <p:timing>
+    <p:tnLst>
+      <p:par>
+        <p:cTn xmlns:p14="http://schemas.microsoft.com/office/powerpoint/2010/main" id="1" dur="indefinite" restart="never" nodeType="tmRoot"/>
+      </p:par>
+    </p:tnLst>
+  </p:timing>
 </p:sld>
 </file>
 
@@ -7766,6 +8032,13 @@
   <p:clrMapOvr>
     <a:masterClrMapping/>
   </p:clrMapOvr>
+  <p:timing>
+    <p:tnLst>
+      <p:par>
+        <p:cTn xmlns:p14="http://schemas.microsoft.com/office/powerpoint/2010/main" id="1" dur="indefinite" restart="never" nodeType="tmRoot"/>
+      </p:par>
+    </p:tnLst>
+  </p:timing>
 </p:sld>
 </file>
 
@@ -7838,6 +8111,48 @@
               <a:buFont typeface="Arial" panose="020B0604020202020204" pitchFamily="34" charset="0"/>
               <a:buChar char="•"/>
             </a:pPr>
+            <a:r>
+              <a:rPr lang="de-CH" dirty="0" smtClean="0"/>
+              <a:t>Anzeige von Statistiken</a:t>
+            </a:r>
+          </a:p>
+          <a:p>
+            <a:pPr marL="457200" indent="-457200">
+              <a:buFont typeface="Arial" panose="020B0604020202020204" pitchFamily="34" charset="0"/>
+              <a:buChar char="•"/>
+            </a:pPr>
+            <a:r>
+              <a:rPr lang="de-CH" dirty="0" err="1" smtClean="0"/>
+              <a:t>Usability</a:t>
+            </a:r>
+            <a:endParaRPr lang="de-CH" dirty="0" smtClean="0"/>
+          </a:p>
+          <a:p>
+            <a:pPr marL="457200" indent="-457200">
+              <a:buFont typeface="Arial" panose="020B0604020202020204" pitchFamily="34" charset="0"/>
+              <a:buChar char="•"/>
+            </a:pPr>
+            <a:r>
+              <a:rPr lang="de-CH" dirty="0" smtClean="0"/>
+              <a:t>Reaktionszeit des Programms unter 2 Sekunden</a:t>
+            </a:r>
+          </a:p>
+          <a:p>
+            <a:pPr marL="857250" lvl="1" indent="-457200">
+              <a:buFont typeface="Arial" panose="020B0604020202020204" pitchFamily="34" charset="0"/>
+              <a:buChar char="•"/>
+            </a:pPr>
+            <a:r>
+              <a:rPr lang="de-CH" dirty="0" smtClean="0"/>
+              <a:t>Computerspieler je nach künstlicher Intelligenz</a:t>
+            </a:r>
+            <a:endParaRPr lang="de-CH" dirty="0" smtClean="0"/>
+          </a:p>
+          <a:p>
+            <a:pPr marL="457200" indent="-457200">
+              <a:buFont typeface="Arial" panose="020B0604020202020204" pitchFamily="34" charset="0"/>
+              <a:buChar char="•"/>
+            </a:pPr>
             <a:endParaRPr lang="de-CH" dirty="0"/>
           </a:p>
         </p:txBody>
@@ -7852,6 +8167,13 @@
   <p:clrMapOvr>
     <a:masterClrMapping/>
   </p:clrMapOvr>
+  <p:timing>
+    <p:tnLst>
+      <p:par>
+        <p:cTn xmlns:p14="http://schemas.microsoft.com/office/powerpoint/2010/main" id="1" dur="indefinite" restart="never" nodeType="tmRoot"/>
+      </p:par>
+    </p:tnLst>
+  </p:timing>
 </p:sld>
 </file>
 
@@ -7874,7 +8196,7 @@
       </p:grpSpPr>
       <p:sp>
         <p:nvSpPr>
-          <p:cNvPr id="2" name="Titel 1"/>
+          <p:cNvPr id="2" name="Title 1"/>
           <p:cNvSpPr>
             <a:spLocks noGrp="1"/>
           </p:cNvSpPr>
@@ -7882,287 +8204,167 @@
             <p:ph type="title"/>
           </p:nvPr>
         </p:nvSpPr>
-        <p:spPr/>
+        <p:spPr>
+          <a:xfrm>
+            <a:off x="1727944" y="301625"/>
+            <a:ext cx="7844681" cy="1260475"/>
+          </a:xfrm>
+        </p:spPr>
         <p:txBody>
           <a:bodyPr/>
           <a:lstStyle/>
           <a:p>
             <a:r>
-              <a:rPr lang="de-DE" dirty="0" err="1" smtClean="0"/>
-              <a:t>Ressouren</a:t>
-            </a:r>
-            <a:endParaRPr lang="de-DE" dirty="0"/>
-          </a:p>
-        </p:txBody>
-      </p:sp>
-      <p:sp>
-        <p:nvSpPr>
-          <p:cNvPr id="6" name="Textfeld 5"/>
-          <p:cNvSpPr txBox="1"/>
-          <p:nvPr/>
+              <a:rPr lang="de-CH" dirty="0" smtClean="0"/>
+              <a:t>Mögliche Erweiterungen</a:t>
+            </a:r>
+            <a:endParaRPr lang="de-CH" dirty="0"/>
+          </a:p>
+        </p:txBody>
+      </p:sp>
+      <p:sp>
+        <p:nvSpPr>
+          <p:cNvPr id="3" name="Content Placeholder 2"/>
+          <p:cNvSpPr>
+            <a:spLocks noGrp="1"/>
+          </p:cNvSpPr>
+          <p:nvPr>
+            <p:ph idx="1"/>
+          </p:nvPr>
         </p:nvSpPr>
         <p:spPr>
           <a:xfrm>
-            <a:off x="3044379" y="1847079"/>
-            <a:ext cx="4941076" cy="353174"/>
+            <a:off x="1727944" y="1768475"/>
+            <a:ext cx="7844681" cy="4987925"/>
+          </a:xfrm>
+        </p:spPr>
+        <p:txBody>
+          <a:bodyPr/>
+          <a:lstStyle/>
+          <a:p>
+            <a:pPr marL="457200" indent="-457200">
+              <a:buFont typeface="Arial" panose="020B0604020202020204" pitchFamily="34" charset="0"/>
+              <a:buChar char="•"/>
+            </a:pPr>
+            <a:r>
+              <a:rPr lang="de-CH" dirty="0" smtClean="0"/>
+              <a:t>Schlagen en </a:t>
+            </a:r>
+            <a:r>
+              <a:rPr lang="de-CH" dirty="0" err="1" smtClean="0"/>
+              <a:t>passant</a:t>
+            </a:r>
+            <a:endParaRPr lang="de-CH" dirty="0" smtClean="0"/>
+          </a:p>
+          <a:p>
+            <a:pPr marL="457200" indent="-457200">
+              <a:buFont typeface="Arial" panose="020B0604020202020204" pitchFamily="34" charset="0"/>
+              <a:buChar char="•"/>
+            </a:pPr>
+            <a:r>
+              <a:rPr lang="de-CH" dirty="0" smtClean="0"/>
+              <a:t>Rochade</a:t>
+            </a:r>
+          </a:p>
+          <a:p>
+            <a:pPr marL="457200" indent="-457200">
+              <a:buFont typeface="Arial" panose="020B0604020202020204" pitchFamily="34" charset="0"/>
+              <a:buChar char="•"/>
+            </a:pPr>
+            <a:r>
+              <a:rPr lang="de-CH" dirty="0" smtClean="0"/>
+              <a:t>Umwandlung des Bauern</a:t>
+            </a:r>
+          </a:p>
+          <a:p>
+            <a:pPr marL="457200" indent="-457200">
+              <a:buFont typeface="Arial" panose="020B0604020202020204" pitchFamily="34" charset="0"/>
+              <a:buChar char="•"/>
+            </a:pPr>
+            <a:endParaRPr lang="de-CH" dirty="0" smtClean="0"/>
+          </a:p>
+          <a:p>
+            <a:pPr marL="457200" indent="-457200">
+              <a:buFont typeface="Arial" panose="020B0604020202020204" pitchFamily="34" charset="0"/>
+              <a:buChar char="•"/>
+            </a:pPr>
+            <a:endParaRPr lang="de-CH" dirty="0"/>
+          </a:p>
+          <a:p>
+            <a:pPr marL="0" indent="0"/>
+            <a:r>
+              <a:rPr lang="de-CH" b="1" dirty="0" smtClean="0"/>
+              <a:t>Technische Erweiterungen</a:t>
+            </a:r>
+          </a:p>
+          <a:p>
+            <a:pPr marL="457200" indent="-457200">
+              <a:buFont typeface="Arial"/>
+              <a:buChar char="•"/>
+            </a:pPr>
+            <a:r>
+              <a:rPr lang="de-CH" dirty="0" smtClean="0"/>
+              <a:t>Verschiedene Schwierigkeitsstufen</a:t>
+            </a:r>
+          </a:p>
+          <a:p>
+            <a:pPr marL="457200" indent="-457200">
+              <a:buFont typeface="Arial"/>
+              <a:buChar char="•"/>
+            </a:pPr>
+            <a:r>
+              <a:rPr lang="de-CH" dirty="0" smtClean="0"/>
+              <a:t>Spiel über Netzwerk</a:t>
+            </a:r>
+            <a:endParaRPr lang="de-CH" dirty="0" smtClean="0"/>
+          </a:p>
+          <a:p>
+            <a:pPr marL="457200" indent="-457200">
+              <a:buFont typeface="Arial" panose="020B0604020202020204" pitchFamily="34" charset="0"/>
+              <a:buChar char="•"/>
+            </a:pPr>
+            <a:endParaRPr lang="de-CH" dirty="0"/>
+          </a:p>
+        </p:txBody>
+      </p:sp>
+      <p:pic>
+        <p:nvPicPr>
+          <p:cNvPr id="8" name="Bild 7"/>
+          <p:cNvPicPr>
+            <a:picLocks noChangeAspect="1"/>
+          </p:cNvPicPr>
+          <p:nvPr/>
+        </p:nvPicPr>
+        <p:blipFill>
+          <a:blip r:embed="rId2"/>
+          <a:stretch>
+            <a:fillRect/>
+          </a:stretch>
+        </p:blipFill>
+        <p:spPr>
+          <a:xfrm>
+            <a:off x="6928521" y="1547590"/>
+            <a:ext cx="3080343" cy="3096344"/>
           </a:xfrm>
           <a:prstGeom prst="rect">
             <a:avLst/>
           </a:prstGeom>
-          <a:noFill/>
         </p:spPr>
-        <p:txBody>
-          <a:bodyPr wrap="none" rtlCol="0">
-            <a:spAutoFit/>
-          </a:bodyPr>
-          <a:lstStyle/>
-          <a:p>
-            <a:r>
-              <a:rPr lang="de-DE" dirty="0" smtClean="0"/>
-              <a:t>- Team bestehend aus 4 Informatikingenieuren</a:t>
-            </a:r>
-            <a:endParaRPr lang="de-DE" dirty="0"/>
-          </a:p>
-        </p:txBody>
-      </p:sp>
-      <p:sp>
-        <p:nvSpPr>
-          <p:cNvPr id="7" name="Textfeld 6"/>
-          <p:cNvSpPr txBox="1"/>
-          <p:nvPr/>
-        </p:nvSpPr>
-        <p:spPr>
-          <a:xfrm>
-            <a:off x="3051564" y="2202527"/>
-            <a:ext cx="1736924" cy="353174"/>
-          </a:xfrm>
-          <a:prstGeom prst="rect">
-            <a:avLst/>
-          </a:prstGeom>
-          <a:noFill/>
-        </p:spPr>
-        <p:txBody>
-          <a:bodyPr wrap="none" rtlCol="0">
-            <a:spAutoFit/>
-          </a:bodyPr>
-          <a:lstStyle/>
-          <a:p>
-            <a:r>
-              <a:rPr lang="de-DE" dirty="0" smtClean="0"/>
-              <a:t>- 1 Projektleiter</a:t>
-            </a:r>
-            <a:endParaRPr lang="de-DE" dirty="0"/>
-          </a:p>
-        </p:txBody>
-      </p:sp>
-      <p:sp>
-        <p:nvSpPr>
-          <p:cNvPr id="9" name="Textfeld 8"/>
-          <p:cNvSpPr txBox="1"/>
-          <p:nvPr/>
-        </p:nvSpPr>
-        <p:spPr>
-          <a:xfrm>
-            <a:off x="3051564" y="2562567"/>
-            <a:ext cx="1519053" cy="353174"/>
-          </a:xfrm>
-          <a:prstGeom prst="rect">
-            <a:avLst/>
-          </a:prstGeom>
-          <a:noFill/>
-        </p:spPr>
-        <p:txBody>
-          <a:bodyPr wrap="none" rtlCol="0">
-            <a:spAutoFit/>
-          </a:bodyPr>
-          <a:lstStyle/>
-          <a:p>
-            <a:r>
-              <a:rPr lang="de-DE" dirty="0" smtClean="0"/>
-              <a:t>- Fähigkeiten</a:t>
-            </a:r>
-          </a:p>
-        </p:txBody>
-      </p:sp>
-      <p:sp>
-        <p:nvSpPr>
-          <p:cNvPr id="10" name="Textfeld 9"/>
-          <p:cNvSpPr txBox="1"/>
-          <p:nvPr/>
-        </p:nvSpPr>
-        <p:spPr>
-          <a:xfrm>
-            <a:off x="4677027" y="2922607"/>
-            <a:ext cx="2326278" cy="353174"/>
-          </a:xfrm>
-          <a:prstGeom prst="rect">
-            <a:avLst/>
-          </a:prstGeom>
-          <a:noFill/>
-        </p:spPr>
-        <p:txBody>
-          <a:bodyPr wrap="none" rtlCol="0">
-            <a:spAutoFit/>
-          </a:bodyPr>
-          <a:lstStyle/>
-          <a:p>
-            <a:pPr marL="285750" indent="-285750">
-              <a:buFontTx/>
-              <a:buChar char="-"/>
-            </a:pPr>
-            <a:r>
-              <a:rPr lang="de-DE" dirty="0" smtClean="0"/>
-              <a:t>Systemarchitektur</a:t>
-            </a:r>
-          </a:p>
-        </p:txBody>
-      </p:sp>
-      <p:sp>
-        <p:nvSpPr>
-          <p:cNvPr id="11" name="Textfeld 10"/>
-          <p:cNvSpPr txBox="1"/>
-          <p:nvPr/>
-        </p:nvSpPr>
-        <p:spPr>
-          <a:xfrm>
-            <a:off x="4680272" y="3282647"/>
-            <a:ext cx="3942105" cy="353174"/>
-          </a:xfrm>
-          <a:prstGeom prst="rect">
-            <a:avLst/>
-          </a:prstGeom>
-          <a:noFill/>
-        </p:spPr>
-        <p:txBody>
-          <a:bodyPr wrap="none" rtlCol="0">
-            <a:spAutoFit/>
-          </a:bodyPr>
-          <a:lstStyle/>
-          <a:p>
-            <a:pPr marL="285750" indent="-285750">
-              <a:buFontTx/>
-              <a:buChar char="-"/>
-            </a:pPr>
-            <a:r>
-              <a:rPr lang="de-DE" dirty="0" smtClean="0"/>
-              <a:t>Objektorientierte Programmierung</a:t>
-            </a:r>
-          </a:p>
-        </p:txBody>
-      </p:sp>
-      <p:sp>
-        <p:nvSpPr>
-          <p:cNvPr id="12" name="Textfeld 11"/>
-          <p:cNvSpPr txBox="1"/>
-          <p:nvPr/>
-        </p:nvSpPr>
-        <p:spPr>
-          <a:xfrm>
-            <a:off x="4680272" y="3642687"/>
-            <a:ext cx="3057247" cy="353174"/>
-          </a:xfrm>
-          <a:prstGeom prst="rect">
-            <a:avLst/>
-          </a:prstGeom>
-          <a:noFill/>
-        </p:spPr>
-        <p:txBody>
-          <a:bodyPr wrap="none" rtlCol="0">
-            <a:spAutoFit/>
-          </a:bodyPr>
-          <a:lstStyle/>
-          <a:p>
-            <a:pPr marL="285750" indent="-285750">
-              <a:buFontTx/>
-              <a:buChar char="-"/>
-            </a:pPr>
-            <a:r>
-              <a:rPr lang="de-DE" dirty="0" smtClean="0"/>
-              <a:t>Objektorientiertes Design</a:t>
-            </a:r>
-          </a:p>
-        </p:txBody>
-      </p:sp>
-      <p:sp>
-        <p:nvSpPr>
-          <p:cNvPr id="13" name="Textfeld 12"/>
-          <p:cNvSpPr txBox="1"/>
-          <p:nvPr/>
-        </p:nvSpPr>
-        <p:spPr>
-          <a:xfrm>
-            <a:off x="3096096" y="4074735"/>
-            <a:ext cx="5047588" cy="353174"/>
-          </a:xfrm>
-          <a:prstGeom prst="rect">
-            <a:avLst/>
-          </a:prstGeom>
-          <a:noFill/>
-        </p:spPr>
-        <p:txBody>
-          <a:bodyPr wrap="none" rtlCol="0">
-            <a:spAutoFit/>
-          </a:bodyPr>
-          <a:lstStyle/>
-          <a:p>
-            <a:r>
-              <a:rPr lang="de-DE" dirty="0" smtClean="0"/>
-              <a:t>- Wissen zur Entwicklung von Spielen aneignen</a:t>
-            </a:r>
-          </a:p>
-        </p:txBody>
-      </p:sp>
-      <p:sp>
-        <p:nvSpPr>
-          <p:cNvPr id="14" name="Textfeld 13"/>
-          <p:cNvSpPr txBox="1"/>
-          <p:nvPr/>
-        </p:nvSpPr>
-        <p:spPr>
-          <a:xfrm>
-            <a:off x="3096096" y="4434775"/>
-            <a:ext cx="4701565" cy="353174"/>
-          </a:xfrm>
-          <a:prstGeom prst="rect">
-            <a:avLst/>
-          </a:prstGeom>
-          <a:noFill/>
-        </p:spPr>
-        <p:txBody>
-          <a:bodyPr wrap="none" rtlCol="0">
-            <a:spAutoFit/>
-          </a:bodyPr>
-          <a:lstStyle/>
-          <a:p>
-            <a:r>
-              <a:rPr lang="de-DE" dirty="0" smtClean="0"/>
-              <a:t>- Gesamtaufwand ca. 250 Personenstunden</a:t>
-            </a:r>
-          </a:p>
-        </p:txBody>
-      </p:sp>
+      </p:pic>
     </p:spTree>
     <p:extLst>
       <p:ext uri="{BB962C8B-B14F-4D97-AF65-F5344CB8AC3E}">
-        <p14:creationId xmlns:p14="http://schemas.microsoft.com/office/powerpoint/2010/main" val="2876731778"/>
+        <p14:creationId xmlns:p14="http://schemas.microsoft.com/office/powerpoint/2010/main" val="1682748979"/>
       </p:ext>
     </p:extLst>
   </p:cSld>
   <p:clrMapOvr>
     <a:masterClrMapping/>
   </p:clrMapOvr>
-  <mc:AlternateContent xmlns:mc="http://schemas.openxmlformats.org/markup-compatibility/2006" xmlns:p14="http://schemas.microsoft.com/office/powerpoint/2010/main">
-    <mc:Choice Requires="p14">
-      <p:transition spd="slow" p14:dur="2000"/>
-    </mc:Choice>
-    <mc:Fallback xmlns="">
-      <p:transition xmlns:p14="http://schemas.microsoft.com/office/powerpoint/2010/main" spd="slow"/>
-    </mc:Fallback>
-  </mc:AlternateContent>
   <p:timing>
     <p:tnLst>
       <p:par>
-        <p:cTn id="1" dur="indefinite" restart="never" nodeType="tmRoot"/>
+        <p:cTn xmlns:p14="http://schemas.microsoft.com/office/powerpoint/2010/main" id="1" dur="indefinite" restart="never" nodeType="tmRoot"/>
       </p:par>
     </p:tnLst>
   </p:timing>
@@ -8202,6 +8404,320 @@
           <a:lstStyle/>
           <a:p>
             <a:r>
+              <a:rPr lang="de-DE" dirty="0" err="1" smtClean="0"/>
+              <a:t>Ressouren</a:t>
+            </a:r>
+            <a:endParaRPr lang="de-DE" dirty="0"/>
+          </a:p>
+        </p:txBody>
+      </p:sp>
+      <p:sp>
+        <p:nvSpPr>
+          <p:cNvPr id="6" name="Textfeld 5"/>
+          <p:cNvSpPr txBox="1"/>
+          <p:nvPr/>
+        </p:nvSpPr>
+        <p:spPr>
+          <a:xfrm>
+            <a:off x="3044379" y="1847079"/>
+            <a:ext cx="4941076" cy="353174"/>
+          </a:xfrm>
+          <a:prstGeom prst="rect">
+            <a:avLst/>
+          </a:prstGeom>
+          <a:noFill/>
+        </p:spPr>
+        <p:txBody>
+          <a:bodyPr wrap="none" rtlCol="0">
+            <a:spAutoFit/>
+          </a:bodyPr>
+          <a:lstStyle/>
+          <a:p>
+            <a:r>
+              <a:rPr lang="de-DE" dirty="0" smtClean="0"/>
+              <a:t>- Team bestehend aus 4 Informatikingenieuren</a:t>
+            </a:r>
+            <a:endParaRPr lang="de-DE" dirty="0"/>
+          </a:p>
+        </p:txBody>
+      </p:sp>
+      <p:sp>
+        <p:nvSpPr>
+          <p:cNvPr id="7" name="Textfeld 6"/>
+          <p:cNvSpPr txBox="1"/>
+          <p:nvPr/>
+        </p:nvSpPr>
+        <p:spPr>
+          <a:xfrm>
+            <a:off x="3051564" y="2202527"/>
+            <a:ext cx="1736924" cy="353174"/>
+          </a:xfrm>
+          <a:prstGeom prst="rect">
+            <a:avLst/>
+          </a:prstGeom>
+          <a:noFill/>
+        </p:spPr>
+        <p:txBody>
+          <a:bodyPr wrap="none" rtlCol="0">
+            <a:spAutoFit/>
+          </a:bodyPr>
+          <a:lstStyle/>
+          <a:p>
+            <a:r>
+              <a:rPr lang="de-DE" dirty="0" smtClean="0"/>
+              <a:t>- 1 Projektleiter</a:t>
+            </a:r>
+            <a:endParaRPr lang="de-DE" dirty="0"/>
+          </a:p>
+        </p:txBody>
+      </p:sp>
+      <p:sp>
+        <p:nvSpPr>
+          <p:cNvPr id="9" name="Textfeld 8"/>
+          <p:cNvSpPr txBox="1"/>
+          <p:nvPr/>
+        </p:nvSpPr>
+        <p:spPr>
+          <a:xfrm>
+            <a:off x="3051564" y="2562567"/>
+            <a:ext cx="1519053" cy="353174"/>
+          </a:xfrm>
+          <a:prstGeom prst="rect">
+            <a:avLst/>
+          </a:prstGeom>
+          <a:noFill/>
+        </p:spPr>
+        <p:txBody>
+          <a:bodyPr wrap="none" rtlCol="0">
+            <a:spAutoFit/>
+          </a:bodyPr>
+          <a:lstStyle/>
+          <a:p>
+            <a:r>
+              <a:rPr lang="de-DE" dirty="0" smtClean="0"/>
+              <a:t>- Fähigkeiten</a:t>
+            </a:r>
+          </a:p>
+        </p:txBody>
+      </p:sp>
+      <p:sp>
+        <p:nvSpPr>
+          <p:cNvPr id="10" name="Textfeld 9"/>
+          <p:cNvSpPr txBox="1"/>
+          <p:nvPr/>
+        </p:nvSpPr>
+        <p:spPr>
+          <a:xfrm>
+            <a:off x="4677027" y="2922607"/>
+            <a:ext cx="2326278" cy="353174"/>
+          </a:xfrm>
+          <a:prstGeom prst="rect">
+            <a:avLst/>
+          </a:prstGeom>
+          <a:noFill/>
+        </p:spPr>
+        <p:txBody>
+          <a:bodyPr wrap="none" rtlCol="0">
+            <a:spAutoFit/>
+          </a:bodyPr>
+          <a:lstStyle/>
+          <a:p>
+            <a:pPr marL="285750" indent="-285750">
+              <a:buFontTx/>
+              <a:buChar char="-"/>
+            </a:pPr>
+            <a:r>
+              <a:rPr lang="de-DE" dirty="0" smtClean="0"/>
+              <a:t>Systemarchitektur</a:t>
+            </a:r>
+          </a:p>
+        </p:txBody>
+      </p:sp>
+      <p:sp>
+        <p:nvSpPr>
+          <p:cNvPr id="11" name="Textfeld 10"/>
+          <p:cNvSpPr txBox="1"/>
+          <p:nvPr/>
+        </p:nvSpPr>
+        <p:spPr>
+          <a:xfrm>
+            <a:off x="4680272" y="3282647"/>
+            <a:ext cx="3942105" cy="353174"/>
+          </a:xfrm>
+          <a:prstGeom prst="rect">
+            <a:avLst/>
+          </a:prstGeom>
+          <a:noFill/>
+        </p:spPr>
+        <p:txBody>
+          <a:bodyPr wrap="none" rtlCol="0">
+            <a:spAutoFit/>
+          </a:bodyPr>
+          <a:lstStyle/>
+          <a:p>
+            <a:pPr marL="285750" indent="-285750">
+              <a:buFontTx/>
+              <a:buChar char="-"/>
+            </a:pPr>
+            <a:r>
+              <a:rPr lang="de-DE" dirty="0" smtClean="0"/>
+              <a:t>Objektorientierte Programmierung</a:t>
+            </a:r>
+          </a:p>
+        </p:txBody>
+      </p:sp>
+      <p:sp>
+        <p:nvSpPr>
+          <p:cNvPr id="12" name="Textfeld 11"/>
+          <p:cNvSpPr txBox="1"/>
+          <p:nvPr/>
+        </p:nvSpPr>
+        <p:spPr>
+          <a:xfrm>
+            <a:off x="4680272" y="3642687"/>
+            <a:ext cx="3057247" cy="353174"/>
+          </a:xfrm>
+          <a:prstGeom prst="rect">
+            <a:avLst/>
+          </a:prstGeom>
+          <a:noFill/>
+        </p:spPr>
+        <p:txBody>
+          <a:bodyPr wrap="none" rtlCol="0">
+            <a:spAutoFit/>
+          </a:bodyPr>
+          <a:lstStyle/>
+          <a:p>
+            <a:pPr marL="285750" indent="-285750">
+              <a:buFontTx/>
+              <a:buChar char="-"/>
+            </a:pPr>
+            <a:r>
+              <a:rPr lang="de-DE" dirty="0" smtClean="0"/>
+              <a:t>Objektorientiertes Design</a:t>
+            </a:r>
+          </a:p>
+        </p:txBody>
+      </p:sp>
+      <p:sp>
+        <p:nvSpPr>
+          <p:cNvPr id="13" name="Textfeld 12"/>
+          <p:cNvSpPr txBox="1"/>
+          <p:nvPr/>
+        </p:nvSpPr>
+        <p:spPr>
+          <a:xfrm>
+            <a:off x="3096096" y="4074735"/>
+            <a:ext cx="5047588" cy="353174"/>
+          </a:xfrm>
+          <a:prstGeom prst="rect">
+            <a:avLst/>
+          </a:prstGeom>
+          <a:noFill/>
+        </p:spPr>
+        <p:txBody>
+          <a:bodyPr wrap="none" rtlCol="0">
+            <a:spAutoFit/>
+          </a:bodyPr>
+          <a:lstStyle/>
+          <a:p>
+            <a:r>
+              <a:rPr lang="de-DE" dirty="0" smtClean="0"/>
+              <a:t>- Wissen zur Entwicklung von Spielen aneignen</a:t>
+            </a:r>
+          </a:p>
+        </p:txBody>
+      </p:sp>
+      <p:sp>
+        <p:nvSpPr>
+          <p:cNvPr id="14" name="Textfeld 13"/>
+          <p:cNvSpPr txBox="1"/>
+          <p:nvPr/>
+        </p:nvSpPr>
+        <p:spPr>
+          <a:xfrm>
+            <a:off x="3096096" y="4434775"/>
+            <a:ext cx="4701565" cy="353174"/>
+          </a:xfrm>
+          <a:prstGeom prst="rect">
+            <a:avLst/>
+          </a:prstGeom>
+          <a:noFill/>
+        </p:spPr>
+        <p:txBody>
+          <a:bodyPr wrap="none" rtlCol="0">
+            <a:spAutoFit/>
+          </a:bodyPr>
+          <a:lstStyle/>
+          <a:p>
+            <a:r>
+              <a:rPr lang="de-DE" dirty="0" smtClean="0"/>
+              <a:t>- Gesamtaufwand ca. 250 Personenstunden</a:t>
+            </a:r>
+          </a:p>
+        </p:txBody>
+      </p:sp>
+    </p:spTree>
+    <p:extLst>
+      <p:ext uri="{BB962C8B-B14F-4D97-AF65-F5344CB8AC3E}">
+        <p14:creationId xmlns:p14="http://schemas.microsoft.com/office/powerpoint/2010/main" val="2876731778"/>
+      </p:ext>
+    </p:extLst>
+  </p:cSld>
+  <p:clrMapOvr>
+    <a:masterClrMapping/>
+  </p:clrMapOvr>
+  <mc:AlternateContent xmlns:mc="http://schemas.openxmlformats.org/markup-compatibility/2006" xmlns:p14="http://schemas.microsoft.com/office/powerpoint/2010/main">
+    <mc:Choice Requires="p14">
+      <p:transition spd="slow" p14:dur="2000"/>
+    </mc:Choice>
+    <mc:Fallback xmlns="">
+      <p:transition xmlns:p14="http://schemas.microsoft.com/office/powerpoint/2010/main" spd="slow"/>
+    </mc:Fallback>
+  </mc:AlternateContent>
+  <p:timing>
+    <p:tnLst>
+      <p:par>
+        <p:cTn xmlns:p14="http://schemas.microsoft.com/office/powerpoint/2010/main" id="1" dur="indefinite" restart="never" nodeType="tmRoot"/>
+      </p:par>
+    </p:tnLst>
+  </p:timing>
+</p:sld>
+</file>
+
+<file path=ppt/slides/slide8.xml><?xml version="1.0" encoding="utf-8"?>
+<p:sld xmlns:a="http://schemas.openxmlformats.org/drawingml/2006/main" xmlns:r="http://schemas.openxmlformats.org/officeDocument/2006/relationships" xmlns:p="http://schemas.openxmlformats.org/presentationml/2006/main">
+  <p:cSld>
+    <p:spTree>
+      <p:nvGrpSpPr>
+        <p:cNvPr id="1" name=""/>
+        <p:cNvGrpSpPr/>
+        <p:nvPr/>
+      </p:nvGrpSpPr>
+      <p:grpSpPr>
+        <a:xfrm>
+          <a:off x="0" y="0"/>
+          <a:ext cx="0" cy="0"/>
+          <a:chOff x="0" y="0"/>
+          <a:chExt cx="0" cy="0"/>
+        </a:xfrm>
+      </p:grpSpPr>
+      <p:sp>
+        <p:nvSpPr>
+          <p:cNvPr id="2" name="Titel 1"/>
+          <p:cNvSpPr>
+            <a:spLocks noGrp="1"/>
+          </p:cNvSpPr>
+          <p:nvPr>
+            <p:ph type="title"/>
+          </p:nvPr>
+        </p:nvSpPr>
+        <p:spPr/>
+        <p:txBody>
+          <a:bodyPr/>
+          <a:lstStyle/>
+          <a:p>
+            <a:r>
               <a:rPr lang="de-DE" dirty="0" smtClean="0"/>
               <a:t>Risiken</a:t>
             </a:r>
@@ -8302,14 +8818,14 @@
   <p:timing>
     <p:tnLst>
       <p:par>
-        <p:cTn id="1" dur="indefinite" restart="never" nodeType="tmRoot"/>
+        <p:cTn xmlns:p14="http://schemas.microsoft.com/office/powerpoint/2010/main" id="1" dur="indefinite" restart="never" nodeType="tmRoot"/>
       </p:par>
     </p:tnLst>
   </p:timing>
 </p:sld>
 </file>
 
-<file path=ppt/slides/slide8.xml><?xml version="1.0" encoding="utf-8"?>
+<file path=ppt/slides/slide9.xml><?xml version="1.0" encoding="utf-8"?>
 <p:sld xmlns:a="http://schemas.openxmlformats.org/drawingml/2006/main" xmlns:r="http://schemas.openxmlformats.org/officeDocument/2006/relationships" xmlns:p="http://schemas.openxmlformats.org/presentationml/2006/main">
   <p:cSld>
     <p:spTree>
@@ -10016,251 +10532,7 @@
   <p:timing>
     <p:tnLst>
       <p:par>
-        <p:cTn id="1" dur="indefinite" restart="never" nodeType="tmRoot"/>
-      </p:par>
-    </p:tnLst>
-  </p:timing>
-</p:sld>
-</file>
-
-<file path=ppt/slides/slide9.xml><?xml version="1.0" encoding="utf-8"?>
-<p:sld xmlns:a="http://schemas.openxmlformats.org/drawingml/2006/main" xmlns:r="http://schemas.openxmlformats.org/officeDocument/2006/relationships" xmlns:p="http://schemas.openxmlformats.org/presentationml/2006/main">
-  <p:cSld>
-    <p:spTree>
-      <p:nvGrpSpPr>
-        <p:cNvPr id="1" name=""/>
-        <p:cNvGrpSpPr/>
-        <p:nvPr/>
-      </p:nvGrpSpPr>
-      <p:grpSpPr>
-        <a:xfrm>
-          <a:off x="0" y="0"/>
-          <a:ext cx="0" cy="0"/>
-          <a:chOff x="0" y="0"/>
-          <a:chExt cx="0" cy="0"/>
-        </a:xfrm>
-      </p:grpSpPr>
-      <p:sp>
-        <p:nvSpPr>
-          <p:cNvPr id="2" name="Titel 1"/>
-          <p:cNvSpPr>
-            <a:spLocks noGrp="1"/>
-          </p:cNvSpPr>
-          <p:nvPr>
-            <p:ph type="title"/>
-          </p:nvPr>
-        </p:nvSpPr>
-        <p:spPr/>
-        <p:txBody>
-          <a:bodyPr/>
-          <a:lstStyle/>
-          <a:p>
-            <a:r>
-              <a:rPr lang="de-DE" dirty="0" smtClean="0"/>
-              <a:t>Kundennutzen</a:t>
-            </a:r>
-            <a:endParaRPr lang="de-DE" dirty="0"/>
-          </a:p>
-        </p:txBody>
-      </p:sp>
-      <p:sp>
-        <p:nvSpPr>
-          <p:cNvPr id="6" name="Textfeld 5"/>
-          <p:cNvSpPr txBox="1"/>
-          <p:nvPr/>
-        </p:nvSpPr>
-        <p:spPr>
-          <a:xfrm>
-            <a:off x="3044379" y="1907629"/>
-            <a:ext cx="5740349" cy="868392"/>
-          </a:xfrm>
-          <a:prstGeom prst="rect">
-            <a:avLst/>
-          </a:prstGeom>
-          <a:noFill/>
-        </p:spPr>
-        <p:txBody>
-          <a:bodyPr wrap="square" rtlCol="0">
-            <a:spAutoFit/>
-          </a:bodyPr>
-          <a:lstStyle/>
-          <a:p>
-            <a:pPr marL="285750" lvl="0" indent="-285750">
-              <a:buFontTx/>
-              <a:buChar char="-"/>
-            </a:pPr>
-            <a:r>
-              <a:rPr lang="de-DE" dirty="0"/>
-              <a:t>In Schachvereinen und Schachkursen kann „</a:t>
-            </a:r>
-            <a:r>
-              <a:rPr lang="de-DE" dirty="0" err="1"/>
-              <a:t>necaREx</a:t>
-            </a:r>
-            <a:r>
-              <a:rPr lang="de-DE" dirty="0"/>
-              <a:t>“ als effiziente Lernsoftware eingesetzt werden</a:t>
-            </a:r>
-            <a:r>
-              <a:rPr lang="de-DE" dirty="0" smtClean="0"/>
-              <a:t>.</a:t>
-            </a:r>
-            <a:endParaRPr lang="de-DE" dirty="0"/>
-          </a:p>
-        </p:txBody>
-      </p:sp>
-      <p:sp>
-        <p:nvSpPr>
-          <p:cNvPr id="5" name="Textfeld 4"/>
-          <p:cNvSpPr txBox="1"/>
-          <p:nvPr/>
-        </p:nvSpPr>
-        <p:spPr>
-          <a:xfrm>
-            <a:off x="3044379" y="2839437"/>
-            <a:ext cx="5740349" cy="610783"/>
-          </a:xfrm>
-          <a:prstGeom prst="rect">
-            <a:avLst/>
-          </a:prstGeom>
-          <a:noFill/>
-        </p:spPr>
-        <p:txBody>
-          <a:bodyPr wrap="square" rtlCol="0">
-            <a:spAutoFit/>
-          </a:bodyPr>
-          <a:lstStyle/>
-          <a:p>
-            <a:pPr marL="285750" indent="-285750">
-              <a:buFontTx/>
-              <a:buChar char="-"/>
-            </a:pPr>
-            <a:r>
-              <a:rPr lang="de-DE" dirty="0"/>
-              <a:t>Durch das schlichte und intuitive Design ist „</a:t>
-            </a:r>
-            <a:r>
-              <a:rPr lang="de-DE" dirty="0" err="1"/>
-              <a:t>necaREx</a:t>
-            </a:r>
-            <a:r>
-              <a:rPr lang="de-DE" dirty="0"/>
-              <a:t>“ einfach und schnell zu erlernen</a:t>
-            </a:r>
-            <a:r>
-              <a:rPr lang="de-DE" dirty="0" smtClean="0"/>
-              <a:t>.</a:t>
-            </a:r>
-            <a:endParaRPr lang="de-DE" dirty="0"/>
-          </a:p>
-        </p:txBody>
-      </p:sp>
-      <p:sp>
-        <p:nvSpPr>
-          <p:cNvPr id="8" name="Textfeld 7"/>
-          <p:cNvSpPr txBox="1"/>
-          <p:nvPr/>
-        </p:nvSpPr>
-        <p:spPr>
-          <a:xfrm>
-            <a:off x="3044379" y="3529094"/>
-            <a:ext cx="5740349" cy="1126001"/>
-          </a:xfrm>
-          <a:prstGeom prst="rect">
-            <a:avLst/>
-          </a:prstGeom>
-          <a:noFill/>
-        </p:spPr>
-        <p:txBody>
-          <a:bodyPr wrap="square" rtlCol="0">
-            <a:spAutoFit/>
-          </a:bodyPr>
-          <a:lstStyle/>
-          <a:p>
-            <a:pPr marL="285750" lvl="0" indent="-285750">
-              <a:buFontTx/>
-              <a:buChar char="-"/>
-            </a:pPr>
-            <a:r>
-              <a:rPr lang="de-DE" dirty="0"/>
-              <a:t>Da ein „</a:t>
-            </a:r>
-            <a:r>
-              <a:rPr lang="de-DE" dirty="0" err="1"/>
-              <a:t>necaREx</a:t>
-            </a:r>
-            <a:r>
-              <a:rPr lang="de-DE" dirty="0"/>
-              <a:t>“ Lizenzpaket für einen angemessenen Preis erworben werden kann und ein Paket fünf Lizenzen beinhaltet, stellt es eine kostengünstige Investition dar</a:t>
-            </a:r>
-            <a:r>
-              <a:rPr lang="de-DE" dirty="0" smtClean="0"/>
-              <a:t>.</a:t>
-            </a:r>
-            <a:endParaRPr lang="de-DE" dirty="0"/>
-          </a:p>
-        </p:txBody>
-      </p:sp>
-      <p:sp>
-        <p:nvSpPr>
-          <p:cNvPr id="9" name="Textfeld 8"/>
-          <p:cNvSpPr txBox="1"/>
-          <p:nvPr/>
-        </p:nvSpPr>
-        <p:spPr>
-          <a:xfrm>
-            <a:off x="3044379" y="4742068"/>
-            <a:ext cx="5740349" cy="868392"/>
-          </a:xfrm>
-          <a:prstGeom prst="rect">
-            <a:avLst/>
-          </a:prstGeom>
-          <a:noFill/>
-        </p:spPr>
-        <p:txBody>
-          <a:bodyPr wrap="square" rtlCol="0">
-            <a:spAutoFit/>
-          </a:bodyPr>
-          <a:lstStyle/>
-          <a:p>
-            <a:pPr marL="285750" indent="-285750">
-              <a:buFontTx/>
-              <a:buChar char="-"/>
-            </a:pPr>
-            <a:r>
-              <a:rPr lang="de-DE" dirty="0"/>
-              <a:t>Dank unserer übersichtlichen Benutzeroberfläche kann der Spieler zu jeder Zeit wichtige Spielinformationen entnehmen</a:t>
-            </a:r>
-            <a:r>
-              <a:rPr lang="de-DE" dirty="0" smtClean="0"/>
-              <a:t>.</a:t>
-            </a:r>
-            <a:endParaRPr lang="de-DE" dirty="0"/>
-          </a:p>
-        </p:txBody>
-      </p:sp>
-    </p:spTree>
-    <p:extLst>
-      <p:ext uri="{BB962C8B-B14F-4D97-AF65-F5344CB8AC3E}">
-        <p14:creationId xmlns:p14="http://schemas.microsoft.com/office/powerpoint/2010/main" val="537607213"/>
-      </p:ext>
-    </p:extLst>
-  </p:cSld>
-  <p:clrMapOvr>
-    <a:masterClrMapping/>
-  </p:clrMapOvr>
-  <mc:AlternateContent xmlns:mc="http://schemas.openxmlformats.org/markup-compatibility/2006" xmlns:p14="http://schemas.microsoft.com/office/powerpoint/2010/main">
-    <mc:Choice Requires="p14">
-      <p:transition spd="slow" p14:dur="2000"/>
-    </mc:Choice>
-    <mc:Fallback xmlns="">
-      <p:transition xmlns:p14="http://schemas.microsoft.com/office/powerpoint/2010/main" spd="slow"/>
-    </mc:Fallback>
-  </mc:AlternateContent>
-  <p:timing>
-    <p:tnLst>
-      <p:par>
-        <p:cTn id="1" dur="indefinite" restart="never" nodeType="tmRoot"/>
+        <p:cTn xmlns:p14="http://schemas.microsoft.com/office/powerpoint/2010/main" id="1" dur="indefinite" restart="never" nodeType="tmRoot"/>
       </p:par>
     </p:tnLst>
   </p:timing>
@@ -10512,7 +10784,7 @@
         </a:ln>
         <a:effectLst/>
         <a:extLst>
-          <a:ext uri="{AF507438-7753-43E0-B8FC-AC1667EBCBE1}">
+          <a:ext uri="{AF507438-7753-43e0-B8FC-AC1667EBCBE1}">
             <a14:hiddenEffects xmlns:a14="http://schemas.microsoft.com/office/drawing/2010/main">
               <a:effectLst>
                 <a:outerShdw blurRad="63500" dist="38099" dir="2700000" algn="ctr" rotWithShape="0">
@@ -10588,7 +10860,7 @@
         </a:ln>
         <a:effectLst/>
         <a:extLst>
-          <a:ext uri="{AF507438-7753-43E0-B8FC-AC1667EBCBE1}">
+          <a:ext uri="{AF507438-7753-43e0-B8FC-AC1667EBCBE1}">
             <a14:hiddenEffects xmlns:a14="http://schemas.microsoft.com/office/drawing/2010/main">
               <a:effectLst>
                 <a:outerShdw blurRad="63500" dist="38099" dir="2700000" algn="ctr" rotWithShape="0">

</xml_diff>